<commit_message>
[IMS-?] Präsentation & Dokumentation hübsch gemacht
</commit_message>
<xml_diff>
--- a/Doku/Präsentation.pptx
+++ b/Doku/Präsentation.pptx
@@ -10,21 +10,21 @@
   <p:sldIdLst>
     <p:sldId id="256" r:id="rId2"/>
     <p:sldId id="257" r:id="rId3"/>
-    <p:sldId id="262" r:id="rId4"/>
+    <p:sldId id="274" r:id="rId4"/>
     <p:sldId id="258" r:id="rId5"/>
     <p:sldId id="259" r:id="rId6"/>
-    <p:sldId id="263" r:id="rId7"/>
+    <p:sldId id="275" r:id="rId7"/>
     <p:sldId id="260" r:id="rId8"/>
-    <p:sldId id="261" r:id="rId9"/>
-    <p:sldId id="264" r:id="rId10"/>
-    <p:sldId id="265" r:id="rId11"/>
-    <p:sldId id="266" r:id="rId12"/>
-    <p:sldId id="267" r:id="rId13"/>
-    <p:sldId id="268" r:id="rId14"/>
-    <p:sldId id="269" r:id="rId15"/>
+    <p:sldId id="264" r:id="rId9"/>
+    <p:sldId id="265" r:id="rId10"/>
+    <p:sldId id="276" r:id="rId11"/>
+    <p:sldId id="267" r:id="rId12"/>
+    <p:sldId id="268" r:id="rId13"/>
+    <p:sldId id="269" r:id="rId14"/>
+    <p:sldId id="277" r:id="rId15"/>
     <p:sldId id="271" r:id="rId16"/>
-    <p:sldId id="272" r:id="rId17"/>
-    <p:sldId id="273" r:id="rId18"/>
+    <p:sldId id="273" r:id="rId17"/>
+    <p:sldId id="272" r:id="rId18"/>
   </p:sldIdLst>
   <p:sldSz cx="9144000" cy="6858000" type="screen4x3"/>
   <p:notesSz cx="6858000" cy="9144000"/>
@@ -208,7 +208,7 @@
           <a:p>
             <a:fld id="{8B15DE1F-419D-4D02-82BC-F91BB41CE353}" type="datetimeFigureOut">
               <a:rPr lang="de-DE" smtClean="0"/>
-              <a:t>04.05.2016</a:t>
+              <a:t>06.05.2016</a:t>
             </a:fld>
             <a:endParaRPr lang="de-DE"/>
           </a:p>
@@ -376,6 +376,11 @@
         </p:txBody>
       </p:sp>
     </p:spTree>
+    <p:extLst>
+      <p:ext uri="{BB962C8B-B14F-4D97-AF65-F5344CB8AC3E}">
+        <p14:creationId xmlns:p14="http://schemas.microsoft.com/office/powerpoint/2010/main" val="1217405143"/>
+      </p:ext>
+    </p:extLst>
   </p:cSld>
   <p:clrMap bg1="lt1" tx1="dk1" bg2="lt2" tx2="dk2" accent1="accent1" accent2="accent2" accent3="accent3" accent4="accent4" accent5="accent5" accent6="accent6" hlink="hlink" folHlink="folHlink"/>
   <p:notesStyle>
@@ -595,14 +600,16 @@
         </p:nvSpPr>
         <p:spPr/>
         <p:txBody>
-          <a:bodyPr>
-            <a:normAutofit/>
-          </a:bodyPr>
+          <a:bodyPr/>
           <a:lstStyle/>
           <a:p>
             <a:r>
               <a:rPr lang="de-DE" dirty="0" smtClean="0"/>
-              <a:t>Warum?</a:t>
+              <a:t>Kann </a:t>
+            </a:r>
+            <a:r>
+              <a:rPr lang="de-DE" baseline="0" dirty="0" smtClean="0"/>
+              <a:t>von Lagerpersonal &amp; Vertrieb genutzt werden</a:t>
             </a:r>
             <a:endParaRPr lang="de-DE" dirty="0"/>
           </a:p>
@@ -625,13 +632,18 @@
           <a:p>
             <a:fld id="{5F898C9E-79AA-49F5-983B-85D49666B96C}" type="slidenum">
               <a:rPr lang="de-DE" smtClean="0"/>
-              <a:t>12</a:t>
+              <a:t>4</a:t>
             </a:fld>
             <a:endParaRPr lang="de-DE"/>
           </a:p>
         </p:txBody>
       </p:sp>
     </p:spTree>
+    <p:extLst>
+      <p:ext uri="{BB962C8B-B14F-4D97-AF65-F5344CB8AC3E}">
+        <p14:creationId xmlns:p14="http://schemas.microsoft.com/office/powerpoint/2010/main" val="2490451349"/>
+      </p:ext>
+    </p:extLst>
   </p:cSld>
   <p:clrMapOvr>
     <a:masterClrMapping/>
@@ -680,15 +692,31 @@
         </p:nvSpPr>
         <p:spPr/>
         <p:txBody>
-          <a:bodyPr>
-            <a:normAutofit/>
-          </a:bodyPr>
+          <a:bodyPr/>
           <a:lstStyle/>
           <a:p>
             <a:r>
               <a:rPr lang="de-DE" dirty="0" smtClean="0"/>
-              <a:t>Link zum Bild</a:t>
-            </a:r>
+              <a:t>Eingreifen</a:t>
+            </a:r>
+            <a:r>
+              <a:rPr lang="de-DE" baseline="0" dirty="0" smtClean="0"/>
+              <a:t> bei jedem Zyklus und somit dynamischer als Wasserfallmodell</a:t>
+            </a:r>
+          </a:p>
+          <a:p>
+            <a:r>
+              <a:rPr lang="de-DE" baseline="0" dirty="0" smtClean="0"/>
+              <a:t>Zyklus: Festlegen der Ziele, Lösungen planen/Risikoanalyse, Entwicklung/Test, Planen des nächsten Zyklus </a:t>
+            </a:r>
+          </a:p>
+          <a:p>
+            <a:r>
+              <a:rPr lang="de-DE" baseline="0" dirty="0" smtClean="0"/>
+              <a:t>Am Ende steht immer ein Prototyp, welcher einen Zwischenstand zum fertigen Produkt darstellt</a:t>
+            </a:r>
+          </a:p>
+          <a:p>
             <a:endParaRPr lang="de-DE" dirty="0"/>
           </a:p>
         </p:txBody>
@@ -710,13 +738,18 @@
           <a:p>
             <a:fld id="{5F898C9E-79AA-49F5-983B-85D49666B96C}" type="slidenum">
               <a:rPr lang="de-DE" smtClean="0"/>
-              <a:t>13</a:t>
+              <a:t>8</a:t>
             </a:fld>
             <a:endParaRPr lang="de-DE"/>
           </a:p>
         </p:txBody>
       </p:sp>
     </p:spTree>
+    <p:extLst>
+      <p:ext uri="{BB962C8B-B14F-4D97-AF65-F5344CB8AC3E}">
+        <p14:creationId xmlns:p14="http://schemas.microsoft.com/office/powerpoint/2010/main" val="4031942451"/>
+      </p:ext>
+    </p:extLst>
   </p:cSld>
   <p:clrMapOvr>
     <a:masterClrMapping/>
@@ -772,7 +805,7 @@
           <a:p>
             <a:r>
               <a:rPr lang="de-DE" dirty="0" smtClean="0"/>
-              <a:t>Bild</a:t>
+              <a:t>Warum?</a:t>
             </a:r>
             <a:endParaRPr lang="de-DE" dirty="0"/>
           </a:p>
@@ -795,7 +828,177 @@
           <a:p>
             <a:fld id="{5F898C9E-79AA-49F5-983B-85D49666B96C}" type="slidenum">
               <a:rPr lang="de-DE" smtClean="0"/>
-              <a:t>17</a:t>
+              <a:t>11</a:t>
+            </a:fld>
+            <a:endParaRPr lang="de-DE"/>
+          </a:p>
+        </p:txBody>
+      </p:sp>
+    </p:spTree>
+  </p:cSld>
+  <p:clrMapOvr>
+    <a:masterClrMapping/>
+  </p:clrMapOvr>
+</p:notes>
+</file>
+
+<file path=ppt/notesSlides/notesSlide5.xml><?xml version="1.0" encoding="utf-8"?>
+<p:notes xmlns:a="http://schemas.openxmlformats.org/drawingml/2006/main" xmlns:r="http://schemas.openxmlformats.org/officeDocument/2006/relationships" xmlns:p="http://schemas.openxmlformats.org/presentationml/2006/main">
+  <p:cSld>
+    <p:spTree>
+      <p:nvGrpSpPr>
+        <p:cNvPr id="1" name=""/>
+        <p:cNvGrpSpPr/>
+        <p:nvPr/>
+      </p:nvGrpSpPr>
+      <p:grpSpPr>
+        <a:xfrm>
+          <a:off x="0" y="0"/>
+          <a:ext cx="0" cy="0"/>
+          <a:chOff x="0" y="0"/>
+          <a:chExt cx="0" cy="0"/>
+        </a:xfrm>
+      </p:grpSpPr>
+      <p:sp>
+        <p:nvSpPr>
+          <p:cNvPr id="2" name="Folienbildplatzhalter 1"/>
+          <p:cNvSpPr>
+            <a:spLocks noGrp="1" noRot="1" noChangeAspect="1"/>
+          </p:cNvSpPr>
+          <p:nvPr>
+            <p:ph type="sldImg"/>
+          </p:nvPr>
+        </p:nvSpPr>
+        <p:spPr/>
+      </p:sp>
+      <p:sp>
+        <p:nvSpPr>
+          <p:cNvPr id="3" name="Notizenplatzhalter 2"/>
+          <p:cNvSpPr>
+            <a:spLocks noGrp="1"/>
+          </p:cNvSpPr>
+          <p:nvPr>
+            <p:ph type="body" idx="1"/>
+          </p:nvPr>
+        </p:nvSpPr>
+        <p:spPr/>
+        <p:txBody>
+          <a:bodyPr>
+            <a:normAutofit/>
+          </a:bodyPr>
+          <a:lstStyle/>
+          <a:p>
+            <a:r>
+              <a:rPr lang="de-DE" dirty="0" smtClean="0"/>
+              <a:t>Link zum Bild</a:t>
+            </a:r>
+            <a:endParaRPr lang="de-DE" dirty="0"/>
+          </a:p>
+        </p:txBody>
+      </p:sp>
+      <p:sp>
+        <p:nvSpPr>
+          <p:cNvPr id="4" name="Foliennummernplatzhalter 3"/>
+          <p:cNvSpPr>
+            <a:spLocks noGrp="1"/>
+          </p:cNvSpPr>
+          <p:nvPr>
+            <p:ph type="sldNum" sz="quarter" idx="10"/>
+          </p:nvPr>
+        </p:nvSpPr>
+        <p:spPr/>
+        <p:txBody>
+          <a:bodyPr/>
+          <a:lstStyle/>
+          <a:p>
+            <a:fld id="{5F898C9E-79AA-49F5-983B-85D49666B96C}" type="slidenum">
+              <a:rPr lang="de-DE" smtClean="0"/>
+              <a:t>12</a:t>
+            </a:fld>
+            <a:endParaRPr lang="de-DE"/>
+          </a:p>
+        </p:txBody>
+      </p:sp>
+    </p:spTree>
+  </p:cSld>
+  <p:clrMapOvr>
+    <a:masterClrMapping/>
+  </p:clrMapOvr>
+</p:notes>
+</file>
+
+<file path=ppt/notesSlides/notesSlide6.xml><?xml version="1.0" encoding="utf-8"?>
+<p:notes xmlns:a="http://schemas.openxmlformats.org/drawingml/2006/main" xmlns:r="http://schemas.openxmlformats.org/officeDocument/2006/relationships" xmlns:p="http://schemas.openxmlformats.org/presentationml/2006/main">
+  <p:cSld>
+    <p:spTree>
+      <p:nvGrpSpPr>
+        <p:cNvPr id="1" name=""/>
+        <p:cNvGrpSpPr/>
+        <p:nvPr/>
+      </p:nvGrpSpPr>
+      <p:grpSpPr>
+        <a:xfrm>
+          <a:off x="0" y="0"/>
+          <a:ext cx="0" cy="0"/>
+          <a:chOff x="0" y="0"/>
+          <a:chExt cx="0" cy="0"/>
+        </a:xfrm>
+      </p:grpSpPr>
+      <p:sp>
+        <p:nvSpPr>
+          <p:cNvPr id="2" name="Folienbildplatzhalter 1"/>
+          <p:cNvSpPr>
+            <a:spLocks noGrp="1" noRot="1" noChangeAspect="1"/>
+          </p:cNvSpPr>
+          <p:nvPr>
+            <p:ph type="sldImg"/>
+          </p:nvPr>
+        </p:nvSpPr>
+        <p:spPr/>
+      </p:sp>
+      <p:sp>
+        <p:nvSpPr>
+          <p:cNvPr id="3" name="Notizenplatzhalter 2"/>
+          <p:cNvSpPr>
+            <a:spLocks noGrp="1"/>
+          </p:cNvSpPr>
+          <p:nvPr>
+            <p:ph type="body" idx="1"/>
+          </p:nvPr>
+        </p:nvSpPr>
+        <p:spPr/>
+        <p:txBody>
+          <a:bodyPr>
+            <a:normAutofit/>
+          </a:bodyPr>
+          <a:lstStyle/>
+          <a:p>
+            <a:r>
+              <a:rPr lang="de-DE" dirty="0" smtClean="0"/>
+              <a:t>Bild</a:t>
+            </a:r>
+            <a:endParaRPr lang="de-DE" dirty="0"/>
+          </a:p>
+        </p:txBody>
+      </p:sp>
+      <p:sp>
+        <p:nvSpPr>
+          <p:cNvPr id="4" name="Foliennummernplatzhalter 3"/>
+          <p:cNvSpPr>
+            <a:spLocks noGrp="1"/>
+          </p:cNvSpPr>
+          <p:nvPr>
+            <p:ph type="sldNum" sz="quarter" idx="10"/>
+          </p:nvPr>
+        </p:nvSpPr>
+        <p:spPr/>
+        <p:txBody>
+          <a:bodyPr/>
+          <a:lstStyle/>
+          <a:p>
+            <a:fld id="{5F898C9E-79AA-49F5-983B-85D49666B96C}" type="slidenum">
+              <a:rPr lang="de-DE" smtClean="0"/>
+              <a:t>16</a:t>
             </a:fld>
             <a:endParaRPr lang="de-DE"/>
           </a:p>
@@ -952,7 +1155,7 @@
           <a:p>
             <a:fld id="{589E9101-0A57-40FF-95DB-3AEFC76CAD8A}" type="datetime1">
               <a:rPr lang="de-DE" smtClean="0"/>
-              <a:t>04.05.2016</a:t>
+              <a:t>06.05.2016</a:t>
             </a:fld>
             <a:endParaRPr lang="de-DE"/>
           </a:p>
@@ -1315,7 +1518,7 @@
           <a:p>
             <a:fld id="{B6B05801-08C6-4164-B203-94DCDA8BAE53}" type="datetime1">
               <a:rPr lang="de-DE" smtClean="0"/>
-              <a:t>04.05.2016</a:t>
+              <a:t>06.05.2016</a:t>
             </a:fld>
             <a:endParaRPr lang="de-DE"/>
           </a:p>
@@ -1494,7 +1697,7 @@
           <a:p>
             <a:fld id="{B7BE1875-3FCB-45CB-AE2F-8CA91420BD64}" type="datetime1">
               <a:rPr lang="de-DE" smtClean="0"/>
-              <a:t>04.05.2016</a:t>
+              <a:t>06.05.2016</a:t>
             </a:fld>
             <a:endParaRPr lang="de-DE"/>
           </a:p>
@@ -1733,7 +1936,7 @@
           <a:p>
             <a:fld id="{3EAC9F25-C81C-4864-8663-E08EC7D03295}" type="datetime1">
               <a:rPr lang="de-DE" smtClean="0"/>
-              <a:t>04.05.2016</a:t>
+              <a:t>06.05.2016</a:t>
             </a:fld>
             <a:endParaRPr lang="de-DE"/>
           </a:p>
@@ -2006,7 +2209,7 @@
           <a:p>
             <a:fld id="{C6A5A5AE-9BFF-4276-9AB1-92A8B3D07B38}" type="datetime1">
               <a:rPr lang="de-DE" smtClean="0"/>
-              <a:t>04.05.2016</a:t>
+              <a:t>06.05.2016</a:t>
             </a:fld>
             <a:endParaRPr lang="de-DE"/>
           </a:p>
@@ -2230,7 +2433,7 @@
           <a:p>
             <a:fld id="{B1376325-24E8-4B47-9141-C80390B74AF3}" type="datetime1">
               <a:rPr lang="de-DE" smtClean="0"/>
-              <a:t>04.05.2016</a:t>
+              <a:t>06.05.2016</a:t>
             </a:fld>
             <a:endParaRPr lang="de-DE"/>
           </a:p>
@@ -2586,7 +2789,7 @@
           <a:p>
             <a:fld id="{8550A3E2-E3EE-4DF2-838A-5C507645BA25}" type="datetime1">
               <a:rPr lang="de-DE" smtClean="0"/>
-              <a:t>04.05.2016</a:t>
+              <a:t>06.05.2016</a:t>
             </a:fld>
             <a:endParaRPr lang="de-DE"/>
           </a:p>
@@ -2822,7 +3025,7 @@
           <a:p>
             <a:fld id="{F3B357C8-9EA6-49F6-903E-07E3FA028202}" type="datetime1">
               <a:rPr lang="de-DE" smtClean="0"/>
-              <a:t>04.05.2016</a:t>
+              <a:t>06.05.2016</a:t>
             </a:fld>
             <a:endParaRPr lang="de-DE"/>
           </a:p>
@@ -2966,7 +3169,7 @@
           <a:p>
             <a:fld id="{446D090E-AC8B-49C9-AD71-C42508C98946}" type="datetime1">
               <a:rPr lang="de-DE" smtClean="0"/>
-              <a:t>04.05.2016</a:t>
+              <a:t>06.05.2016</a:t>
             </a:fld>
             <a:endParaRPr lang="de-DE"/>
           </a:p>
@@ -3247,7 +3450,7 @@
           <a:p>
             <a:fld id="{5B6D69C0-18ED-40E5-958F-868639F01E05}" type="datetime1">
               <a:rPr lang="de-DE" smtClean="0"/>
-              <a:t>04.05.2016</a:t>
+              <a:t>06.05.2016</a:t>
             </a:fld>
             <a:endParaRPr lang="de-DE"/>
           </a:p>
@@ -3658,7 +3861,7 @@
           <a:p>
             <a:fld id="{34E89A8D-E0A7-41AC-8DB4-1A068E8ADE23}" type="datetime1">
               <a:rPr lang="de-DE" smtClean="0"/>
-              <a:t>04.05.2016</a:t>
+              <a:t>06.05.2016</a:t>
             </a:fld>
             <a:endParaRPr lang="de-DE"/>
           </a:p>
@@ -4000,7 +4203,7 @@
           <a:p>
             <a:fld id="{82C11CE6-0549-40F5-B4A2-44089F8500DE}" type="datetime1">
               <a:rPr lang="de-DE" smtClean="0"/>
-              <a:t>04.05.2016</a:t>
+              <a:t>06.05.2016</a:t>
             </a:fld>
             <a:endParaRPr lang="de-DE"/>
           </a:p>
@@ -4593,6 +4796,13 @@
   <p:clrMapOvr>
     <a:masterClrMapping/>
   </p:clrMapOvr>
+  <p:timing>
+    <p:tnLst>
+      <p:par>
+        <p:cTn id="1" dur="indefinite" restart="never" nodeType="tmRoot"/>
+      </p:par>
+    </p:tnLst>
+  </p:timing>
 </p:sld>
 </file>
 
@@ -4615,6 +4825,158 @@
       </p:grpSpPr>
       <p:sp>
         <p:nvSpPr>
+          <p:cNvPr id="7" name="Rechteck 6"/>
+          <p:cNvSpPr/>
+          <p:nvPr/>
+        </p:nvSpPr>
+        <p:spPr>
+          <a:xfrm>
+            <a:off x="2339752" y="1268760"/>
+            <a:ext cx="4536504" cy="4896544"/>
+          </a:xfrm>
+          <a:prstGeom prst="rect">
+            <a:avLst/>
+          </a:prstGeom>
+          <a:solidFill>
+            <a:schemeClr val="bg1"/>
+          </a:solidFill>
+          <a:ln>
+            <a:solidFill>
+              <a:schemeClr val="tx1"/>
+            </a:solidFill>
+          </a:ln>
+        </p:spPr>
+        <p:style>
+          <a:lnRef idx="2">
+            <a:schemeClr val="accent1">
+              <a:shade val="50000"/>
+            </a:schemeClr>
+          </a:lnRef>
+          <a:fillRef idx="1">
+            <a:schemeClr val="accent1"/>
+          </a:fillRef>
+          <a:effectRef idx="0">
+            <a:schemeClr val="accent1"/>
+          </a:effectRef>
+          <a:fontRef idx="minor">
+            <a:schemeClr val="lt1"/>
+          </a:fontRef>
+        </p:style>
+        <p:txBody>
+          <a:bodyPr rtlCol="0" anchor="ctr"/>
+          <a:lstStyle/>
+          <a:p>
+            <a:pPr algn="ctr"/>
+            <a:endParaRPr lang="de-DE"/>
+          </a:p>
+        </p:txBody>
+      </p:sp>
+      <p:sp>
+        <p:nvSpPr>
+          <p:cNvPr id="9" name="Rechteck 8"/>
+          <p:cNvSpPr/>
+          <p:nvPr/>
+        </p:nvSpPr>
+        <p:spPr>
+          <a:xfrm>
+            <a:off x="2339752" y="2230501"/>
+            <a:ext cx="4536504" cy="360040"/>
+          </a:xfrm>
+          <a:prstGeom prst="rect">
+            <a:avLst/>
+          </a:prstGeom>
+          <a:gradFill flip="none" rotWithShape="1">
+            <a:gsLst>
+              <a:gs pos="0">
+                <a:srgbClr val="97D077"/>
+              </a:gs>
+              <a:gs pos="100000">
+                <a:srgbClr val="C6E5B5"/>
+              </a:gs>
+            </a:gsLst>
+            <a:lin ang="16200000" scaled="1"/>
+            <a:tileRect/>
+          </a:gradFill>
+        </p:spPr>
+        <p:style>
+          <a:lnRef idx="2">
+            <a:schemeClr val="accent1">
+              <a:shade val="50000"/>
+            </a:schemeClr>
+          </a:lnRef>
+          <a:fillRef idx="1">
+            <a:schemeClr val="accent1"/>
+          </a:fillRef>
+          <a:effectRef idx="0">
+            <a:schemeClr val="accent1"/>
+          </a:effectRef>
+          <a:fontRef idx="minor">
+            <a:schemeClr val="lt1"/>
+          </a:fontRef>
+        </p:style>
+        <p:txBody>
+          <a:bodyPr rtlCol="0" anchor="ctr"/>
+          <a:lstStyle/>
+          <a:p>
+            <a:pPr algn="ctr"/>
+            <a:endParaRPr lang="de-DE"/>
+          </a:p>
+        </p:txBody>
+      </p:sp>
+      <p:sp>
+        <p:nvSpPr>
+          <p:cNvPr id="8" name="Rechteck 7"/>
+          <p:cNvSpPr/>
+          <p:nvPr/>
+        </p:nvSpPr>
+        <p:spPr>
+          <a:xfrm>
+            <a:off x="2339752" y="1268760"/>
+            <a:ext cx="4536504" cy="360040"/>
+          </a:xfrm>
+          <a:prstGeom prst="rect">
+            <a:avLst/>
+          </a:prstGeom>
+          <a:gradFill flip="none" rotWithShape="1">
+            <a:gsLst>
+              <a:gs pos="0">
+                <a:srgbClr val="97D077"/>
+              </a:gs>
+              <a:gs pos="100000">
+                <a:srgbClr val="C6E5B5"/>
+              </a:gs>
+            </a:gsLst>
+            <a:lin ang="16200000" scaled="1"/>
+            <a:tileRect/>
+          </a:gradFill>
+        </p:spPr>
+        <p:style>
+          <a:lnRef idx="2">
+            <a:schemeClr val="accent1">
+              <a:shade val="50000"/>
+            </a:schemeClr>
+          </a:lnRef>
+          <a:fillRef idx="1">
+            <a:schemeClr val="accent1"/>
+          </a:fillRef>
+          <a:effectRef idx="0">
+            <a:schemeClr val="accent1"/>
+          </a:effectRef>
+          <a:fontRef idx="minor">
+            <a:schemeClr val="lt1"/>
+          </a:fontRef>
+        </p:style>
+        <p:txBody>
+          <a:bodyPr rtlCol="0" anchor="ctr"/>
+          <a:lstStyle/>
+          <a:p>
+            <a:pPr algn="ctr"/>
+            <a:endParaRPr lang="de-DE"/>
+          </a:p>
+        </p:txBody>
+      </p:sp>
+      <p:sp>
+        <p:nvSpPr>
           <p:cNvPr id="2" name="Titel 1"/>
           <p:cNvSpPr>
             <a:spLocks noGrp="1"/>
@@ -4630,28 +4992,335 @@
           <a:p>
             <a:r>
               <a:rPr lang="de-DE" dirty="0" smtClean="0"/>
+              <a:t>Gliederung</a:t>
+            </a:r>
+            <a:endParaRPr lang="de-DE" dirty="0"/>
+          </a:p>
+        </p:txBody>
+      </p:sp>
+      <p:sp>
+        <p:nvSpPr>
+          <p:cNvPr id="10" name="Rechteck 9"/>
+          <p:cNvSpPr/>
+          <p:nvPr/>
+        </p:nvSpPr>
+        <p:spPr>
+          <a:xfrm>
+            <a:off x="2339752" y="3751918"/>
+            <a:ext cx="4536504" cy="360040"/>
+          </a:xfrm>
+          <a:prstGeom prst="rect">
+            <a:avLst/>
+          </a:prstGeom>
+          <a:gradFill flip="none" rotWithShape="1">
+            <a:gsLst>
+              <a:gs pos="0">
+                <a:srgbClr val="97D077"/>
+              </a:gs>
+              <a:gs pos="100000">
+                <a:srgbClr val="C6E5B5"/>
+              </a:gs>
+            </a:gsLst>
+            <a:lin ang="16200000" scaled="1"/>
+            <a:tileRect/>
+          </a:gradFill>
+        </p:spPr>
+        <p:style>
+          <a:lnRef idx="2">
+            <a:schemeClr val="accent1">
+              <a:shade val="50000"/>
+            </a:schemeClr>
+          </a:lnRef>
+          <a:fillRef idx="1">
+            <a:schemeClr val="accent1"/>
+          </a:fillRef>
+          <a:effectRef idx="0">
+            <a:schemeClr val="accent1"/>
+          </a:effectRef>
+          <a:fontRef idx="minor">
+            <a:schemeClr val="lt1"/>
+          </a:fontRef>
+        </p:style>
+        <p:txBody>
+          <a:bodyPr rtlCol="0" anchor="ctr"/>
+          <a:lstStyle/>
+          <a:p>
+            <a:pPr algn="ctr"/>
+            <a:endParaRPr lang="de-DE"/>
+          </a:p>
+        </p:txBody>
+      </p:sp>
+      <p:sp>
+        <p:nvSpPr>
+          <p:cNvPr id="11" name="Rechteck 10"/>
+          <p:cNvSpPr/>
+          <p:nvPr/>
+        </p:nvSpPr>
+        <p:spPr>
+          <a:xfrm>
+            <a:off x="2339752" y="5013176"/>
+            <a:ext cx="4536504" cy="360040"/>
+          </a:xfrm>
+          <a:prstGeom prst="rect">
+            <a:avLst/>
+          </a:prstGeom>
+          <a:gradFill flip="none" rotWithShape="1">
+            <a:gsLst>
+              <a:gs pos="0">
+                <a:srgbClr val="97D077"/>
+              </a:gs>
+              <a:gs pos="100000">
+                <a:srgbClr val="C6E5B5"/>
+              </a:gs>
+            </a:gsLst>
+            <a:lin ang="16200000" scaled="1"/>
+            <a:tileRect/>
+          </a:gradFill>
+        </p:spPr>
+        <p:style>
+          <a:lnRef idx="2">
+            <a:schemeClr val="accent1">
+              <a:shade val="50000"/>
+            </a:schemeClr>
+          </a:lnRef>
+          <a:fillRef idx="1">
+            <a:schemeClr val="accent1"/>
+          </a:fillRef>
+          <a:effectRef idx="0">
+            <a:schemeClr val="accent1"/>
+          </a:effectRef>
+          <a:fontRef idx="minor">
+            <a:schemeClr val="lt1"/>
+          </a:fontRef>
+        </p:style>
+        <p:txBody>
+          <a:bodyPr rtlCol="0" anchor="ctr"/>
+          <a:lstStyle/>
+          <a:p>
+            <a:pPr algn="ctr"/>
+            <a:endParaRPr lang="de-DE"/>
+          </a:p>
+        </p:txBody>
+      </p:sp>
+      <p:sp>
+        <p:nvSpPr>
+          <p:cNvPr id="12" name="Rechteck 11"/>
+          <p:cNvSpPr/>
+          <p:nvPr/>
+        </p:nvSpPr>
+        <p:spPr>
+          <a:xfrm>
+            <a:off x="2341548" y="4111958"/>
+            <a:ext cx="4536504" cy="901218"/>
+          </a:xfrm>
+          <a:prstGeom prst="rect">
+            <a:avLst/>
+          </a:prstGeom>
+          <a:solidFill>
+            <a:srgbClr val="E5F3DD"/>
+          </a:solidFill>
+        </p:spPr>
+        <p:style>
+          <a:lnRef idx="2">
+            <a:schemeClr val="accent1">
+              <a:shade val="50000"/>
+            </a:schemeClr>
+          </a:lnRef>
+          <a:fillRef idx="1">
+            <a:schemeClr val="accent1"/>
+          </a:fillRef>
+          <a:effectRef idx="0">
+            <a:schemeClr val="accent1"/>
+          </a:effectRef>
+          <a:fontRef idx="minor">
+            <a:schemeClr val="lt1"/>
+          </a:fontRef>
+        </p:style>
+        <p:txBody>
+          <a:bodyPr rtlCol="0" anchor="ctr"/>
+          <a:lstStyle/>
+          <a:p>
+            <a:pPr algn="ctr"/>
+            <a:endParaRPr lang="de-DE"/>
+          </a:p>
+        </p:txBody>
+      </p:sp>
+      <p:sp>
+        <p:nvSpPr>
+          <p:cNvPr id="3" name="Inhaltsplatzhalter 2"/>
+          <p:cNvSpPr>
+            <a:spLocks noGrp="1"/>
+          </p:cNvSpPr>
+          <p:nvPr>
+            <p:ph sz="quarter" idx="1"/>
+          </p:nvPr>
+        </p:nvSpPr>
+        <p:spPr>
+          <a:xfrm>
+            <a:off x="2329408" y="1291208"/>
+            <a:ext cx="4402832" cy="4937760"/>
+          </a:xfrm>
+        </p:spPr>
+        <p:txBody>
+          <a:bodyPr>
+            <a:normAutofit fontScale="85000" lnSpcReduction="20000"/>
+          </a:bodyPr>
+          <a:lstStyle/>
+          <a:p>
+            <a:r>
+              <a:rPr lang="de-DE" dirty="0" smtClean="0"/>
+              <a:t>Einleitung</a:t>
+            </a:r>
+          </a:p>
+          <a:p>
+            <a:pPr lvl="1"/>
+            <a:r>
+              <a:rPr lang="de-DE" dirty="0" smtClean="0">
+                <a:solidFill>
+                  <a:schemeClr val="tx1"/>
+                </a:solidFill>
+              </a:rPr>
+              <a:t>Thematik</a:t>
+            </a:r>
+          </a:p>
+          <a:p>
+            <a:pPr lvl="1"/>
+            <a:r>
+              <a:rPr lang="de-DE" dirty="0" smtClean="0">
+                <a:solidFill>
+                  <a:schemeClr val="tx1"/>
+                </a:solidFill>
+              </a:rPr>
+              <a:t>Anforderungen</a:t>
+            </a:r>
+          </a:p>
+          <a:p>
+            <a:r>
+              <a:rPr lang="de-DE" dirty="0" smtClean="0"/>
+              <a:t>Planung</a:t>
+            </a:r>
+          </a:p>
+          <a:p>
+            <a:pPr lvl="1"/>
+            <a:r>
+              <a:rPr lang="de-DE" dirty="0" smtClean="0">
+                <a:solidFill>
+                  <a:schemeClr val="tx1"/>
+                </a:solidFill>
+              </a:rPr>
+              <a:t>Zeitplan</a:t>
+            </a:r>
+          </a:p>
+          <a:p>
+            <a:pPr lvl="1"/>
+            <a:r>
+              <a:rPr lang="de-DE" dirty="0" smtClean="0">
+                <a:solidFill>
+                  <a:schemeClr val="tx1"/>
+                </a:solidFill>
+              </a:rPr>
+              <a:t>Vorgehensmodelle</a:t>
+            </a:r>
+          </a:p>
+          <a:p>
+            <a:pPr lvl="2"/>
+            <a:r>
+              <a:rPr lang="de-DE" sz="2100" dirty="0" smtClean="0"/>
+              <a:t>Spiralmodell</a:t>
+            </a:r>
+          </a:p>
+          <a:p>
+            <a:pPr lvl="2"/>
+            <a:r>
+              <a:rPr lang="de-DE" sz="2100" dirty="0" smtClean="0"/>
               <a:t>Test </a:t>
             </a:r>
             <a:r>
-              <a:rPr lang="de-DE" dirty="0" err="1" smtClean="0"/>
+              <a:rPr lang="de-DE" sz="2100" dirty="0" err="1" smtClean="0"/>
               <a:t>Driven</a:t>
             </a:r>
             <a:r>
+              <a:rPr lang="de-DE" sz="2100" dirty="0" smtClean="0"/>
+              <a:t> Development (TDD)</a:t>
+            </a:r>
+          </a:p>
+          <a:p>
+            <a:r>
               <a:rPr lang="de-DE" dirty="0" smtClean="0"/>
-              <a:t> Development (TDD)</a:t>
-            </a:r>
-            <a:endParaRPr lang="de-DE" dirty="0"/>
-          </a:p>
-        </p:txBody>
-      </p:sp>
-      <p:sp>
-        <p:nvSpPr>
-          <p:cNvPr id="3" name="Inhaltsplatzhalter 2"/>
-          <p:cNvSpPr>
-            <a:spLocks noGrp="1"/>
-          </p:cNvSpPr>
-          <p:nvPr>
-            <p:ph sz="quarter" idx="1"/>
+              <a:t>Entwurf</a:t>
+            </a:r>
+          </a:p>
+          <a:p>
+            <a:pPr lvl="1"/>
+            <a:r>
+              <a:rPr lang="de-DE" dirty="0" smtClean="0">
+                <a:solidFill>
+                  <a:schemeClr val="tx1"/>
+                </a:solidFill>
+              </a:rPr>
+              <a:t>Architekturdesign</a:t>
+            </a:r>
+          </a:p>
+          <a:p>
+            <a:pPr lvl="1"/>
+            <a:r>
+              <a:rPr lang="de-DE" dirty="0" smtClean="0">
+                <a:solidFill>
+                  <a:schemeClr val="tx1"/>
+                </a:solidFill>
+              </a:rPr>
+              <a:t>Datenbankentwurf</a:t>
+            </a:r>
+          </a:p>
+          <a:p>
+            <a:pPr lvl="1"/>
+            <a:r>
+              <a:rPr lang="de-DE" dirty="0" smtClean="0">
+                <a:solidFill>
+                  <a:schemeClr val="tx1"/>
+                </a:solidFill>
+              </a:rPr>
+              <a:t>Pflichtenheft</a:t>
+            </a:r>
+          </a:p>
+          <a:p>
+            <a:r>
+              <a:rPr lang="de-DE" dirty="0" smtClean="0"/>
+              <a:t>Fazit</a:t>
+            </a:r>
+          </a:p>
+          <a:p>
+            <a:pPr lvl="1"/>
+            <a:r>
+              <a:rPr lang="de-DE" dirty="0" smtClean="0">
+                <a:solidFill>
+                  <a:schemeClr val="tx1"/>
+                </a:solidFill>
+              </a:rPr>
+              <a:t>Gewonnenes</a:t>
+            </a:r>
+          </a:p>
+          <a:p>
+            <a:pPr lvl="1"/>
+            <a:r>
+              <a:rPr lang="de-DE" dirty="0" smtClean="0">
+                <a:solidFill>
+                  <a:schemeClr val="tx1"/>
+                </a:solidFill>
+              </a:rPr>
+              <a:t>Ausblick</a:t>
+            </a:r>
+          </a:p>
+        </p:txBody>
+      </p:sp>
+      <p:sp>
+        <p:nvSpPr>
+          <p:cNvPr id="5" name="Foliennummernplatzhalter 4"/>
+          <p:cNvSpPr>
+            <a:spLocks noGrp="1"/>
+          </p:cNvSpPr>
+          <p:nvPr>
+            <p:ph type="sldNum" sz="quarter" idx="12"/>
           </p:nvPr>
         </p:nvSpPr>
         <p:spPr/>
@@ -4660,84 +5329,111 @@
           <a:lstStyle/>
           <a:p>
             <a:r>
-              <a:rPr lang="de-DE" dirty="0" err="1" smtClean="0"/>
-              <a:t>Red</a:t>
-            </a:r>
-            <a:r>
-              <a:rPr lang="de-DE" dirty="0" smtClean="0"/>
-              <a:t> – Green – </a:t>
-            </a:r>
-            <a:r>
-              <a:rPr lang="de-DE" dirty="0" err="1" smtClean="0"/>
-              <a:t>Refactor</a:t>
-            </a:r>
-            <a:endParaRPr lang="de-DE" dirty="0" smtClean="0"/>
-          </a:p>
-          <a:p>
-            <a:r>
-              <a:rPr lang="de-DE" dirty="0" smtClean="0"/>
-              <a:t>Unit Tests</a:t>
-            </a:r>
-            <a:endParaRPr lang="de-DE" dirty="0" smtClean="0"/>
-          </a:p>
-          <a:p>
-            <a:pPr lvl="1"/>
-            <a:r>
-              <a:rPr lang="de-DE" dirty="0" smtClean="0"/>
-              <a:t>Datenbankverbindungen</a:t>
-            </a:r>
-          </a:p>
-          <a:p>
-            <a:pPr lvl="2"/>
-            <a:r>
-              <a:rPr lang="de-DE" dirty="0" smtClean="0"/>
-              <a:t>Einfügen von Daten</a:t>
-            </a:r>
-          </a:p>
-          <a:p>
-            <a:pPr lvl="2"/>
-            <a:r>
-              <a:rPr lang="de-DE" dirty="0" smtClean="0"/>
-              <a:t>Löschen von Daten</a:t>
-            </a:r>
-          </a:p>
-          <a:p>
-            <a:pPr lvl="1"/>
-            <a:r>
-              <a:rPr lang="de-DE" dirty="0" smtClean="0"/>
-              <a:t>Validation</a:t>
-            </a:r>
-            <a:endParaRPr lang="de-DE" dirty="0"/>
-          </a:p>
-        </p:txBody>
-      </p:sp>
-      <p:sp>
-        <p:nvSpPr>
-          <p:cNvPr id="5" name="Foliennummernplatzhalter 4"/>
-          <p:cNvSpPr>
-            <a:spLocks noGrp="1"/>
-          </p:cNvSpPr>
-          <p:nvPr>
-            <p:ph type="sldNum" sz="quarter" idx="12"/>
-          </p:nvPr>
-        </p:nvSpPr>
-        <p:spPr/>
-        <p:txBody>
-          <a:bodyPr/>
-          <a:lstStyle/>
-          <a:p>
-            <a:r>
-              <a:rPr lang="de-DE" dirty="0" smtClean="0"/>
+              <a:rPr lang="de-DE" dirty="0"/>
               <a:t>9</a:t>
             </a:r>
           </a:p>
         </p:txBody>
       </p:sp>
     </p:spTree>
+    <p:extLst>
+      <p:ext uri="{BB962C8B-B14F-4D97-AF65-F5344CB8AC3E}">
+        <p14:creationId xmlns:p14="http://schemas.microsoft.com/office/powerpoint/2010/main" val="1905236472"/>
+      </p:ext>
+    </p:extLst>
   </p:cSld>
   <p:clrMapOvr>
     <a:masterClrMapping/>
   </p:clrMapOvr>
+  <p:timing>
+    <p:tnLst>
+      <p:par>
+        <p:cTn id="1" dur="indefinite" restart="never" nodeType="tmRoot">
+          <p:childTnLst>
+            <p:seq concurrent="1" nextAc="seek">
+              <p:cTn id="2" dur="indefinite" nodeType="mainSeq">
+                <p:childTnLst>
+                  <p:par>
+                    <p:cTn id="3" fill="hold">
+                      <p:stCondLst>
+                        <p:cond delay="indefinite"/>
+                        <p:cond evt="onBegin" delay="0">
+                          <p:tn val="2"/>
+                        </p:cond>
+                      </p:stCondLst>
+                      <p:childTnLst>
+                        <p:par>
+                          <p:cTn id="4" fill="hold">
+                            <p:stCondLst>
+                              <p:cond delay="0"/>
+                            </p:stCondLst>
+                            <p:childTnLst>
+                              <p:par>
+                                <p:cTn id="5" presetID="10" presetClass="entr" presetSubtype="0" fill="hold" grpId="0" nodeType="withEffect">
+                                  <p:stCondLst>
+                                    <p:cond delay="0"/>
+                                  </p:stCondLst>
+                                  <p:childTnLst>
+                                    <p:set>
+                                      <p:cBhvr>
+                                        <p:cTn id="6" dur="1" fill="hold">
+                                          <p:stCondLst>
+                                            <p:cond delay="0"/>
+                                          </p:stCondLst>
+                                        </p:cTn>
+                                        <p:tgtEl>
+                                          <p:spTgt spid="12"/>
+                                        </p:tgtEl>
+                                        <p:attrNameLst>
+                                          <p:attrName>style.visibility</p:attrName>
+                                        </p:attrNameLst>
+                                      </p:cBhvr>
+                                      <p:to>
+                                        <p:strVal val="visible"/>
+                                      </p:to>
+                                    </p:set>
+                                    <p:animEffect transition="in" filter="fade">
+                                      <p:cBhvr>
+                                        <p:cTn id="7" dur="750"/>
+                                        <p:tgtEl>
+                                          <p:spTgt spid="12"/>
+                                        </p:tgtEl>
+                                      </p:cBhvr>
+                                    </p:animEffect>
+                                  </p:childTnLst>
+                                </p:cTn>
+                              </p:par>
+                            </p:childTnLst>
+                          </p:cTn>
+                        </p:par>
+                      </p:childTnLst>
+                    </p:cTn>
+                  </p:par>
+                </p:childTnLst>
+              </p:cTn>
+              <p:prevCondLst>
+                <p:cond evt="onPrev" delay="0">
+                  <p:tgtEl>
+                    <p:sldTgt/>
+                  </p:tgtEl>
+                </p:cond>
+              </p:prevCondLst>
+              <p:nextCondLst>
+                <p:cond evt="onNext" delay="0">
+                  <p:tgtEl>
+                    <p:sldTgt/>
+                  </p:tgtEl>
+                </p:cond>
+              </p:nextCondLst>
+            </p:seq>
+          </p:childTnLst>
+        </p:cTn>
+      </p:par>
+    </p:tnLst>
+    <p:bldLst>
+      <p:bldP spid="12" grpId="0" animBg="1"/>
+    </p:bldLst>
+  </p:timing>
 </p:sld>
 </file>
 
@@ -4775,34 +5471,43 @@
           <a:p>
             <a:r>
               <a:rPr lang="de-DE" dirty="0" smtClean="0"/>
-              <a:t>Entwurf</a:t>
+              <a:t>Architekturdesign</a:t>
             </a:r>
             <a:endParaRPr lang="de-DE" dirty="0"/>
           </a:p>
         </p:txBody>
       </p:sp>
-      <p:sp>
-        <p:nvSpPr>
-          <p:cNvPr id="3" name="Inhaltsplatzhalter 2"/>
-          <p:cNvSpPr>
-            <a:spLocks noGrp="1"/>
-          </p:cNvSpPr>
-          <p:nvPr>
-            <p:ph sz="quarter" idx="1"/>
-          </p:nvPr>
-        </p:nvSpPr>
-        <p:spPr/>
-        <p:txBody>
-          <a:bodyPr/>
-          <a:lstStyle/>
-          <a:p>
-            <a:endParaRPr lang="de-DE"/>
-          </a:p>
-        </p:txBody>
-      </p:sp>
-      <p:sp>
-        <p:nvSpPr>
-          <p:cNvPr id="5" name="Foliennummernplatzhalter 4"/>
+      <p:pic>
+        <p:nvPicPr>
+          <p:cNvPr id="5" name="Grafik 1"/>
+          <p:cNvPicPr/>
+          <p:nvPr/>
+        </p:nvPicPr>
+        <p:blipFill>
+          <a:blip r:embed="rId3" cstate="print">
+            <a:extLst>
+              <a:ext uri="{28A0092B-C50C-407E-A947-70E740481C1C}">
+                <a14:useLocalDpi xmlns:a14="http://schemas.microsoft.com/office/drawing/2010/main" val="0"/>
+              </a:ext>
+            </a:extLst>
+          </a:blip>
+          <a:stretch>
+            <a:fillRect/>
+          </a:stretch>
+        </p:blipFill>
+        <p:spPr>
+          <a:xfrm>
+            <a:off x="2411760" y="1196752"/>
+            <a:ext cx="4176464" cy="5040560"/>
+          </a:xfrm>
+          <a:prstGeom prst="rect">
+            <a:avLst/>
+          </a:prstGeom>
+        </p:spPr>
+      </p:pic>
+      <p:sp>
+        <p:nvSpPr>
+          <p:cNvPr id="7" name="Foliennummernplatzhalter 6"/>
           <p:cNvSpPr>
             <a:spLocks noGrp="1"/>
           </p:cNvSpPr>
@@ -4819,7 +5524,6 @@
               <a:rPr lang="de-DE" dirty="0" smtClean="0"/>
               <a:t>10</a:t>
             </a:r>
-            <a:endParaRPr lang="de-DE" dirty="0"/>
           </a:p>
         </p:txBody>
       </p:sp>
@@ -4828,6 +5532,13 @@
   <p:clrMapOvr>
     <a:masterClrMapping/>
   </p:clrMapOvr>
+  <p:timing>
+    <p:tnLst>
+      <p:par>
+        <p:cTn id="1" dur="indefinite" restart="never" nodeType="tmRoot"/>
+      </p:par>
+    </p:tnLst>
+  </p:timing>
 </p:sld>
 </file>
 
@@ -4865,42 +5576,27 @@
           <a:p>
             <a:r>
               <a:rPr lang="de-DE" dirty="0" smtClean="0"/>
-              <a:t>Architekturdesign</a:t>
-            </a:r>
-            <a:endParaRPr lang="de-DE" dirty="0"/>
-          </a:p>
-        </p:txBody>
-      </p:sp>
-      <p:sp>
-        <p:nvSpPr>
-          <p:cNvPr id="3" name="Inhaltsplatzhalter 2"/>
-          <p:cNvSpPr>
-            <a:spLocks noGrp="1"/>
-          </p:cNvSpPr>
-          <p:nvPr>
-            <p:ph sz="quarter" idx="1"/>
-          </p:nvPr>
-        </p:nvSpPr>
-        <p:spPr/>
-        <p:txBody>
-          <a:bodyPr/>
-          <a:lstStyle/>
-          <a:p>
+              <a:t>Datenbank Entwurf</a:t>
+            </a:r>
             <a:endParaRPr lang="de-DE" dirty="0"/>
           </a:p>
         </p:txBody>
       </p:sp>
       <p:pic>
         <p:nvPicPr>
-          <p:cNvPr id="5" name="Grafik 1"/>
-          <p:cNvPicPr/>
-          <p:nvPr/>
+          <p:cNvPr id="4" name="Grafik 2"/>
+          <p:cNvPicPr>
+            <a:picLocks noGrp="1"/>
+          </p:cNvPicPr>
+          <p:nvPr>
+            <p:ph sz="quarter" idx="1"/>
+          </p:nvPr>
         </p:nvPicPr>
         <p:blipFill>
           <a:blip r:embed="rId3" cstate="print">
             <a:extLst>
               <a:ext uri="{28A0092B-C50C-407E-A947-70E740481C1C}">
-                <a14:useLocalDpi xmlns="" xmlns:wpc="http://schemas.microsoft.com/office/word/2010/wordprocessingCanvas" xmlns:mc="http://schemas.openxmlformats.org/markup-compatibility/2006" xmlns:o="urn:schemas-microsoft-com:office:office" xmlns:m="http://schemas.openxmlformats.org/officeDocument/2006/math" xmlns:v="urn:schemas-microsoft-com:vml" xmlns:wp14="http://schemas.microsoft.com/office/word/2010/wordprocessingDrawing" xmlns:wp="http://schemas.openxmlformats.org/drawingml/2006/wordprocessingDrawing" xmlns:w10="urn:schemas-microsoft-com:office:word" xmlns:w="http://schemas.openxmlformats.org/wordprocessingml/2006/main" xmlns:w14="http://schemas.microsoft.com/office/word/2010/wordml" xmlns:wpg="http://schemas.microsoft.com/office/word/2010/wordprocessingGroup" xmlns:wpi="http://schemas.microsoft.com/office/word/2010/wordprocessingInk" xmlns:wne="http://schemas.microsoft.com/office/word/2006/wordml" xmlns:wps="http://schemas.microsoft.com/office/word/2010/wordprocessingShape" xmlns:a14="http://schemas.microsoft.com/office/drawing/2010/main" xmlns:pic="http://schemas.openxmlformats.org/drawingml/2006/picture" xmlns:lc="http://schemas.openxmlformats.org/drawingml/2006/lockedCanvas" val="0"/>
+                <a14:useLocalDpi xmlns:a14="http://schemas.microsoft.com/office/drawing/2010/main" val="0"/>
               </a:ext>
             </a:extLst>
           </a:blip>
@@ -4910,8 +5606,8 @@
         </p:blipFill>
         <p:spPr>
           <a:xfrm>
-            <a:off x="2411760" y="1196752"/>
-            <a:ext cx="4176464" cy="5040560"/>
+            <a:off x="1331640" y="1268760"/>
+            <a:ext cx="6480720" cy="4968552"/>
           </a:xfrm>
           <a:prstGeom prst="rect">
             <a:avLst/>
@@ -4920,7 +5616,7 @@
       </p:pic>
       <p:sp>
         <p:nvSpPr>
-          <p:cNvPr id="7" name="Foliennummernplatzhalter 6"/>
+          <p:cNvPr id="6" name="Foliennummernplatzhalter 5"/>
           <p:cNvSpPr>
             <a:spLocks noGrp="1"/>
           </p:cNvSpPr>
@@ -4988,48 +5684,87 @@
           <a:lstStyle/>
           <a:p>
             <a:r>
+              <a:rPr lang="de-DE" dirty="0" err="1" smtClean="0"/>
+              <a:t>Plichtenheft</a:t>
+            </a:r>
+            <a:endParaRPr lang="de-DE" dirty="0"/>
+          </a:p>
+        </p:txBody>
+      </p:sp>
+      <p:sp>
+        <p:nvSpPr>
+          <p:cNvPr id="3" name="Inhaltsplatzhalter 2"/>
+          <p:cNvSpPr>
+            <a:spLocks noGrp="1"/>
+          </p:cNvSpPr>
+          <p:nvPr>
+            <p:ph sz="quarter" idx="1"/>
+          </p:nvPr>
+        </p:nvSpPr>
+        <p:spPr/>
+        <p:txBody>
+          <a:bodyPr/>
+          <a:lstStyle/>
+          <a:p>
+            <a:r>
               <a:rPr lang="de-DE" dirty="0" smtClean="0"/>
-              <a:t>Datenbank Entwurf</a:t>
-            </a:r>
+              <a:t>C#</a:t>
+            </a:r>
+          </a:p>
+          <a:p>
+            <a:r>
+              <a:rPr lang="de-DE" dirty="0" err="1" smtClean="0"/>
+              <a:t>MariaDB</a:t>
+            </a:r>
+            <a:endParaRPr lang="de-DE" dirty="0" smtClean="0"/>
+          </a:p>
+          <a:p>
+            <a:r>
+              <a:rPr lang="de-DE" dirty="0" err="1" smtClean="0"/>
+              <a:t>Mockups</a:t>
+            </a:r>
+            <a:endParaRPr lang="de-DE" dirty="0" smtClean="0"/>
+          </a:p>
+          <a:p>
+            <a:r>
+              <a:rPr lang="de-DE" dirty="0" err="1" smtClean="0"/>
+              <a:t>Validatoren</a:t>
+            </a:r>
+            <a:endParaRPr lang="de-DE" dirty="0" smtClean="0"/>
+          </a:p>
+          <a:p>
+            <a:r>
+              <a:rPr lang="de-DE" dirty="0" smtClean="0"/>
+              <a:t>Windows </a:t>
+            </a:r>
+            <a:r>
+              <a:rPr lang="de-DE" dirty="0" err="1" smtClean="0"/>
+              <a:t>Presentation</a:t>
+            </a:r>
+            <a:r>
+              <a:rPr lang="de-DE" dirty="0" smtClean="0"/>
+              <a:t> </a:t>
+            </a:r>
+            <a:r>
+              <a:rPr lang="de-DE" dirty="0" err="1" smtClean="0"/>
+              <a:t>Foundation</a:t>
+            </a:r>
+            <a:r>
+              <a:rPr lang="de-DE" dirty="0" smtClean="0"/>
+              <a:t> (WPF)</a:t>
+            </a:r>
+          </a:p>
+          <a:p>
+            <a:endParaRPr lang="de-DE" dirty="0" smtClean="0"/>
+          </a:p>
+          <a:p>
             <a:endParaRPr lang="de-DE" dirty="0"/>
           </a:p>
         </p:txBody>
       </p:sp>
-      <p:pic>
-        <p:nvPicPr>
-          <p:cNvPr id="4" name="Grafik 2"/>
-          <p:cNvPicPr>
-            <a:picLocks noGrp="1"/>
-          </p:cNvPicPr>
-          <p:nvPr>
-            <p:ph sz="quarter" idx="1"/>
-          </p:nvPr>
-        </p:nvPicPr>
-        <p:blipFill>
-          <a:blip r:embed="rId3" cstate="print">
-            <a:extLst>
-              <a:ext uri="{28A0092B-C50C-407E-A947-70E740481C1C}">
-                <a14:useLocalDpi xmlns="" xmlns:wpc="http://schemas.microsoft.com/office/word/2010/wordprocessingCanvas" xmlns:mc="http://schemas.openxmlformats.org/markup-compatibility/2006" xmlns:o="urn:schemas-microsoft-com:office:office" xmlns:m="http://schemas.openxmlformats.org/officeDocument/2006/math" xmlns:v="urn:schemas-microsoft-com:vml" xmlns:wp14="http://schemas.microsoft.com/office/word/2010/wordprocessingDrawing" xmlns:wp="http://schemas.openxmlformats.org/drawingml/2006/wordprocessingDrawing" xmlns:w10="urn:schemas-microsoft-com:office:word" xmlns:w="http://schemas.openxmlformats.org/wordprocessingml/2006/main" xmlns:w14="http://schemas.microsoft.com/office/word/2010/wordml" xmlns:wpg="http://schemas.microsoft.com/office/word/2010/wordprocessingGroup" xmlns:wpi="http://schemas.microsoft.com/office/word/2010/wordprocessingInk" xmlns:wne="http://schemas.microsoft.com/office/word/2006/wordml" xmlns:wps="http://schemas.microsoft.com/office/word/2010/wordprocessingShape" xmlns:a14="http://schemas.microsoft.com/office/drawing/2010/main" xmlns:pic="http://schemas.openxmlformats.org/drawingml/2006/picture" xmlns:lc="http://schemas.openxmlformats.org/drawingml/2006/lockedCanvas" val="0"/>
-              </a:ext>
-            </a:extLst>
-          </a:blip>
-          <a:stretch>
-            <a:fillRect/>
-          </a:stretch>
-        </p:blipFill>
-        <p:spPr>
-          <a:xfrm>
-            <a:off x="1331640" y="1268760"/>
-            <a:ext cx="6480720" cy="4968552"/>
-          </a:xfrm>
-          <a:prstGeom prst="rect">
-            <a:avLst/>
-          </a:prstGeom>
-        </p:spPr>
-      </p:pic>
-      <p:sp>
-        <p:nvSpPr>
-          <p:cNvPr id="6" name="Foliennummernplatzhalter 5"/>
+      <p:sp>
+        <p:nvSpPr>
+          <p:cNvPr id="5" name="Foliennummernplatzhalter 4"/>
           <p:cNvSpPr>
             <a:spLocks noGrp="1"/>
           </p:cNvSpPr>
@@ -5046,6 +5781,7 @@
               <a:rPr lang="de-DE" dirty="0" smtClean="0"/>
               <a:t>12</a:t>
             </a:r>
+            <a:endParaRPr lang="de-DE" dirty="0"/>
           </a:p>
         </p:txBody>
       </p:sp>
@@ -5083,6 +5819,158 @@
       </p:grpSpPr>
       <p:sp>
         <p:nvSpPr>
+          <p:cNvPr id="7" name="Rechteck 6"/>
+          <p:cNvSpPr/>
+          <p:nvPr/>
+        </p:nvSpPr>
+        <p:spPr>
+          <a:xfrm>
+            <a:off x="2339752" y="1268760"/>
+            <a:ext cx="4536504" cy="4896544"/>
+          </a:xfrm>
+          <a:prstGeom prst="rect">
+            <a:avLst/>
+          </a:prstGeom>
+          <a:solidFill>
+            <a:schemeClr val="bg1"/>
+          </a:solidFill>
+          <a:ln>
+            <a:solidFill>
+              <a:schemeClr val="tx1"/>
+            </a:solidFill>
+          </a:ln>
+        </p:spPr>
+        <p:style>
+          <a:lnRef idx="2">
+            <a:schemeClr val="accent1">
+              <a:shade val="50000"/>
+            </a:schemeClr>
+          </a:lnRef>
+          <a:fillRef idx="1">
+            <a:schemeClr val="accent1"/>
+          </a:fillRef>
+          <a:effectRef idx="0">
+            <a:schemeClr val="accent1"/>
+          </a:effectRef>
+          <a:fontRef idx="minor">
+            <a:schemeClr val="lt1"/>
+          </a:fontRef>
+        </p:style>
+        <p:txBody>
+          <a:bodyPr rtlCol="0" anchor="ctr"/>
+          <a:lstStyle/>
+          <a:p>
+            <a:pPr algn="ctr"/>
+            <a:endParaRPr lang="de-DE"/>
+          </a:p>
+        </p:txBody>
+      </p:sp>
+      <p:sp>
+        <p:nvSpPr>
+          <p:cNvPr id="9" name="Rechteck 8"/>
+          <p:cNvSpPr/>
+          <p:nvPr/>
+        </p:nvSpPr>
+        <p:spPr>
+          <a:xfrm>
+            <a:off x="2339752" y="2230501"/>
+            <a:ext cx="4536504" cy="360040"/>
+          </a:xfrm>
+          <a:prstGeom prst="rect">
+            <a:avLst/>
+          </a:prstGeom>
+          <a:gradFill flip="none" rotWithShape="1">
+            <a:gsLst>
+              <a:gs pos="0">
+                <a:srgbClr val="97D077"/>
+              </a:gs>
+              <a:gs pos="100000">
+                <a:srgbClr val="C6E5B5"/>
+              </a:gs>
+            </a:gsLst>
+            <a:lin ang="16200000" scaled="1"/>
+            <a:tileRect/>
+          </a:gradFill>
+        </p:spPr>
+        <p:style>
+          <a:lnRef idx="2">
+            <a:schemeClr val="accent1">
+              <a:shade val="50000"/>
+            </a:schemeClr>
+          </a:lnRef>
+          <a:fillRef idx="1">
+            <a:schemeClr val="accent1"/>
+          </a:fillRef>
+          <a:effectRef idx="0">
+            <a:schemeClr val="accent1"/>
+          </a:effectRef>
+          <a:fontRef idx="minor">
+            <a:schemeClr val="lt1"/>
+          </a:fontRef>
+        </p:style>
+        <p:txBody>
+          <a:bodyPr rtlCol="0" anchor="ctr"/>
+          <a:lstStyle/>
+          <a:p>
+            <a:pPr algn="ctr"/>
+            <a:endParaRPr lang="de-DE"/>
+          </a:p>
+        </p:txBody>
+      </p:sp>
+      <p:sp>
+        <p:nvSpPr>
+          <p:cNvPr id="8" name="Rechteck 7"/>
+          <p:cNvSpPr/>
+          <p:nvPr/>
+        </p:nvSpPr>
+        <p:spPr>
+          <a:xfrm>
+            <a:off x="2339752" y="1268760"/>
+            <a:ext cx="4536504" cy="360040"/>
+          </a:xfrm>
+          <a:prstGeom prst="rect">
+            <a:avLst/>
+          </a:prstGeom>
+          <a:gradFill flip="none" rotWithShape="1">
+            <a:gsLst>
+              <a:gs pos="0">
+                <a:srgbClr val="97D077"/>
+              </a:gs>
+              <a:gs pos="100000">
+                <a:srgbClr val="C6E5B5"/>
+              </a:gs>
+            </a:gsLst>
+            <a:lin ang="16200000" scaled="1"/>
+            <a:tileRect/>
+          </a:gradFill>
+        </p:spPr>
+        <p:style>
+          <a:lnRef idx="2">
+            <a:schemeClr val="accent1">
+              <a:shade val="50000"/>
+            </a:schemeClr>
+          </a:lnRef>
+          <a:fillRef idx="1">
+            <a:schemeClr val="accent1"/>
+          </a:fillRef>
+          <a:effectRef idx="0">
+            <a:schemeClr val="accent1"/>
+          </a:effectRef>
+          <a:fontRef idx="minor">
+            <a:schemeClr val="lt1"/>
+          </a:fontRef>
+        </p:style>
+        <p:txBody>
+          <a:bodyPr rtlCol="0" anchor="ctr"/>
+          <a:lstStyle/>
+          <a:p>
+            <a:pPr algn="ctr"/>
+            <a:endParaRPr lang="de-DE"/>
+          </a:p>
+        </p:txBody>
+      </p:sp>
+      <p:sp>
+        <p:nvSpPr>
           <p:cNvPr id="2" name="Titel 1"/>
           <p:cNvSpPr>
             <a:spLocks noGrp="1"/>
@@ -5097,8 +5985,8 @@
           <a:lstStyle/>
           <a:p>
             <a:r>
-              <a:rPr lang="de-DE" dirty="0" err="1" smtClean="0"/>
-              <a:t>Plichtenheft</a:t>
+              <a:rPr lang="de-DE" dirty="0" smtClean="0"/>
+              <a:t>Gliederung</a:t>
             </a:r>
             <a:endParaRPr lang="de-DE" dirty="0"/>
           </a:p>
@@ -5106,6 +5994,153 @@
       </p:sp>
       <p:sp>
         <p:nvSpPr>
+          <p:cNvPr id="10" name="Rechteck 9"/>
+          <p:cNvSpPr/>
+          <p:nvPr/>
+        </p:nvSpPr>
+        <p:spPr>
+          <a:xfrm>
+            <a:off x="2339752" y="3751918"/>
+            <a:ext cx="4536504" cy="360040"/>
+          </a:xfrm>
+          <a:prstGeom prst="rect">
+            <a:avLst/>
+          </a:prstGeom>
+          <a:gradFill flip="none" rotWithShape="1">
+            <a:gsLst>
+              <a:gs pos="0">
+                <a:srgbClr val="97D077"/>
+              </a:gs>
+              <a:gs pos="100000">
+                <a:srgbClr val="C6E5B5"/>
+              </a:gs>
+            </a:gsLst>
+            <a:lin ang="16200000" scaled="1"/>
+            <a:tileRect/>
+          </a:gradFill>
+        </p:spPr>
+        <p:style>
+          <a:lnRef idx="2">
+            <a:schemeClr val="accent1">
+              <a:shade val="50000"/>
+            </a:schemeClr>
+          </a:lnRef>
+          <a:fillRef idx="1">
+            <a:schemeClr val="accent1"/>
+          </a:fillRef>
+          <a:effectRef idx="0">
+            <a:schemeClr val="accent1"/>
+          </a:effectRef>
+          <a:fontRef idx="minor">
+            <a:schemeClr val="lt1"/>
+          </a:fontRef>
+        </p:style>
+        <p:txBody>
+          <a:bodyPr rtlCol="0" anchor="ctr"/>
+          <a:lstStyle/>
+          <a:p>
+            <a:pPr algn="ctr"/>
+            <a:endParaRPr lang="de-DE"/>
+          </a:p>
+        </p:txBody>
+      </p:sp>
+      <p:sp>
+        <p:nvSpPr>
+          <p:cNvPr id="11" name="Rechteck 10"/>
+          <p:cNvSpPr/>
+          <p:nvPr/>
+        </p:nvSpPr>
+        <p:spPr>
+          <a:xfrm>
+            <a:off x="2339752" y="5013176"/>
+            <a:ext cx="4536504" cy="360040"/>
+          </a:xfrm>
+          <a:prstGeom prst="rect">
+            <a:avLst/>
+          </a:prstGeom>
+          <a:gradFill flip="none" rotWithShape="1">
+            <a:gsLst>
+              <a:gs pos="0">
+                <a:srgbClr val="97D077"/>
+              </a:gs>
+              <a:gs pos="100000">
+                <a:srgbClr val="C6E5B5"/>
+              </a:gs>
+            </a:gsLst>
+            <a:lin ang="16200000" scaled="1"/>
+            <a:tileRect/>
+          </a:gradFill>
+        </p:spPr>
+        <p:style>
+          <a:lnRef idx="2">
+            <a:schemeClr val="accent1">
+              <a:shade val="50000"/>
+            </a:schemeClr>
+          </a:lnRef>
+          <a:fillRef idx="1">
+            <a:schemeClr val="accent1"/>
+          </a:fillRef>
+          <a:effectRef idx="0">
+            <a:schemeClr val="accent1"/>
+          </a:effectRef>
+          <a:fontRef idx="minor">
+            <a:schemeClr val="lt1"/>
+          </a:fontRef>
+        </p:style>
+        <p:txBody>
+          <a:bodyPr rtlCol="0" anchor="ctr"/>
+          <a:lstStyle/>
+          <a:p>
+            <a:pPr algn="ctr"/>
+            <a:endParaRPr lang="de-DE"/>
+          </a:p>
+        </p:txBody>
+      </p:sp>
+      <p:sp>
+        <p:nvSpPr>
+          <p:cNvPr id="12" name="Rechteck 11"/>
+          <p:cNvSpPr/>
+          <p:nvPr/>
+        </p:nvSpPr>
+        <p:spPr>
+          <a:xfrm>
+            <a:off x="2341548" y="5373216"/>
+            <a:ext cx="4536504" cy="792088"/>
+          </a:xfrm>
+          <a:prstGeom prst="rect">
+            <a:avLst/>
+          </a:prstGeom>
+          <a:solidFill>
+            <a:srgbClr val="E5F3DD"/>
+          </a:solidFill>
+        </p:spPr>
+        <p:style>
+          <a:lnRef idx="2">
+            <a:schemeClr val="accent1">
+              <a:shade val="50000"/>
+            </a:schemeClr>
+          </a:lnRef>
+          <a:fillRef idx="1">
+            <a:schemeClr val="accent1"/>
+          </a:fillRef>
+          <a:effectRef idx="0">
+            <a:schemeClr val="accent1"/>
+          </a:effectRef>
+          <a:fontRef idx="minor">
+            <a:schemeClr val="lt1"/>
+          </a:fontRef>
+        </p:style>
+        <p:txBody>
+          <a:bodyPr rtlCol="0" anchor="ctr"/>
+          <a:lstStyle/>
+          <a:p>
+            <a:pPr algn="ctr"/>
+            <a:endParaRPr lang="de-DE"/>
+          </a:p>
+        </p:txBody>
+      </p:sp>
+      <p:sp>
+        <p:nvSpPr>
           <p:cNvPr id="3" name="Inhaltsplatzhalter 2"/>
           <p:cNvSpPr>
             <a:spLocks noGrp="1"/>
@@ -5114,64 +6149,161 @@
             <p:ph sz="quarter" idx="1"/>
           </p:nvPr>
         </p:nvSpPr>
-        <p:spPr/>
-        <p:txBody>
-          <a:bodyPr/>
+        <p:spPr>
+          <a:xfrm>
+            <a:off x="2329408" y="1291208"/>
+            <a:ext cx="4402832" cy="4937760"/>
+          </a:xfrm>
+        </p:spPr>
+        <p:txBody>
+          <a:bodyPr>
+            <a:normAutofit fontScale="85000" lnSpcReduction="20000"/>
+          </a:bodyPr>
           <a:lstStyle/>
           <a:p>
             <a:r>
               <a:rPr lang="de-DE" dirty="0" smtClean="0"/>
-              <a:t>C#</a:t>
-            </a:r>
-          </a:p>
-          <a:p>
-            <a:r>
-              <a:rPr lang="de-DE" dirty="0" err="1" smtClean="0"/>
-              <a:t>MariaDB</a:t>
-            </a:r>
-            <a:endParaRPr lang="de-DE" dirty="0" smtClean="0"/>
-          </a:p>
-          <a:p>
-            <a:r>
-              <a:rPr lang="de-DE" dirty="0" err="1" smtClean="0"/>
-              <a:t>Mockups</a:t>
-            </a:r>
-            <a:endParaRPr lang="de-DE" dirty="0" smtClean="0"/>
-          </a:p>
-          <a:p>
-            <a:r>
-              <a:rPr lang="de-DE" dirty="0" err="1" smtClean="0"/>
-              <a:t>Validatoren</a:t>
-            </a:r>
-            <a:endParaRPr lang="de-DE" dirty="0" smtClean="0"/>
+              <a:t>Einleitung</a:t>
+            </a:r>
+          </a:p>
+          <a:p>
+            <a:pPr lvl="1"/>
+            <a:r>
+              <a:rPr lang="de-DE" dirty="0" smtClean="0">
+                <a:solidFill>
+                  <a:schemeClr val="tx1"/>
+                </a:solidFill>
+              </a:rPr>
+              <a:t>Thematik</a:t>
+            </a:r>
+          </a:p>
+          <a:p>
+            <a:pPr lvl="1"/>
+            <a:r>
+              <a:rPr lang="de-DE" dirty="0" smtClean="0">
+                <a:solidFill>
+                  <a:schemeClr val="tx1"/>
+                </a:solidFill>
+              </a:rPr>
+              <a:t>Anforderungen</a:t>
+            </a:r>
           </a:p>
           <a:p>
             <a:r>
               <a:rPr lang="de-DE" dirty="0" smtClean="0"/>
-              <a:t>Windows </a:t>
-            </a:r>
-            <a:r>
-              <a:rPr lang="de-DE" dirty="0" err="1" smtClean="0"/>
-              <a:t>Presentation</a:t>
-            </a:r>
+              <a:t>Planung</a:t>
+            </a:r>
+          </a:p>
+          <a:p>
+            <a:pPr lvl="1"/>
+            <a:r>
+              <a:rPr lang="de-DE" dirty="0" smtClean="0">
+                <a:solidFill>
+                  <a:schemeClr val="tx1"/>
+                </a:solidFill>
+              </a:rPr>
+              <a:t>Zeitplan</a:t>
+            </a:r>
+          </a:p>
+          <a:p>
+            <a:pPr lvl="1"/>
+            <a:r>
+              <a:rPr lang="de-DE" dirty="0" smtClean="0">
+                <a:solidFill>
+                  <a:schemeClr val="tx1"/>
+                </a:solidFill>
+              </a:rPr>
+              <a:t>Vorgehensmodelle</a:t>
+            </a:r>
+          </a:p>
+          <a:p>
+            <a:pPr lvl="2"/>
+            <a:r>
+              <a:rPr lang="de-DE" sz="2100" dirty="0" smtClean="0"/>
+              <a:t>Spiralmodell</a:t>
+            </a:r>
+          </a:p>
+          <a:p>
+            <a:pPr lvl="2"/>
+            <a:r>
+              <a:rPr lang="de-DE" sz="2100" dirty="0" smtClean="0"/>
+              <a:t>Test </a:t>
+            </a:r>
+            <a:r>
+              <a:rPr lang="de-DE" sz="2100" dirty="0" err="1" smtClean="0"/>
+              <a:t>Driven</a:t>
+            </a:r>
+            <a:r>
+              <a:rPr lang="de-DE" sz="2100" dirty="0" smtClean="0"/>
+              <a:t> Development (TDD)</a:t>
+            </a:r>
+          </a:p>
+          <a:p>
             <a:r>
               <a:rPr lang="de-DE" dirty="0" smtClean="0"/>
-              <a:t> </a:t>
-            </a:r>
-            <a:r>
-              <a:rPr lang="de-DE" dirty="0" err="1" smtClean="0"/>
-              <a:t>Foundation</a:t>
-            </a:r>
+              <a:t>Entwurf</a:t>
+            </a:r>
+          </a:p>
+          <a:p>
+            <a:pPr lvl="1"/>
+            <a:r>
+              <a:rPr lang="de-DE" dirty="0" smtClean="0">
+                <a:solidFill>
+                  <a:schemeClr val="tx1"/>
+                </a:solidFill>
+              </a:rPr>
+              <a:t>Architekturdesign</a:t>
+            </a:r>
+          </a:p>
+          <a:p>
+            <a:pPr lvl="1"/>
+            <a:r>
+              <a:rPr lang="de-DE" dirty="0" smtClean="0">
+                <a:solidFill>
+                  <a:schemeClr val="tx1"/>
+                </a:solidFill>
+              </a:rPr>
+              <a:t>Datenbankentwurf</a:t>
+            </a:r>
+          </a:p>
+          <a:p>
+            <a:pPr lvl="1"/>
+            <a:r>
+              <a:rPr lang="de-DE" dirty="0" smtClean="0">
+                <a:solidFill>
+                  <a:schemeClr val="tx1"/>
+                </a:solidFill>
+              </a:rPr>
+              <a:t>Pflichtenheft</a:t>
+            </a:r>
+          </a:p>
+          <a:p>
             <a:r>
               <a:rPr lang="de-DE" dirty="0" smtClean="0"/>
-              <a:t> (WPF)</a:t>
-            </a:r>
-          </a:p>
-          <a:p>
-            <a:endParaRPr lang="de-DE" dirty="0" smtClean="0"/>
-          </a:p>
-          <a:p>
-            <a:endParaRPr lang="de-DE" dirty="0"/>
+              <a:t>Fazit</a:t>
+            </a:r>
+          </a:p>
+          <a:p>
+            <a:pPr lvl="1"/>
+            <a:r>
+              <a:rPr lang="de-DE" dirty="0" smtClean="0">
+                <a:solidFill>
+                  <a:schemeClr val="tx1"/>
+                </a:solidFill>
+              </a:rPr>
+              <a:t>Gewonnenes</a:t>
+            </a:r>
+          </a:p>
+          <a:p>
+            <a:pPr lvl="1"/>
+            <a:r>
+              <a:rPr lang="de-DE" dirty="0" smtClean="0">
+                <a:solidFill>
+                  <a:schemeClr val="tx1"/>
+                </a:solidFill>
+              </a:rPr>
+              <a:t>Ausblick</a:t>
+            </a:r>
           </a:p>
         </p:txBody>
       </p:sp>
@@ -5199,6 +6331,11 @@
         </p:txBody>
       </p:sp>
     </p:spTree>
+    <p:extLst>
+      <p:ext uri="{BB962C8B-B14F-4D97-AF65-F5344CB8AC3E}">
+        <p14:creationId xmlns:p14="http://schemas.microsoft.com/office/powerpoint/2010/main" val="2435492652"/>
+      </p:ext>
+    </p:extLst>
   </p:cSld>
   <p:clrMapOvr>
     <a:masterClrMapping/>
@@ -5206,9 +6343,91 @@
   <p:timing>
     <p:tnLst>
       <p:par>
-        <p:cTn id="1" dur="indefinite" restart="never" nodeType="tmRoot"/>
+        <p:cTn id="1" dur="indefinite" restart="never" nodeType="tmRoot">
+          <p:childTnLst>
+            <p:seq concurrent="1" nextAc="seek">
+              <p:cTn id="2" dur="indefinite" nodeType="mainSeq">
+                <p:childTnLst>
+                  <p:par>
+                    <p:cTn id="3" fill="hold">
+                      <p:stCondLst>
+                        <p:cond delay="indefinite"/>
+                        <p:cond evt="onBegin" delay="0">
+                          <p:tn val="2"/>
+                        </p:cond>
+                      </p:stCondLst>
+                      <p:childTnLst>
+                        <p:par>
+                          <p:cTn id="4" fill="hold">
+                            <p:stCondLst>
+                              <p:cond delay="0"/>
+                            </p:stCondLst>
+                            <p:childTnLst>
+                              <p:par>
+                                <p:cTn id="5" presetID="10" presetClass="entr" presetSubtype="0" fill="hold" grpId="0" nodeType="withEffect">
+                                  <p:stCondLst>
+                                    <p:cond delay="0"/>
+                                  </p:stCondLst>
+                                  <p:childTnLst>
+                                    <p:set>
+                                      <p:cBhvr>
+                                        <p:cTn id="6" dur="1" fill="hold">
+                                          <p:stCondLst>
+                                            <p:cond delay="0"/>
+                                          </p:stCondLst>
+                                        </p:cTn>
+                                        <p:tgtEl>
+                                          <p:spTgt spid="12"/>
+                                        </p:tgtEl>
+                                        <p:attrNameLst>
+                                          <p:attrName>style.visibility</p:attrName>
+                                        </p:attrNameLst>
+                                      </p:cBhvr>
+                                      <p:to>
+                                        <p:strVal val="visible"/>
+                                      </p:to>
+                                    </p:set>
+                                    <p:animEffect transition="in" filter="fade">
+                                      <p:cBhvr>
+                                        <p:cTn id="7" dur="750"/>
+                                        <p:tgtEl>
+                                          <p:spTgt spid="12"/>
+                                        </p:tgtEl>
+                                      </p:cBhvr>
+                                    </p:animEffect>
+                                  </p:childTnLst>
+                                </p:cTn>
+                              </p:par>
+                            </p:childTnLst>
+                          </p:cTn>
+                        </p:par>
+                      </p:childTnLst>
+                    </p:cTn>
+                  </p:par>
+                </p:childTnLst>
+              </p:cTn>
+              <p:prevCondLst>
+                <p:cond evt="onPrev" delay="0">
+                  <p:tgtEl>
+                    <p:sldTgt/>
+                  </p:tgtEl>
+                </p:cond>
+              </p:prevCondLst>
+              <p:nextCondLst>
+                <p:cond evt="onNext" delay="0">
+                  <p:tgtEl>
+                    <p:sldTgt/>
+                  </p:tgtEl>
+                </p:cond>
+              </p:nextCondLst>
+            </p:seq>
+          </p:childTnLst>
+        </p:cTn>
       </p:par>
     </p:tnLst>
+    <p:bldLst>
+      <p:bldP spid="12" grpId="0" animBg="1"/>
+    </p:bldLst>
   </p:timing>
 </p:sld>
 </file>
@@ -5238,12 +6457,15 @@
         </p:nvSpPr>
         <p:spPr>
           <a:xfrm>
-            <a:off x="4644008" y="1556792"/>
-            <a:ext cx="4032448" cy="3168352"/>
+            <a:off x="4726360" y="1556792"/>
+            <a:ext cx="3816424" cy="3168352"/>
           </a:xfrm>
           <a:prstGeom prst="rect">
             <a:avLst/>
           </a:prstGeom>
+          <a:solidFill>
+            <a:srgbClr val="C6E5B5"/>
+          </a:solidFill>
         </p:spPr>
         <p:style>
           <a:lnRef idx="2">
@@ -5278,12 +6500,15 @@
         </p:nvSpPr>
         <p:spPr>
           <a:xfrm>
-            <a:off x="467544" y="1556792"/>
+            <a:off x="549896" y="1556792"/>
             <a:ext cx="3816424" cy="3168352"/>
           </a:xfrm>
           <a:prstGeom prst="rect">
             <a:avLst/>
           </a:prstGeom>
+          <a:solidFill>
+            <a:srgbClr val="C6E5B5"/>
+          </a:solidFill>
         </p:spPr>
         <p:style>
           <a:lnRef idx="2">
@@ -5343,55 +6568,81 @@
             <p:ph type="body" idx="1"/>
           </p:nvPr>
         </p:nvSpPr>
-        <p:spPr/>
-        <p:txBody>
-          <a:bodyPr/>
-          <a:lstStyle/>
-          <a:p>
-            <a:r>
-              <a:rPr lang="de-DE" dirty="0" smtClean="0"/>
-              <a:t>Gewonnenes</a:t>
-            </a:r>
-            <a:endParaRPr lang="de-DE" dirty="0"/>
-          </a:p>
-        </p:txBody>
-      </p:sp>
-      <p:sp>
-        <p:nvSpPr>
-          <p:cNvPr id="7" name="Textplatzhalter 6"/>
-          <p:cNvSpPr>
-            <a:spLocks noGrp="1"/>
-          </p:cNvSpPr>
-          <p:nvPr>
-            <p:ph type="body" sz="half" idx="3"/>
-          </p:nvPr>
-        </p:nvSpPr>
-        <p:spPr/>
-        <p:txBody>
-          <a:bodyPr/>
-          <a:lstStyle/>
-          <a:p>
-            <a:r>
-              <a:rPr lang="de-DE" dirty="0" smtClean="0"/>
-              <a:t>Ausblick</a:t>
-            </a:r>
-            <a:endParaRPr lang="de-DE" dirty="0"/>
-          </a:p>
-        </p:txBody>
-      </p:sp>
-      <p:sp>
-        <p:nvSpPr>
-          <p:cNvPr id="6" name="Inhaltsplatzhalter 5"/>
-          <p:cNvSpPr>
-            <a:spLocks noGrp="1"/>
-          </p:cNvSpPr>
-          <p:nvPr>
-            <p:ph sz="quarter" idx="2"/>
-          </p:nvPr>
-        </p:nvSpPr>
         <p:spPr>
           <a:xfrm>
-            <a:off x="457200" y="2174875"/>
+            <a:off x="539552" y="1285875"/>
+            <a:ext cx="4040188" cy="685800"/>
+          </a:xfrm>
+        </p:spPr>
+        <p:txBody>
+          <a:bodyPr/>
+          <a:lstStyle/>
+          <a:p>
+            <a:r>
+              <a:rPr lang="de-DE" dirty="0" smtClean="0">
+                <a:solidFill>
+                  <a:schemeClr val="tx1"/>
+                </a:solidFill>
+              </a:rPr>
+              <a:t>Gewonnenes</a:t>
+            </a:r>
+            <a:endParaRPr lang="de-DE" dirty="0">
+              <a:solidFill>
+                <a:schemeClr val="tx1"/>
+              </a:solidFill>
+            </a:endParaRPr>
+          </a:p>
+        </p:txBody>
+      </p:sp>
+      <p:sp>
+        <p:nvSpPr>
+          <p:cNvPr id="7" name="Textplatzhalter 6"/>
+          <p:cNvSpPr>
+            <a:spLocks noGrp="1"/>
+          </p:cNvSpPr>
+          <p:nvPr>
+            <p:ph type="body" sz="half" idx="3"/>
+          </p:nvPr>
+        </p:nvSpPr>
+        <p:spPr>
+          <a:xfrm>
+            <a:off x="4730552" y="1295400"/>
+            <a:ext cx="4041775" cy="685800"/>
+          </a:xfrm>
+        </p:spPr>
+        <p:txBody>
+          <a:bodyPr/>
+          <a:lstStyle/>
+          <a:p>
+            <a:r>
+              <a:rPr lang="de-DE" dirty="0" smtClean="0">
+                <a:solidFill>
+                  <a:schemeClr val="tx1"/>
+                </a:solidFill>
+              </a:rPr>
+              <a:t>Ausblick</a:t>
+            </a:r>
+            <a:endParaRPr lang="de-DE" dirty="0">
+              <a:solidFill>
+                <a:schemeClr val="tx1"/>
+              </a:solidFill>
+            </a:endParaRPr>
+          </a:p>
+        </p:txBody>
+      </p:sp>
+      <p:sp>
+        <p:nvSpPr>
+          <p:cNvPr id="6" name="Inhaltsplatzhalter 5"/>
+          <p:cNvSpPr>
+            <a:spLocks noGrp="1"/>
+          </p:cNvSpPr>
+          <p:nvPr>
+            <p:ph sz="quarter" idx="2"/>
+          </p:nvPr>
+        </p:nvSpPr>
+        <p:spPr>
+          <a:xfrm>
+            <a:off x="539552" y="2174875"/>
             <a:ext cx="3466728" cy="2190229"/>
           </a:xfrm>
         </p:spPr>
@@ -5401,24 +6652,36 @@
           </a:bodyPr>
           <a:lstStyle/>
           <a:p>
+            <a:pPr>
+              <a:buClrTx/>
+            </a:pPr>
             <a:r>
               <a:rPr lang="de-DE" dirty="0" smtClean="0"/>
               <a:t>Datenbankentwicklung</a:t>
             </a:r>
           </a:p>
           <a:p>
+            <a:pPr>
+              <a:buClrTx/>
+            </a:pPr>
             <a:r>
               <a:rPr lang="de-DE" dirty="0" smtClean="0"/>
               <a:t>Ergonomisches Design</a:t>
             </a:r>
           </a:p>
           <a:p>
+            <a:pPr>
+              <a:buClrTx/>
+            </a:pPr>
             <a:r>
               <a:rPr lang="de-DE" dirty="0" smtClean="0"/>
               <a:t>Teamarbeit</a:t>
             </a:r>
           </a:p>
           <a:p>
+            <a:pPr>
+              <a:buClrTx/>
+            </a:pPr>
             <a:r>
               <a:rPr lang="de-DE" dirty="0" smtClean="0"/>
               <a:t>Umfangreiche Planung</a:t>
@@ -5437,38 +6700,67 @@
             <p:ph sz="quarter" idx="4"/>
           </p:nvPr>
         </p:nvSpPr>
-        <p:spPr/>
+        <p:spPr>
+          <a:xfrm>
+            <a:off x="4716016" y="2133600"/>
+            <a:ext cx="3452192" cy="2375520"/>
+          </a:xfrm>
+        </p:spPr>
         <p:txBody>
           <a:bodyPr/>
           <a:lstStyle/>
           <a:p>
+            <a:pPr>
+              <a:buClrTx/>
+            </a:pPr>
             <a:r>
               <a:rPr lang="de-DE" dirty="0" smtClean="0"/>
               <a:t>Erweiterbarkeit</a:t>
             </a:r>
           </a:p>
           <a:p>
-            <a:pPr lvl="1"/>
-            <a:r>
-              <a:rPr lang="de-DE" dirty="0" smtClean="0"/>
+            <a:pPr lvl="1">
+              <a:buClrTx/>
+            </a:pPr>
+            <a:r>
+              <a:rPr lang="de-DE" dirty="0" smtClean="0">
+                <a:solidFill>
+                  <a:schemeClr val="tx1"/>
+                </a:solidFill>
+              </a:rPr>
               <a:t>Weitere Entitäten</a:t>
             </a:r>
           </a:p>
           <a:p>
-            <a:pPr lvl="1"/>
-            <a:r>
-              <a:rPr lang="de-DE" dirty="0" smtClean="0"/>
+            <a:pPr lvl="1">
+              <a:buClrTx/>
+            </a:pPr>
+            <a:r>
+              <a:rPr lang="de-DE" dirty="0" smtClean="0">
+                <a:solidFill>
+                  <a:schemeClr val="tx1"/>
+                </a:solidFill>
+              </a:rPr>
               <a:t>Benutzer System</a:t>
             </a:r>
           </a:p>
           <a:p>
-            <a:pPr lvl="1"/>
-            <a:r>
-              <a:rPr lang="de-DE" dirty="0" smtClean="0"/>
+            <a:pPr lvl="1">
+              <a:buClrTx/>
+            </a:pPr>
+            <a:r>
+              <a:rPr lang="de-DE" dirty="0" smtClean="0">
+                <a:solidFill>
+                  <a:schemeClr val="tx1"/>
+                </a:solidFill>
+              </a:rPr>
               <a:t>Design</a:t>
             </a:r>
           </a:p>
           <a:p>
+            <a:pPr>
+              <a:buClrTx/>
+            </a:pPr>
             <a:r>
               <a:rPr lang="de-DE" dirty="0" smtClean="0"/>
               <a:t>Teamarbeit</a:t>
@@ -5502,11 +6794,88 @@
           </a:p>
         </p:txBody>
       </p:sp>
+      <p:cxnSp>
+        <p:nvCxnSpPr>
+          <p:cNvPr id="3" name="Gerade Verbindung 2"/>
+          <p:cNvCxnSpPr/>
+          <p:nvPr/>
+        </p:nvCxnSpPr>
+        <p:spPr>
+          <a:xfrm>
+            <a:off x="549896" y="1988840"/>
+            <a:ext cx="3816424" cy="0"/>
+          </a:xfrm>
+          <a:prstGeom prst="line">
+            <a:avLst/>
+          </a:prstGeom>
+          <a:ln w="15875">
+            <a:solidFill>
+              <a:srgbClr val="3D6A24"/>
+            </a:solidFill>
+          </a:ln>
+        </p:spPr>
+        <p:style>
+          <a:lnRef idx="1">
+            <a:schemeClr val="accent1"/>
+          </a:lnRef>
+          <a:fillRef idx="0">
+            <a:schemeClr val="accent1"/>
+          </a:fillRef>
+          <a:effectRef idx="0">
+            <a:schemeClr val="accent1"/>
+          </a:effectRef>
+          <a:fontRef idx="minor">
+            <a:schemeClr val="tx1"/>
+          </a:fontRef>
+        </p:style>
+      </p:cxnSp>
+      <p:cxnSp>
+        <p:nvCxnSpPr>
+          <p:cNvPr id="13" name="Gerade Verbindung 12"/>
+          <p:cNvCxnSpPr/>
+          <p:nvPr/>
+        </p:nvCxnSpPr>
+        <p:spPr>
+          <a:xfrm>
+            <a:off x="4726360" y="1985086"/>
+            <a:ext cx="3816424" cy="0"/>
+          </a:xfrm>
+          <a:prstGeom prst="line">
+            <a:avLst/>
+          </a:prstGeom>
+          <a:ln w="15875">
+            <a:solidFill>
+              <a:srgbClr val="3D6A24"/>
+            </a:solidFill>
+          </a:ln>
+        </p:spPr>
+        <p:style>
+          <a:lnRef idx="1">
+            <a:schemeClr val="accent1"/>
+          </a:lnRef>
+          <a:fillRef idx="0">
+            <a:schemeClr val="accent1"/>
+          </a:fillRef>
+          <a:effectRef idx="0">
+            <a:schemeClr val="accent1"/>
+          </a:effectRef>
+          <a:fontRef idx="minor">
+            <a:schemeClr val="tx1"/>
+          </a:fontRef>
+        </p:style>
+      </p:cxnSp>
     </p:spTree>
   </p:cSld>
   <p:clrMapOvr>
     <a:masterClrMapping/>
   </p:clrMapOvr>
+  <p:timing>
+    <p:tnLst>
+      <p:par>
+        <p:cTn id="1" dur="indefinite" restart="never" nodeType="tmRoot"/>
+      </p:par>
+    </p:tnLst>
+  </p:timing>
 </p:sld>
 </file>
 
@@ -5544,7 +6913,7 @@
           <a:p>
             <a:r>
               <a:rPr lang="de-DE" dirty="0" smtClean="0"/>
-              <a:t>Quellen</a:t>
+              <a:t>Fragen?</a:t>
             </a:r>
             <a:endParaRPr lang="de-DE" dirty="0"/>
           </a:p>
@@ -5552,12 +6921,12 @@
       </p:sp>
       <p:sp>
         <p:nvSpPr>
-          <p:cNvPr id="7" name="Inhaltsplatzhalter 6"/>
-          <p:cNvSpPr>
-            <a:spLocks noGrp="1"/>
-          </p:cNvSpPr>
-          <p:nvPr>
-            <p:ph sz="quarter" idx="1"/>
+          <p:cNvPr id="5" name="Foliennummernplatzhalter 4"/>
+          <p:cNvSpPr>
+            <a:spLocks noGrp="1"/>
+          </p:cNvSpPr>
+          <p:nvPr>
+            <p:ph type="sldNum" sz="quarter" idx="12"/>
           </p:nvPr>
         </p:nvSpPr>
         <p:spPr/>
@@ -5567,41 +6936,53 @@
           <a:p>
             <a:r>
               <a:rPr lang="de-DE" dirty="0" smtClean="0"/>
-              <a:t>Draw.io (Stand 04.05.2016 12:30)</a:t>
-            </a:r>
-          </a:p>
-          <a:p>
-            <a:endParaRPr lang="de-DE" dirty="0"/>
-          </a:p>
-        </p:txBody>
-      </p:sp>
-      <p:sp>
-        <p:nvSpPr>
-          <p:cNvPr id="9" name="Foliennummernplatzhalter 8"/>
-          <p:cNvSpPr>
-            <a:spLocks noGrp="1"/>
-          </p:cNvSpPr>
-          <p:nvPr>
-            <p:ph type="sldNum" sz="quarter" idx="12"/>
-          </p:nvPr>
-        </p:nvSpPr>
-        <p:spPr/>
-        <p:txBody>
-          <a:bodyPr/>
-          <a:lstStyle/>
-          <a:p>
-            <a:r>
-              <a:rPr lang="de-DE" dirty="0" smtClean="0"/>
-              <a:t>15</a:t>
-            </a:r>
-          </a:p>
-        </p:txBody>
-      </p:sp>
+              <a:t>16</a:t>
+            </a:r>
+          </a:p>
+        </p:txBody>
+      </p:sp>
+      <p:pic>
+        <p:nvPicPr>
+          <p:cNvPr id="4" name="Grafik 3"/>
+          <p:cNvPicPr>
+            <a:picLocks noChangeAspect="1"/>
+          </p:cNvPicPr>
+          <p:nvPr/>
+        </p:nvPicPr>
+        <p:blipFill>
+          <a:blip r:embed="rId3">
+            <a:extLst>
+              <a:ext uri="{28A0092B-C50C-407E-A947-70E740481C1C}">
+                <a14:useLocalDpi xmlns:a14="http://schemas.microsoft.com/office/drawing/2010/main" val="0"/>
+              </a:ext>
+            </a:extLst>
+          </a:blip>
+          <a:stretch>
+            <a:fillRect/>
+          </a:stretch>
+        </p:blipFill>
+        <p:spPr>
+          <a:xfrm>
+            <a:off x="1691680" y="1772816"/>
+            <a:ext cx="5886152" cy="3864506"/>
+          </a:xfrm>
+          <a:prstGeom prst="rect">
+            <a:avLst/>
+          </a:prstGeom>
+        </p:spPr>
+      </p:pic>
     </p:spTree>
   </p:cSld>
   <p:clrMapOvr>
     <a:masterClrMapping/>
   </p:clrMapOvr>
+  <p:timing>
+    <p:tnLst>
+      <p:par>
+        <p:cTn id="1" dur="indefinite" restart="never" nodeType="tmRoot"/>
+      </p:par>
+    </p:tnLst>
+  </p:timing>
 </p:sld>
 </file>
 
@@ -5637,13 +7018,17 @@
           <a:bodyPr/>
           <a:lstStyle/>
           <a:p>
+            <a:r>
+              <a:rPr lang="de-DE" dirty="0" smtClean="0"/>
+              <a:t>Quellen</a:t>
+            </a:r>
             <a:endParaRPr lang="de-DE" dirty="0"/>
           </a:p>
         </p:txBody>
       </p:sp>
       <p:sp>
         <p:nvSpPr>
-          <p:cNvPr id="3" name="Inhaltsplatzhalter 2"/>
+          <p:cNvPr id="7" name="Inhaltsplatzhalter 6"/>
           <p:cNvSpPr>
             <a:spLocks noGrp="1"/>
           </p:cNvSpPr>
@@ -5657,16 +7042,83 @@
           <a:lstStyle/>
           <a:p>
             <a:r>
+              <a:rPr lang="de-DE" dirty="0">
+                <a:hlinkClick r:id="rId2"/>
+              </a:rPr>
+              <a:t>https://www.draw.io/ </a:t>
+            </a:r>
+            <a:r>
               <a:rPr lang="de-DE" dirty="0" smtClean="0"/>
-              <a:t>Noch Fragen?</a:t>
-            </a:r>
+              <a:t>(Abgerufen: 04.05.2016 12:30)</a:t>
+            </a:r>
+          </a:p>
+          <a:p>
+            <a:r>
+              <a:rPr lang="de-DE" dirty="0">
+                <a:hlinkClick r:id="rId3"/>
+              </a:rPr>
+              <a:t>https://</a:t>
+            </a:r>
+            <a:r>
+              <a:rPr lang="de-DE" dirty="0" smtClean="0">
+                <a:hlinkClick r:id="rId3"/>
+              </a:rPr>
+              <a:t>de.wikipedia.org/wiki/Spiralmodell</a:t>
+            </a:r>
+            <a:r>
+              <a:rPr lang="de-DE" dirty="0" smtClean="0"/>
+              <a:t> (Abgerufen: 06.05.2016 17:00</a:t>
+            </a:r>
+            <a:r>
+              <a:rPr lang="de-DE" dirty="0" smtClean="0"/>
+              <a:t>)</a:t>
+            </a:r>
+          </a:p>
+          <a:p>
+            <a:r>
+              <a:rPr lang="de-DE" dirty="0">
+                <a:hlinkClick r:id="rId4"/>
+              </a:rPr>
+              <a:t>https://</a:t>
+            </a:r>
+            <a:r>
+              <a:rPr lang="de-DE" dirty="0" smtClean="0">
+                <a:hlinkClick r:id="rId4"/>
+              </a:rPr>
+              <a:t>de.wikipedia.org/wiki/Schichtenarchitektur</a:t>
+            </a:r>
+            <a:r>
+              <a:rPr lang="de-DE" dirty="0" smtClean="0"/>
+              <a:t> (Abgerufen: 06.05.2016 17:15)</a:t>
+            </a:r>
+          </a:p>
+          <a:p>
+            <a:r>
+              <a:rPr lang="de-DE" dirty="0">
+                <a:hlinkClick r:id="rId5"/>
+              </a:rPr>
+              <a:t>http://</a:t>
+            </a:r>
+            <a:r>
+              <a:rPr lang="de-DE" dirty="0" smtClean="0">
+                <a:hlinkClick r:id="rId5"/>
+              </a:rPr>
+              <a:t>www.bonjourdefrance.com/image/passe-compose-ou-imparfait-grammaire-bdf-19.jpg</a:t>
+            </a:r>
+            <a:r>
+              <a:rPr lang="de-DE" dirty="0" smtClean="0"/>
+              <a:t> (Abgerufen: 06.05.2016 17:15)</a:t>
+            </a:r>
+            <a:endParaRPr lang="de-DE" dirty="0" smtClean="0"/>
+          </a:p>
+          <a:p>
             <a:endParaRPr lang="de-DE" dirty="0"/>
           </a:p>
         </p:txBody>
       </p:sp>
       <p:sp>
         <p:nvSpPr>
-          <p:cNvPr id="5" name="Foliennummernplatzhalter 4"/>
+          <p:cNvPr id="9" name="Foliennummernplatzhalter 8"/>
           <p:cNvSpPr>
             <a:spLocks noGrp="1"/>
           </p:cNvSpPr>
@@ -5681,7 +7133,7 @@
           <a:p>
             <a:r>
               <a:rPr lang="de-DE" dirty="0" smtClean="0"/>
-              <a:t>16</a:t>
+              <a:t>15</a:t>
             </a:r>
           </a:p>
         </p:txBody>
@@ -5691,6 +7143,13 @@
   <p:clrMapOvr>
     <a:masterClrMapping/>
   </p:clrMapOvr>
+  <p:timing>
+    <p:tnLst>
+      <p:par>
+        <p:cTn id="1" dur="indefinite" restart="never" nodeType="tmRoot"/>
+      </p:par>
+    </p:tnLst>
+  </p:timing>
 </p:sld>
 </file>
 
@@ -5719,7 +7178,7 @@
         </p:nvSpPr>
         <p:spPr>
           <a:xfrm>
-            <a:off x="467544" y="1196752"/>
+            <a:off x="2339752" y="1268760"/>
             <a:ext cx="4536504" cy="4896544"/>
           </a:xfrm>
           <a:prstGeom prst="rect">
@@ -5767,7 +7226,7 @@
         </p:nvSpPr>
         <p:spPr>
           <a:xfrm>
-            <a:off x="467544" y="2132856"/>
+            <a:off x="2339752" y="2230501"/>
             <a:ext cx="4536504" cy="360040"/>
           </a:xfrm>
           <a:prstGeom prst="rect">
@@ -5819,7 +7278,7 @@
         </p:nvSpPr>
         <p:spPr>
           <a:xfrm>
-            <a:off x="467544" y="1196752"/>
+            <a:off x="2339752" y="1268760"/>
             <a:ext cx="4536504" cy="360040"/>
           </a:xfrm>
           <a:prstGeom prst="rect">
@@ -5894,7 +7353,7 @@
         </p:nvSpPr>
         <p:spPr>
           <a:xfrm>
-            <a:off x="453583" y="3679910"/>
+            <a:off x="2339752" y="3751918"/>
             <a:ext cx="4536504" cy="360040"/>
           </a:xfrm>
           <a:prstGeom prst="rect">
@@ -5946,7 +7405,7 @@
         </p:nvSpPr>
         <p:spPr>
           <a:xfrm>
-            <a:off x="467544" y="4941168"/>
+            <a:off x="2339752" y="5013176"/>
             <a:ext cx="4536504" cy="360040"/>
           </a:xfrm>
           <a:prstGeom prst="rect">
@@ -6002,7 +7461,7 @@
         </p:nvSpPr>
         <p:spPr>
           <a:xfrm>
-            <a:off x="457200" y="1219200"/>
+            <a:off x="2329408" y="1291208"/>
             <a:ext cx="4402832" cy="4937760"/>
           </a:xfrm>
         </p:spPr>
@@ -6055,11 +7514,6 @@
               </a:rPr>
               <a:t>Zeitplan</a:t>
             </a:r>
-            <a:endParaRPr lang="de-DE" dirty="0" smtClean="0">
-              <a:solidFill>
-                <a:schemeClr val="tx1"/>
-              </a:solidFill>
-            </a:endParaRPr>
           </a:p>
           <a:p>
             <a:pPr lvl="1"/>
@@ -6191,6 +7645,13 @@
   <p:clrMapOvr>
     <a:masterClrMapping/>
   </p:clrMapOvr>
+  <p:timing>
+    <p:tnLst>
+      <p:par>
+        <p:cTn id="1" dur="indefinite" restart="never" nodeType="tmRoot"/>
+      </p:par>
+    </p:tnLst>
+  </p:timing>
 </p:sld>
 </file>
 
@@ -6213,6 +7674,158 @@
       </p:grpSpPr>
       <p:sp>
         <p:nvSpPr>
+          <p:cNvPr id="7" name="Rechteck 6"/>
+          <p:cNvSpPr/>
+          <p:nvPr/>
+        </p:nvSpPr>
+        <p:spPr>
+          <a:xfrm>
+            <a:off x="2339752" y="1268760"/>
+            <a:ext cx="4536504" cy="4896544"/>
+          </a:xfrm>
+          <a:prstGeom prst="rect">
+            <a:avLst/>
+          </a:prstGeom>
+          <a:solidFill>
+            <a:schemeClr val="bg1"/>
+          </a:solidFill>
+          <a:ln>
+            <a:solidFill>
+              <a:schemeClr val="tx1"/>
+            </a:solidFill>
+          </a:ln>
+        </p:spPr>
+        <p:style>
+          <a:lnRef idx="2">
+            <a:schemeClr val="accent1">
+              <a:shade val="50000"/>
+            </a:schemeClr>
+          </a:lnRef>
+          <a:fillRef idx="1">
+            <a:schemeClr val="accent1"/>
+          </a:fillRef>
+          <a:effectRef idx="0">
+            <a:schemeClr val="accent1"/>
+          </a:effectRef>
+          <a:fontRef idx="minor">
+            <a:schemeClr val="lt1"/>
+          </a:fontRef>
+        </p:style>
+        <p:txBody>
+          <a:bodyPr rtlCol="0" anchor="ctr"/>
+          <a:lstStyle/>
+          <a:p>
+            <a:pPr algn="ctr"/>
+            <a:endParaRPr lang="de-DE"/>
+          </a:p>
+        </p:txBody>
+      </p:sp>
+      <p:sp>
+        <p:nvSpPr>
+          <p:cNvPr id="9" name="Rechteck 8"/>
+          <p:cNvSpPr/>
+          <p:nvPr/>
+        </p:nvSpPr>
+        <p:spPr>
+          <a:xfrm>
+            <a:off x="2339752" y="2230501"/>
+            <a:ext cx="4536504" cy="360040"/>
+          </a:xfrm>
+          <a:prstGeom prst="rect">
+            <a:avLst/>
+          </a:prstGeom>
+          <a:gradFill flip="none" rotWithShape="1">
+            <a:gsLst>
+              <a:gs pos="0">
+                <a:srgbClr val="97D077"/>
+              </a:gs>
+              <a:gs pos="100000">
+                <a:srgbClr val="C6E5B5"/>
+              </a:gs>
+            </a:gsLst>
+            <a:lin ang="16200000" scaled="1"/>
+            <a:tileRect/>
+          </a:gradFill>
+        </p:spPr>
+        <p:style>
+          <a:lnRef idx="2">
+            <a:schemeClr val="accent1">
+              <a:shade val="50000"/>
+            </a:schemeClr>
+          </a:lnRef>
+          <a:fillRef idx="1">
+            <a:schemeClr val="accent1"/>
+          </a:fillRef>
+          <a:effectRef idx="0">
+            <a:schemeClr val="accent1"/>
+          </a:effectRef>
+          <a:fontRef idx="minor">
+            <a:schemeClr val="lt1"/>
+          </a:fontRef>
+        </p:style>
+        <p:txBody>
+          <a:bodyPr rtlCol="0" anchor="ctr"/>
+          <a:lstStyle/>
+          <a:p>
+            <a:pPr algn="ctr"/>
+            <a:endParaRPr lang="de-DE"/>
+          </a:p>
+        </p:txBody>
+      </p:sp>
+      <p:sp>
+        <p:nvSpPr>
+          <p:cNvPr id="8" name="Rechteck 7"/>
+          <p:cNvSpPr/>
+          <p:nvPr/>
+        </p:nvSpPr>
+        <p:spPr>
+          <a:xfrm>
+            <a:off x="2339752" y="1268760"/>
+            <a:ext cx="4536504" cy="360040"/>
+          </a:xfrm>
+          <a:prstGeom prst="rect">
+            <a:avLst/>
+          </a:prstGeom>
+          <a:gradFill flip="none" rotWithShape="1">
+            <a:gsLst>
+              <a:gs pos="0">
+                <a:srgbClr val="97D077"/>
+              </a:gs>
+              <a:gs pos="100000">
+                <a:srgbClr val="C6E5B5"/>
+              </a:gs>
+            </a:gsLst>
+            <a:lin ang="16200000" scaled="1"/>
+            <a:tileRect/>
+          </a:gradFill>
+        </p:spPr>
+        <p:style>
+          <a:lnRef idx="2">
+            <a:schemeClr val="accent1">
+              <a:shade val="50000"/>
+            </a:schemeClr>
+          </a:lnRef>
+          <a:fillRef idx="1">
+            <a:schemeClr val="accent1"/>
+          </a:fillRef>
+          <a:effectRef idx="0">
+            <a:schemeClr val="accent1"/>
+          </a:effectRef>
+          <a:fontRef idx="minor">
+            <a:schemeClr val="lt1"/>
+          </a:fontRef>
+        </p:style>
+        <p:txBody>
+          <a:bodyPr rtlCol="0" anchor="ctr"/>
+          <a:lstStyle/>
+          <a:p>
+            <a:pPr algn="ctr"/>
+            <a:endParaRPr lang="de-DE"/>
+          </a:p>
+        </p:txBody>
+      </p:sp>
+      <p:sp>
+        <p:nvSpPr>
           <p:cNvPr id="2" name="Titel 1"/>
           <p:cNvSpPr>
             <a:spLocks noGrp="1"/>
@@ -6224,24 +7837,339 @@
         <p:spPr/>
         <p:txBody>
           <a:bodyPr/>
+          <a:lstStyle/>
+          <a:p>
+            <a:r>
+              <a:rPr lang="de-DE" dirty="0" smtClean="0"/>
+              <a:t>Gliederung</a:t>
+            </a:r>
+            <a:endParaRPr lang="de-DE" dirty="0"/>
+          </a:p>
+        </p:txBody>
+      </p:sp>
+      <p:sp>
+        <p:nvSpPr>
+          <p:cNvPr id="10" name="Rechteck 9"/>
+          <p:cNvSpPr/>
+          <p:nvPr/>
+        </p:nvSpPr>
+        <p:spPr>
+          <a:xfrm>
+            <a:off x="2339752" y="3751918"/>
+            <a:ext cx="4536504" cy="360040"/>
+          </a:xfrm>
+          <a:prstGeom prst="rect">
+            <a:avLst/>
+          </a:prstGeom>
+          <a:gradFill flip="none" rotWithShape="1">
+            <a:gsLst>
+              <a:gs pos="0">
+                <a:srgbClr val="97D077"/>
+              </a:gs>
+              <a:gs pos="100000">
+                <a:srgbClr val="C6E5B5"/>
+              </a:gs>
+            </a:gsLst>
+            <a:lin ang="16200000" scaled="1"/>
+            <a:tileRect/>
+          </a:gradFill>
+        </p:spPr>
+        <p:style>
+          <a:lnRef idx="2">
+            <a:schemeClr val="accent1">
+              <a:shade val="50000"/>
+            </a:schemeClr>
+          </a:lnRef>
+          <a:fillRef idx="1">
+            <a:schemeClr val="accent1"/>
+          </a:fillRef>
+          <a:effectRef idx="0">
+            <a:schemeClr val="accent1"/>
+          </a:effectRef>
+          <a:fontRef idx="minor">
+            <a:schemeClr val="lt1"/>
+          </a:fontRef>
+        </p:style>
+        <p:txBody>
+          <a:bodyPr rtlCol="0" anchor="ctr"/>
+          <a:lstStyle/>
+          <a:p>
+            <a:pPr algn="ctr"/>
+            <a:endParaRPr lang="de-DE"/>
+          </a:p>
+        </p:txBody>
+      </p:sp>
+      <p:sp>
+        <p:nvSpPr>
+          <p:cNvPr id="11" name="Rechteck 10"/>
+          <p:cNvSpPr/>
+          <p:nvPr/>
+        </p:nvSpPr>
+        <p:spPr>
+          <a:xfrm>
+            <a:off x="2339752" y="5013176"/>
+            <a:ext cx="4536504" cy="360040"/>
+          </a:xfrm>
+          <a:prstGeom prst="rect">
+            <a:avLst/>
+          </a:prstGeom>
+          <a:gradFill flip="none" rotWithShape="1">
+            <a:gsLst>
+              <a:gs pos="0">
+                <a:srgbClr val="97D077"/>
+              </a:gs>
+              <a:gs pos="100000">
+                <a:srgbClr val="C6E5B5"/>
+              </a:gs>
+            </a:gsLst>
+            <a:lin ang="16200000" scaled="1"/>
+            <a:tileRect/>
+          </a:gradFill>
+        </p:spPr>
+        <p:style>
+          <a:lnRef idx="2">
+            <a:schemeClr val="accent1">
+              <a:shade val="50000"/>
+            </a:schemeClr>
+          </a:lnRef>
+          <a:fillRef idx="1">
+            <a:schemeClr val="accent1"/>
+          </a:fillRef>
+          <a:effectRef idx="0">
+            <a:schemeClr val="accent1"/>
+          </a:effectRef>
+          <a:fontRef idx="minor">
+            <a:schemeClr val="lt1"/>
+          </a:fontRef>
+        </p:style>
+        <p:txBody>
+          <a:bodyPr rtlCol="0" anchor="ctr"/>
+          <a:lstStyle/>
+          <a:p>
+            <a:pPr algn="ctr"/>
+            <a:endParaRPr lang="de-DE"/>
+          </a:p>
+        </p:txBody>
+      </p:sp>
+      <p:sp>
+        <p:nvSpPr>
+          <p:cNvPr id="12" name="Rechteck 11"/>
+          <p:cNvSpPr/>
+          <p:nvPr/>
+        </p:nvSpPr>
+        <p:spPr>
+          <a:xfrm>
+            <a:off x="2339752" y="1631915"/>
+            <a:ext cx="4536504" cy="598585"/>
+          </a:xfrm>
+          <a:prstGeom prst="rect">
+            <a:avLst/>
+          </a:prstGeom>
+          <a:solidFill>
+            <a:srgbClr val="E5F3DD"/>
+          </a:solidFill>
+        </p:spPr>
+        <p:style>
+          <a:lnRef idx="2">
+            <a:schemeClr val="accent1">
+              <a:shade val="50000"/>
+            </a:schemeClr>
+          </a:lnRef>
+          <a:fillRef idx="1">
+            <a:schemeClr val="accent1"/>
+          </a:fillRef>
+          <a:effectRef idx="0">
+            <a:schemeClr val="accent1"/>
+          </a:effectRef>
+          <a:fontRef idx="minor">
+            <a:schemeClr val="lt1"/>
+          </a:fontRef>
+        </p:style>
+        <p:txBody>
+          <a:bodyPr rtlCol="0" anchor="ctr"/>
+          <a:lstStyle/>
+          <a:p>
+            <a:pPr algn="ctr"/>
+            <a:endParaRPr lang="de-DE"/>
+          </a:p>
+        </p:txBody>
+      </p:sp>
+      <p:sp>
+        <p:nvSpPr>
+          <p:cNvPr id="3" name="Inhaltsplatzhalter 2"/>
+          <p:cNvSpPr>
+            <a:spLocks noGrp="1"/>
+          </p:cNvSpPr>
+          <p:nvPr>
+            <p:ph sz="quarter" idx="1"/>
+          </p:nvPr>
+        </p:nvSpPr>
+        <p:spPr>
+          <a:xfrm>
+            <a:off x="2329408" y="1291208"/>
+            <a:ext cx="4402832" cy="4937760"/>
+          </a:xfrm>
+        </p:spPr>
+        <p:txBody>
+          <a:bodyPr>
+            <a:normAutofit fontScale="85000" lnSpcReduction="20000"/>
+          </a:bodyPr>
           <a:lstStyle/>
           <a:p>
             <a:r>
               <a:rPr lang="de-DE" dirty="0" smtClean="0"/>
               <a:t>Einleitung</a:t>
             </a:r>
-            <a:endParaRPr lang="de-DE" dirty="0"/>
-          </a:p>
-        </p:txBody>
-      </p:sp>
-      <p:sp>
-        <p:nvSpPr>
-          <p:cNvPr id="3" name="Inhaltsplatzhalter 2"/>
-          <p:cNvSpPr>
-            <a:spLocks noGrp="1"/>
-          </p:cNvSpPr>
-          <p:nvPr>
-            <p:ph sz="quarter" idx="1"/>
+          </a:p>
+          <a:p>
+            <a:pPr lvl="1"/>
+            <a:r>
+              <a:rPr lang="de-DE" dirty="0" smtClean="0">
+                <a:solidFill>
+                  <a:schemeClr val="tx1"/>
+                </a:solidFill>
+              </a:rPr>
+              <a:t>Thematik</a:t>
+            </a:r>
+          </a:p>
+          <a:p>
+            <a:pPr lvl="1"/>
+            <a:r>
+              <a:rPr lang="de-DE" dirty="0" smtClean="0">
+                <a:solidFill>
+                  <a:schemeClr val="tx1"/>
+                </a:solidFill>
+              </a:rPr>
+              <a:t>Anforderungen</a:t>
+            </a:r>
+          </a:p>
+          <a:p>
+            <a:r>
+              <a:rPr lang="de-DE" dirty="0" smtClean="0"/>
+              <a:t>Planung</a:t>
+            </a:r>
+          </a:p>
+          <a:p>
+            <a:pPr lvl="1"/>
+            <a:r>
+              <a:rPr lang="de-DE" dirty="0" smtClean="0">
+                <a:solidFill>
+                  <a:schemeClr val="tx1"/>
+                </a:solidFill>
+              </a:rPr>
+              <a:t>Zeitplan</a:t>
+            </a:r>
+          </a:p>
+          <a:p>
+            <a:pPr lvl="1"/>
+            <a:r>
+              <a:rPr lang="de-DE" dirty="0" smtClean="0">
+                <a:solidFill>
+                  <a:schemeClr val="tx1"/>
+                </a:solidFill>
+              </a:rPr>
+              <a:t>Vorgehensmodelle</a:t>
+            </a:r>
+          </a:p>
+          <a:p>
+            <a:pPr lvl="2"/>
+            <a:r>
+              <a:rPr lang="de-DE" sz="2100" dirty="0" smtClean="0"/>
+              <a:t>Spiralmodell</a:t>
+            </a:r>
+          </a:p>
+          <a:p>
+            <a:pPr lvl="2"/>
+            <a:r>
+              <a:rPr lang="de-DE" sz="2100" dirty="0" smtClean="0"/>
+              <a:t>Test </a:t>
+            </a:r>
+            <a:r>
+              <a:rPr lang="de-DE" sz="2100" dirty="0" err="1" smtClean="0"/>
+              <a:t>Driven</a:t>
+            </a:r>
+            <a:r>
+              <a:rPr lang="de-DE" sz="2100" dirty="0" smtClean="0"/>
+              <a:t> Development (TDD)</a:t>
+            </a:r>
+          </a:p>
+          <a:p>
+            <a:r>
+              <a:rPr lang="de-DE" dirty="0" smtClean="0"/>
+              <a:t>Entwurf</a:t>
+            </a:r>
+          </a:p>
+          <a:p>
+            <a:pPr lvl="1"/>
+            <a:r>
+              <a:rPr lang="de-DE" dirty="0" smtClean="0">
+                <a:solidFill>
+                  <a:schemeClr val="tx1"/>
+                </a:solidFill>
+              </a:rPr>
+              <a:t>Architekturdesign</a:t>
+            </a:r>
+          </a:p>
+          <a:p>
+            <a:pPr lvl="1"/>
+            <a:r>
+              <a:rPr lang="de-DE" dirty="0" smtClean="0">
+                <a:solidFill>
+                  <a:schemeClr val="tx1"/>
+                </a:solidFill>
+              </a:rPr>
+              <a:t>Datenbankentwurf</a:t>
+            </a:r>
+          </a:p>
+          <a:p>
+            <a:pPr lvl="1"/>
+            <a:r>
+              <a:rPr lang="de-DE" dirty="0" smtClean="0">
+                <a:solidFill>
+                  <a:schemeClr val="tx1"/>
+                </a:solidFill>
+              </a:rPr>
+              <a:t>Pflichtenheft</a:t>
+            </a:r>
+          </a:p>
+          <a:p>
+            <a:r>
+              <a:rPr lang="de-DE" dirty="0" smtClean="0"/>
+              <a:t>Fazit</a:t>
+            </a:r>
+          </a:p>
+          <a:p>
+            <a:pPr lvl="1"/>
+            <a:r>
+              <a:rPr lang="de-DE" dirty="0" smtClean="0">
+                <a:solidFill>
+                  <a:schemeClr val="tx1"/>
+                </a:solidFill>
+              </a:rPr>
+              <a:t>Gewonnenes</a:t>
+            </a:r>
+          </a:p>
+          <a:p>
+            <a:pPr lvl="1"/>
+            <a:r>
+              <a:rPr lang="de-DE" dirty="0" smtClean="0">
+                <a:solidFill>
+                  <a:schemeClr val="tx1"/>
+                </a:solidFill>
+              </a:rPr>
+              <a:t>Ausblick</a:t>
+            </a:r>
+          </a:p>
+        </p:txBody>
+      </p:sp>
+      <p:sp>
+        <p:nvSpPr>
+          <p:cNvPr id="5" name="Foliennummernplatzhalter 4"/>
+          <p:cNvSpPr>
+            <a:spLocks noGrp="1"/>
+          </p:cNvSpPr>
+          <p:nvPr>
+            <p:ph type="sldNum" sz="quarter" idx="12"/>
           </p:nvPr>
         </p:nvSpPr>
         <p:spPr/>
@@ -6249,38 +8177,112 @@
           <a:bodyPr/>
           <a:lstStyle/>
           <a:p>
-            <a:endParaRPr lang="de-DE" dirty="0"/>
-          </a:p>
-        </p:txBody>
-      </p:sp>
-      <p:sp>
-        <p:nvSpPr>
-          <p:cNvPr id="5" name="Foliennummernplatzhalter 4"/>
-          <p:cNvSpPr>
-            <a:spLocks noGrp="1"/>
-          </p:cNvSpPr>
-          <p:nvPr>
-            <p:ph type="sldNum" sz="quarter" idx="12"/>
-          </p:nvPr>
-        </p:nvSpPr>
-        <p:spPr/>
-        <p:txBody>
-          <a:bodyPr/>
-          <a:lstStyle/>
-          <a:p>
-            <a:r>
-              <a:rPr lang="de-DE" dirty="0" smtClean="0"/>
+            <a:r>
+              <a:rPr lang="de-DE" dirty="0"/>
               <a:t>2</a:t>
             </a:r>
-            <a:endParaRPr lang="de-DE" dirty="0"/>
           </a:p>
         </p:txBody>
       </p:sp>
     </p:spTree>
+    <p:extLst>
+      <p:ext uri="{BB962C8B-B14F-4D97-AF65-F5344CB8AC3E}">
+        <p14:creationId xmlns:p14="http://schemas.microsoft.com/office/powerpoint/2010/main" val="3122826872"/>
+      </p:ext>
+    </p:extLst>
   </p:cSld>
   <p:clrMapOvr>
     <a:masterClrMapping/>
   </p:clrMapOvr>
+  <p:timing>
+    <p:tnLst>
+      <p:par>
+        <p:cTn id="1" dur="indefinite" restart="never" nodeType="tmRoot">
+          <p:childTnLst>
+            <p:seq concurrent="1" nextAc="seek">
+              <p:cTn id="2" dur="indefinite" nodeType="mainSeq">
+                <p:childTnLst>
+                  <p:par>
+                    <p:cTn id="3" fill="hold">
+                      <p:stCondLst>
+                        <p:cond delay="indefinite"/>
+                        <p:cond evt="onBegin" delay="0">
+                          <p:tn val="2"/>
+                        </p:cond>
+                      </p:stCondLst>
+                      <p:childTnLst>
+                        <p:par>
+                          <p:cTn id="4" fill="hold">
+                            <p:stCondLst>
+                              <p:cond delay="0"/>
+                            </p:stCondLst>
+                            <p:childTnLst>
+                              <p:par>
+                                <p:cTn id="5" presetID="10" presetClass="entr" presetSubtype="0" fill="hold" grpId="0" nodeType="withEffect">
+                                  <p:stCondLst>
+                                    <p:cond delay="0"/>
+                                  </p:stCondLst>
+                                  <p:childTnLst>
+                                    <p:set>
+                                      <p:cBhvr>
+                                        <p:cTn id="6" dur="1" fill="hold">
+                                          <p:stCondLst>
+                                            <p:cond delay="0"/>
+                                          </p:stCondLst>
+                                        </p:cTn>
+                                        <p:tgtEl>
+                                          <p:spTgt spid="12"/>
+                                        </p:tgtEl>
+                                        <p:attrNameLst>
+                                          <p:attrName>style.visibility</p:attrName>
+                                        </p:attrNameLst>
+                                      </p:cBhvr>
+                                      <p:to>
+                                        <p:strVal val="visible"/>
+                                      </p:to>
+                                    </p:set>
+                                    <p:animEffect transition="in" filter="fade">
+                                      <p:cBhvr>
+                                        <p:cTn id="7" dur="750"/>
+                                        <p:tgtEl>
+                                          <p:spTgt spid="12"/>
+                                        </p:tgtEl>
+                                      </p:cBhvr>
+                                    </p:animEffect>
+                                  </p:childTnLst>
+                                </p:cTn>
+                              </p:par>
+                            </p:childTnLst>
+                          </p:cTn>
+                        </p:par>
+                      </p:childTnLst>
+                    </p:cTn>
+                  </p:par>
+                </p:childTnLst>
+              </p:cTn>
+              <p:prevCondLst>
+                <p:cond evt="onPrev" delay="0">
+                  <p:tgtEl>
+                    <p:sldTgt/>
+                  </p:tgtEl>
+                </p:cond>
+              </p:prevCondLst>
+              <p:nextCondLst>
+                <p:cond evt="onNext" delay="0">
+                  <p:tgtEl>
+                    <p:sldTgt/>
+                  </p:tgtEl>
+                </p:cond>
+              </p:nextCondLst>
+            </p:seq>
+          </p:childTnLst>
+        </p:cTn>
+      </p:par>
+    </p:tnLst>
+    <p:bldLst>
+      <p:bldP spid="12" grpId="0" animBg="1"/>
+    </p:bldLst>
+  </p:timing>
 </p:sld>
 </file>
 
@@ -6363,6 +8365,12 @@
             </a:r>
           </a:p>
           <a:p>
+            <a:r>
+              <a:rPr lang="de-DE" dirty="0" smtClean="0"/>
+              <a:t>Verschiedene Anwendungen</a:t>
+            </a:r>
+          </a:p>
+          <a:p>
             <a:endParaRPr lang="de-DE" dirty="0" smtClean="0"/>
           </a:p>
         </p:txBody>
@@ -6395,6 +8403,13 @@
   <p:clrMapOvr>
     <a:masterClrMapping/>
   </p:clrMapOvr>
+  <p:timing>
+    <p:tnLst>
+      <p:par>
+        <p:cTn id="1" dur="indefinite" restart="never" nodeType="tmRoot"/>
+      </p:par>
+    </p:tnLst>
+  </p:timing>
 </p:sld>
 </file>
 
@@ -6521,6 +8536,13 @@
   <p:clrMapOvr>
     <a:masterClrMapping/>
   </p:clrMapOvr>
+  <p:timing>
+    <p:tnLst>
+      <p:par>
+        <p:cTn id="1" dur="indefinite" restart="never" nodeType="tmRoot"/>
+      </p:par>
+    </p:tnLst>
+  </p:timing>
 </p:sld>
 </file>
 
@@ -6543,6 +8565,158 @@
       </p:grpSpPr>
       <p:sp>
         <p:nvSpPr>
+          <p:cNvPr id="7" name="Rechteck 6"/>
+          <p:cNvSpPr/>
+          <p:nvPr/>
+        </p:nvSpPr>
+        <p:spPr>
+          <a:xfrm>
+            <a:off x="2339752" y="1268760"/>
+            <a:ext cx="4536504" cy="4896544"/>
+          </a:xfrm>
+          <a:prstGeom prst="rect">
+            <a:avLst/>
+          </a:prstGeom>
+          <a:solidFill>
+            <a:schemeClr val="bg1"/>
+          </a:solidFill>
+          <a:ln>
+            <a:solidFill>
+              <a:schemeClr val="tx1"/>
+            </a:solidFill>
+          </a:ln>
+        </p:spPr>
+        <p:style>
+          <a:lnRef idx="2">
+            <a:schemeClr val="accent1">
+              <a:shade val="50000"/>
+            </a:schemeClr>
+          </a:lnRef>
+          <a:fillRef idx="1">
+            <a:schemeClr val="accent1"/>
+          </a:fillRef>
+          <a:effectRef idx="0">
+            <a:schemeClr val="accent1"/>
+          </a:effectRef>
+          <a:fontRef idx="minor">
+            <a:schemeClr val="lt1"/>
+          </a:fontRef>
+        </p:style>
+        <p:txBody>
+          <a:bodyPr rtlCol="0" anchor="ctr"/>
+          <a:lstStyle/>
+          <a:p>
+            <a:pPr algn="ctr"/>
+            <a:endParaRPr lang="de-DE"/>
+          </a:p>
+        </p:txBody>
+      </p:sp>
+      <p:sp>
+        <p:nvSpPr>
+          <p:cNvPr id="9" name="Rechteck 8"/>
+          <p:cNvSpPr/>
+          <p:nvPr/>
+        </p:nvSpPr>
+        <p:spPr>
+          <a:xfrm>
+            <a:off x="2339752" y="2230501"/>
+            <a:ext cx="4536504" cy="360040"/>
+          </a:xfrm>
+          <a:prstGeom prst="rect">
+            <a:avLst/>
+          </a:prstGeom>
+          <a:gradFill flip="none" rotWithShape="1">
+            <a:gsLst>
+              <a:gs pos="0">
+                <a:srgbClr val="97D077"/>
+              </a:gs>
+              <a:gs pos="100000">
+                <a:srgbClr val="C6E5B5"/>
+              </a:gs>
+            </a:gsLst>
+            <a:lin ang="16200000" scaled="1"/>
+            <a:tileRect/>
+          </a:gradFill>
+        </p:spPr>
+        <p:style>
+          <a:lnRef idx="2">
+            <a:schemeClr val="accent1">
+              <a:shade val="50000"/>
+            </a:schemeClr>
+          </a:lnRef>
+          <a:fillRef idx="1">
+            <a:schemeClr val="accent1"/>
+          </a:fillRef>
+          <a:effectRef idx="0">
+            <a:schemeClr val="accent1"/>
+          </a:effectRef>
+          <a:fontRef idx="minor">
+            <a:schemeClr val="lt1"/>
+          </a:fontRef>
+        </p:style>
+        <p:txBody>
+          <a:bodyPr rtlCol="0" anchor="ctr"/>
+          <a:lstStyle/>
+          <a:p>
+            <a:pPr algn="ctr"/>
+            <a:endParaRPr lang="de-DE"/>
+          </a:p>
+        </p:txBody>
+      </p:sp>
+      <p:sp>
+        <p:nvSpPr>
+          <p:cNvPr id="8" name="Rechteck 7"/>
+          <p:cNvSpPr/>
+          <p:nvPr/>
+        </p:nvSpPr>
+        <p:spPr>
+          <a:xfrm>
+            <a:off x="2339752" y="1268760"/>
+            <a:ext cx="4536504" cy="360040"/>
+          </a:xfrm>
+          <a:prstGeom prst="rect">
+            <a:avLst/>
+          </a:prstGeom>
+          <a:gradFill flip="none" rotWithShape="1">
+            <a:gsLst>
+              <a:gs pos="0">
+                <a:srgbClr val="97D077"/>
+              </a:gs>
+              <a:gs pos="100000">
+                <a:srgbClr val="C6E5B5"/>
+              </a:gs>
+            </a:gsLst>
+            <a:lin ang="16200000" scaled="1"/>
+            <a:tileRect/>
+          </a:gradFill>
+        </p:spPr>
+        <p:style>
+          <a:lnRef idx="2">
+            <a:schemeClr val="accent1">
+              <a:shade val="50000"/>
+            </a:schemeClr>
+          </a:lnRef>
+          <a:fillRef idx="1">
+            <a:schemeClr val="accent1"/>
+          </a:fillRef>
+          <a:effectRef idx="0">
+            <a:schemeClr val="accent1"/>
+          </a:effectRef>
+          <a:fontRef idx="minor">
+            <a:schemeClr val="lt1"/>
+          </a:fontRef>
+        </p:style>
+        <p:txBody>
+          <a:bodyPr rtlCol="0" anchor="ctr"/>
+          <a:lstStyle/>
+          <a:p>
+            <a:pPr algn="ctr"/>
+            <a:endParaRPr lang="de-DE"/>
+          </a:p>
+        </p:txBody>
+      </p:sp>
+      <p:sp>
+        <p:nvSpPr>
           <p:cNvPr id="2" name="Titel 1"/>
           <p:cNvSpPr>
             <a:spLocks noGrp="1"/>
@@ -6553,35 +8727,329 @@
         </p:nvSpPr>
         <p:spPr/>
         <p:txBody>
+          <a:bodyPr/>
+          <a:lstStyle/>
+          <a:p>
+            <a:r>
+              <a:rPr lang="de-DE" dirty="0" smtClean="0"/>
+              <a:t>Gliederung</a:t>
+            </a:r>
+            <a:endParaRPr lang="de-DE" dirty="0"/>
+          </a:p>
+        </p:txBody>
+      </p:sp>
+      <p:sp>
+        <p:nvSpPr>
+          <p:cNvPr id="10" name="Rechteck 9"/>
+          <p:cNvSpPr/>
+          <p:nvPr/>
+        </p:nvSpPr>
+        <p:spPr>
+          <a:xfrm>
+            <a:off x="2339752" y="3751918"/>
+            <a:ext cx="4536504" cy="360040"/>
+          </a:xfrm>
+          <a:prstGeom prst="rect">
+            <a:avLst/>
+          </a:prstGeom>
+          <a:gradFill flip="none" rotWithShape="1">
+            <a:gsLst>
+              <a:gs pos="0">
+                <a:srgbClr val="97D077"/>
+              </a:gs>
+              <a:gs pos="100000">
+                <a:srgbClr val="C6E5B5"/>
+              </a:gs>
+            </a:gsLst>
+            <a:lin ang="16200000" scaled="1"/>
+            <a:tileRect/>
+          </a:gradFill>
+        </p:spPr>
+        <p:style>
+          <a:lnRef idx="2">
+            <a:schemeClr val="accent1">
+              <a:shade val="50000"/>
+            </a:schemeClr>
+          </a:lnRef>
+          <a:fillRef idx="1">
+            <a:schemeClr val="accent1"/>
+          </a:fillRef>
+          <a:effectRef idx="0">
+            <a:schemeClr val="accent1"/>
+          </a:effectRef>
+          <a:fontRef idx="minor">
+            <a:schemeClr val="lt1"/>
+          </a:fontRef>
+        </p:style>
+        <p:txBody>
+          <a:bodyPr rtlCol="0" anchor="ctr"/>
+          <a:lstStyle/>
+          <a:p>
+            <a:pPr algn="ctr"/>
+            <a:endParaRPr lang="de-DE"/>
+          </a:p>
+        </p:txBody>
+      </p:sp>
+      <p:sp>
+        <p:nvSpPr>
+          <p:cNvPr id="11" name="Rechteck 10"/>
+          <p:cNvSpPr/>
+          <p:nvPr/>
+        </p:nvSpPr>
+        <p:spPr>
+          <a:xfrm>
+            <a:off x="2339752" y="5013176"/>
+            <a:ext cx="4536504" cy="360040"/>
+          </a:xfrm>
+          <a:prstGeom prst="rect">
+            <a:avLst/>
+          </a:prstGeom>
+          <a:gradFill flip="none" rotWithShape="1">
+            <a:gsLst>
+              <a:gs pos="0">
+                <a:srgbClr val="97D077"/>
+              </a:gs>
+              <a:gs pos="100000">
+                <a:srgbClr val="C6E5B5"/>
+              </a:gs>
+            </a:gsLst>
+            <a:lin ang="16200000" scaled="1"/>
+            <a:tileRect/>
+          </a:gradFill>
+        </p:spPr>
+        <p:style>
+          <a:lnRef idx="2">
+            <a:schemeClr val="accent1">
+              <a:shade val="50000"/>
+            </a:schemeClr>
+          </a:lnRef>
+          <a:fillRef idx="1">
+            <a:schemeClr val="accent1"/>
+          </a:fillRef>
+          <a:effectRef idx="0">
+            <a:schemeClr val="accent1"/>
+          </a:effectRef>
+          <a:fontRef idx="minor">
+            <a:schemeClr val="lt1"/>
+          </a:fontRef>
+        </p:style>
+        <p:txBody>
+          <a:bodyPr rtlCol="0" anchor="ctr"/>
+          <a:lstStyle/>
+          <a:p>
+            <a:pPr algn="ctr"/>
+            <a:endParaRPr lang="de-DE"/>
+          </a:p>
+        </p:txBody>
+      </p:sp>
+      <p:sp>
+        <p:nvSpPr>
+          <p:cNvPr id="12" name="Rechteck 11"/>
+          <p:cNvSpPr/>
+          <p:nvPr/>
+        </p:nvSpPr>
+        <p:spPr>
+          <a:xfrm>
+            <a:off x="2339752" y="2588754"/>
+            <a:ext cx="4536504" cy="1163164"/>
+          </a:xfrm>
+          <a:prstGeom prst="rect">
+            <a:avLst/>
+          </a:prstGeom>
+          <a:solidFill>
+            <a:srgbClr val="E5F3DD"/>
+          </a:solidFill>
+        </p:spPr>
+        <p:style>
+          <a:lnRef idx="2">
+            <a:schemeClr val="accent1">
+              <a:shade val="50000"/>
+            </a:schemeClr>
+          </a:lnRef>
+          <a:fillRef idx="1">
+            <a:schemeClr val="accent1"/>
+          </a:fillRef>
+          <a:effectRef idx="0">
+            <a:schemeClr val="accent1"/>
+          </a:effectRef>
+          <a:fontRef idx="minor">
+            <a:schemeClr val="lt1"/>
+          </a:fontRef>
+        </p:style>
+        <p:txBody>
+          <a:bodyPr rtlCol="0" anchor="ctr"/>
+          <a:lstStyle/>
+          <a:p>
+            <a:pPr algn="ctr"/>
+            <a:endParaRPr lang="de-DE"/>
+          </a:p>
+        </p:txBody>
+      </p:sp>
+      <p:sp>
+        <p:nvSpPr>
+          <p:cNvPr id="3" name="Inhaltsplatzhalter 2"/>
+          <p:cNvSpPr>
+            <a:spLocks noGrp="1"/>
+          </p:cNvSpPr>
+          <p:nvPr>
+            <p:ph sz="quarter" idx="1"/>
+          </p:nvPr>
+        </p:nvSpPr>
+        <p:spPr>
+          <a:xfrm>
+            <a:off x="2329408" y="1291208"/>
+            <a:ext cx="4402832" cy="4937760"/>
+          </a:xfrm>
+        </p:spPr>
+        <p:txBody>
           <a:bodyPr>
-            <a:normAutofit/>
+            <a:normAutofit fontScale="85000" lnSpcReduction="20000"/>
           </a:bodyPr>
           <a:lstStyle/>
+          <a:p>
+            <a:r>
+              <a:rPr lang="de-DE" dirty="0" smtClean="0"/>
+              <a:t>Einleitung</a:t>
+            </a:r>
+          </a:p>
+          <a:p>
+            <a:pPr lvl="1"/>
+            <a:r>
+              <a:rPr lang="de-DE" dirty="0" smtClean="0">
+                <a:solidFill>
+                  <a:schemeClr val="tx1"/>
+                </a:solidFill>
+              </a:rPr>
+              <a:t>Thematik</a:t>
+            </a:r>
+          </a:p>
+          <a:p>
+            <a:pPr lvl="1"/>
+            <a:r>
+              <a:rPr lang="de-DE" dirty="0" smtClean="0">
+                <a:solidFill>
+                  <a:schemeClr val="tx1"/>
+                </a:solidFill>
+              </a:rPr>
+              <a:t>Anforderungen</a:t>
+            </a:r>
+          </a:p>
           <a:p>
             <a:r>
               <a:rPr lang="de-DE" dirty="0" smtClean="0"/>
               <a:t>Planung</a:t>
             </a:r>
-            <a:endParaRPr lang="de-DE" dirty="0"/>
-          </a:p>
-        </p:txBody>
-      </p:sp>
-      <p:sp>
-        <p:nvSpPr>
-          <p:cNvPr id="3" name="Inhaltsplatzhalter 2"/>
-          <p:cNvSpPr>
-            <a:spLocks noGrp="1"/>
-          </p:cNvSpPr>
-          <p:nvPr>
-            <p:ph sz="quarter" idx="1"/>
-          </p:nvPr>
-        </p:nvSpPr>
-        <p:spPr/>
-        <p:txBody>
-          <a:bodyPr/>
-          <a:lstStyle/>
-          <a:p>
-            <a:endParaRPr lang="de-DE"/>
+          </a:p>
+          <a:p>
+            <a:pPr lvl="1"/>
+            <a:r>
+              <a:rPr lang="de-DE" dirty="0" smtClean="0">
+                <a:solidFill>
+                  <a:schemeClr val="tx1"/>
+                </a:solidFill>
+              </a:rPr>
+              <a:t>Zeitplan</a:t>
+            </a:r>
+          </a:p>
+          <a:p>
+            <a:pPr lvl="1"/>
+            <a:r>
+              <a:rPr lang="de-DE" dirty="0" smtClean="0">
+                <a:solidFill>
+                  <a:schemeClr val="tx1"/>
+                </a:solidFill>
+              </a:rPr>
+              <a:t>Vorgehensmodelle</a:t>
+            </a:r>
+          </a:p>
+          <a:p>
+            <a:pPr lvl="2"/>
+            <a:r>
+              <a:rPr lang="de-DE" sz="2100" dirty="0" smtClean="0"/>
+              <a:t>Spiralmodell</a:t>
+            </a:r>
+          </a:p>
+          <a:p>
+            <a:pPr lvl="2"/>
+            <a:r>
+              <a:rPr lang="de-DE" sz="2100" dirty="0" smtClean="0"/>
+              <a:t>Test </a:t>
+            </a:r>
+            <a:r>
+              <a:rPr lang="de-DE" sz="2100" dirty="0" err="1" smtClean="0"/>
+              <a:t>Driven</a:t>
+            </a:r>
+            <a:r>
+              <a:rPr lang="de-DE" sz="2100" dirty="0" smtClean="0"/>
+              <a:t> Development (TDD)</a:t>
+            </a:r>
+          </a:p>
+          <a:p>
+            <a:r>
+              <a:rPr lang="de-DE" dirty="0" smtClean="0"/>
+              <a:t>Entwurf</a:t>
+            </a:r>
+          </a:p>
+          <a:p>
+            <a:pPr lvl="1"/>
+            <a:r>
+              <a:rPr lang="de-DE" dirty="0" smtClean="0">
+                <a:solidFill>
+                  <a:schemeClr val="tx1"/>
+                </a:solidFill>
+              </a:rPr>
+              <a:t>Architekturdesign</a:t>
+            </a:r>
+          </a:p>
+          <a:p>
+            <a:pPr lvl="1"/>
+            <a:r>
+              <a:rPr lang="de-DE" dirty="0" smtClean="0">
+                <a:solidFill>
+                  <a:schemeClr val="tx1"/>
+                </a:solidFill>
+              </a:rPr>
+              <a:t>Datenbankentwurf</a:t>
+            </a:r>
+          </a:p>
+          <a:p>
+            <a:pPr lvl="1"/>
+            <a:r>
+              <a:rPr lang="de-DE" dirty="0" smtClean="0">
+                <a:solidFill>
+                  <a:schemeClr val="tx1"/>
+                </a:solidFill>
+              </a:rPr>
+              <a:t>Pflichtenheft</a:t>
+            </a:r>
+          </a:p>
+          <a:p>
+            <a:r>
+              <a:rPr lang="de-DE" dirty="0" smtClean="0"/>
+              <a:t>Fazit</a:t>
+            </a:r>
+          </a:p>
+          <a:p>
+            <a:pPr lvl="1"/>
+            <a:r>
+              <a:rPr lang="de-DE" dirty="0" smtClean="0">
+                <a:solidFill>
+                  <a:schemeClr val="tx1"/>
+                </a:solidFill>
+              </a:rPr>
+              <a:t>Gewonnenes</a:t>
+            </a:r>
+          </a:p>
+          <a:p>
+            <a:pPr lvl="1"/>
+            <a:r>
+              <a:rPr lang="de-DE" dirty="0" smtClean="0">
+                <a:solidFill>
+                  <a:schemeClr val="tx1"/>
+                </a:solidFill>
+              </a:rPr>
+              <a:t>Ausblick</a:t>
+            </a:r>
           </a:p>
         </p:txBody>
       </p:sp>
@@ -6609,10 +9077,104 @@
         </p:txBody>
       </p:sp>
     </p:spTree>
+    <p:extLst>
+      <p:ext uri="{BB962C8B-B14F-4D97-AF65-F5344CB8AC3E}">
+        <p14:creationId xmlns:p14="http://schemas.microsoft.com/office/powerpoint/2010/main" val="615220078"/>
+      </p:ext>
+    </p:extLst>
   </p:cSld>
   <p:clrMapOvr>
     <a:masterClrMapping/>
   </p:clrMapOvr>
+  <p:timing>
+    <p:tnLst>
+      <p:par>
+        <p:cTn id="1" dur="indefinite" restart="never" nodeType="tmRoot">
+          <p:childTnLst>
+            <p:seq concurrent="1" nextAc="seek">
+              <p:cTn id="2" dur="indefinite" nodeType="mainSeq">
+                <p:childTnLst>
+                  <p:par>
+                    <p:cTn id="3" fill="hold">
+                      <p:stCondLst>
+                        <p:cond delay="indefinite"/>
+                        <p:cond evt="onBegin" delay="0">
+                          <p:tn val="2"/>
+                        </p:cond>
+                      </p:stCondLst>
+                      <p:childTnLst>
+                        <p:par>
+                          <p:cTn id="4" fill="hold">
+                            <p:stCondLst>
+                              <p:cond delay="0"/>
+                            </p:stCondLst>
+                            <p:childTnLst>
+                              <p:par>
+                                <p:cTn id="5" presetID="10" presetClass="entr" presetSubtype="0" fill="hold" grpId="0" nodeType="withEffect">
+                                  <p:stCondLst>
+                                    <p:cond delay="0"/>
+                                  </p:stCondLst>
+                                  <p:childTnLst>
+                                    <p:set>
+                                      <p:cBhvr>
+                                        <p:cTn id="6" dur="1" fill="hold">
+                                          <p:stCondLst>
+                                            <p:cond delay="0"/>
+                                          </p:stCondLst>
+                                        </p:cTn>
+                                        <p:tgtEl>
+                                          <p:spTgt spid="12"/>
+                                        </p:tgtEl>
+                                        <p:attrNameLst>
+                                          <p:attrName>style.visibility</p:attrName>
+                                        </p:attrNameLst>
+                                      </p:cBhvr>
+                                      <p:to>
+                                        <p:strVal val="visible"/>
+                                      </p:to>
+                                    </p:set>
+                                    <p:animEffect transition="in" filter="fade">
+                                      <p:cBhvr>
+                                        <p:cTn id="7" dur="750"/>
+                                        <p:tgtEl>
+                                          <p:spTgt spid="12"/>
+                                        </p:tgtEl>
+                                      </p:cBhvr>
+                                    </p:animEffect>
+                                  </p:childTnLst>
+                                </p:cTn>
+                              </p:par>
+                            </p:childTnLst>
+                          </p:cTn>
+                        </p:par>
+                      </p:childTnLst>
+                    </p:cTn>
+                  </p:par>
+                </p:childTnLst>
+              </p:cTn>
+              <p:prevCondLst>
+                <p:cond evt="onPrev" delay="0">
+                  <p:tgtEl>
+                    <p:sldTgt/>
+                  </p:tgtEl>
+                </p:cond>
+              </p:prevCondLst>
+              <p:nextCondLst>
+                <p:cond evt="onNext" delay="0">
+                  <p:tgtEl>
+                    <p:sldTgt/>
+                  </p:tgtEl>
+                </p:cond>
+              </p:nextCondLst>
+            </p:seq>
+          </p:childTnLst>
+        </p:cTn>
+      </p:par>
+    </p:tnLst>
+    <p:bldLst>
+      <p:bldP spid="12" grpId="0" animBg="1"/>
+    </p:bldLst>
+  </p:timing>
 </p:sld>
 </file>
 
@@ -6652,28 +9214,6 @@
               <a:rPr lang="de-DE" dirty="0" smtClean="0"/>
               <a:t>Zeitplan</a:t>
             </a:r>
-            <a:endParaRPr lang="de-DE" dirty="0"/>
-          </a:p>
-        </p:txBody>
-      </p:sp>
-      <p:sp>
-        <p:nvSpPr>
-          <p:cNvPr id="5" name="Inhaltsplatzhalter 4"/>
-          <p:cNvSpPr>
-            <a:spLocks noGrp="1"/>
-          </p:cNvSpPr>
-          <p:nvPr>
-            <p:ph sz="quarter" idx="1"/>
-          </p:nvPr>
-        </p:nvSpPr>
-        <p:spPr/>
-        <p:txBody>
-          <a:bodyPr/>
-          <a:lstStyle/>
-          <a:p>
-            <a:pPr>
-              <a:buNone/>
-            </a:pPr>
             <a:endParaRPr lang="de-DE" dirty="0"/>
           </a:p>
         </p:txBody>
@@ -6781,7 +9321,7 @@
           <a:p>
             <a:r>
               <a:rPr lang="de-DE" dirty="0" smtClean="0"/>
-              <a:t>Vorgehensmodelle</a:t>
+              <a:t>Spiralmodell</a:t>
             </a:r>
             <a:endParaRPr lang="de-DE" dirty="0"/>
           </a:p>
@@ -6802,7 +9342,22 @@
           <a:bodyPr/>
           <a:lstStyle/>
           <a:p>
-            <a:endParaRPr lang="de-DE" dirty="0"/>
+            <a:r>
+              <a:rPr lang="de-DE" dirty="0" smtClean="0"/>
+              <a:t>Iteratives Vorgehensmodell</a:t>
+            </a:r>
+          </a:p>
+          <a:p>
+            <a:r>
+              <a:rPr lang="de-DE" dirty="0" smtClean="0"/>
+              <a:t>Risikobetrachtung</a:t>
+            </a:r>
+          </a:p>
+          <a:p>
+            <a:r>
+              <a:rPr lang="de-DE" dirty="0" smtClean="0"/>
+              <a:t>Prototypen</a:t>
+            </a:r>
           </a:p>
         </p:txBody>
       </p:sp>
@@ -6822,13 +9377,42 @@
           <a:lstStyle/>
           <a:p>
             <a:r>
-              <a:rPr lang="de-DE" dirty="0" smtClean="0"/>
+              <a:rPr lang="de-DE" dirty="0"/>
               <a:t>7</a:t>
             </a:r>
-            <a:endParaRPr lang="de-DE" dirty="0"/>
-          </a:p>
-        </p:txBody>
-      </p:sp>
+          </a:p>
+        </p:txBody>
+      </p:sp>
+      <p:pic>
+        <p:nvPicPr>
+          <p:cNvPr id="4" name="Grafik 3"/>
+          <p:cNvPicPr>
+            <a:picLocks noChangeAspect="1"/>
+          </p:cNvPicPr>
+          <p:nvPr/>
+        </p:nvPicPr>
+        <p:blipFill>
+          <a:blip r:embed="rId3">
+            <a:extLst>
+              <a:ext uri="{28A0092B-C50C-407E-A947-70E740481C1C}">
+                <a14:useLocalDpi xmlns:a14="http://schemas.microsoft.com/office/drawing/2010/main" val="0"/>
+              </a:ext>
+            </a:extLst>
+          </a:blip>
+          <a:stretch>
+            <a:fillRect/>
+          </a:stretch>
+        </p:blipFill>
+        <p:spPr>
+          <a:xfrm>
+            <a:off x="2195736" y="2664296"/>
+            <a:ext cx="4438385" cy="3645024"/>
+          </a:xfrm>
+          <a:prstGeom prst="rect">
+            <a:avLst/>
+          </a:prstGeom>
+        </p:spPr>
+      </p:pic>
     </p:spTree>
   </p:cSld>
   <p:clrMapOvr>
@@ -6878,7 +9462,15 @@
           <a:p>
             <a:r>
               <a:rPr lang="de-DE" dirty="0" smtClean="0"/>
-              <a:t>Spiralmodell</a:t>
+              <a:t>Test </a:t>
+            </a:r>
+            <a:r>
+              <a:rPr lang="de-DE" dirty="0" err="1" smtClean="0"/>
+              <a:t>Driven</a:t>
+            </a:r>
+            <a:r>
+              <a:rPr lang="de-DE" dirty="0" smtClean="0"/>
+              <a:t> Development (TDD)</a:t>
             </a:r>
             <a:endParaRPr lang="de-DE" dirty="0"/>
           </a:p>
@@ -6900,53 +9492,88 @@
           <a:lstStyle/>
           <a:p>
             <a:r>
+              <a:rPr lang="de-DE" dirty="0" err="1" smtClean="0"/>
+              <a:t>Red</a:t>
+            </a:r>
+            <a:r>
               <a:rPr lang="de-DE" dirty="0" smtClean="0"/>
-              <a:t>Iteratives Vorgehensmodell</a:t>
-            </a:r>
+              <a:t> – Green – </a:t>
+            </a:r>
+            <a:r>
+              <a:rPr lang="de-DE" dirty="0" err="1" smtClean="0"/>
+              <a:t>Refactor</a:t>
+            </a:r>
+            <a:endParaRPr lang="de-DE" dirty="0" smtClean="0"/>
           </a:p>
           <a:p>
             <a:r>
               <a:rPr lang="de-DE" dirty="0" smtClean="0"/>
-              <a:t>Risikobetrachtung</a:t>
-            </a:r>
-          </a:p>
-          <a:p>
+              <a:t>Unit Tests</a:t>
+            </a:r>
+          </a:p>
+          <a:p>
+            <a:pPr lvl="1"/>
+            <a:r>
+              <a:rPr lang="de-DE" dirty="0" smtClean="0">
+                <a:solidFill>
+                  <a:schemeClr val="tx1"/>
+                </a:solidFill>
+              </a:rPr>
+              <a:t>Datenbankverbindungen</a:t>
+            </a:r>
+          </a:p>
+          <a:p>
+            <a:pPr lvl="2"/>
             <a:r>
               <a:rPr lang="de-DE" dirty="0" smtClean="0"/>
-              <a:t>Mehrere Zyklen</a:t>
-            </a:r>
-          </a:p>
-          <a:p>
-            <a:r>
-              <a:rPr lang="de-DE" sz="6000" dirty="0" smtClean="0"/>
-              <a:t>BILD</a:t>
+              <a:t>Einfügen von Daten</a:t>
+            </a:r>
+          </a:p>
+          <a:p>
+            <a:pPr lvl="2"/>
+            <a:r>
+              <a:rPr lang="de-DE" dirty="0" smtClean="0"/>
+              <a:t>Löschen von Daten</a:t>
+            </a:r>
+          </a:p>
+          <a:p>
+            <a:pPr lvl="1"/>
+            <a:r>
+              <a:rPr lang="de-DE" dirty="0" smtClean="0">
+                <a:solidFill>
+                  <a:schemeClr val="tx1"/>
+                </a:solidFill>
+              </a:rPr>
+              <a:t>Validation</a:t>
+            </a:r>
+            <a:endParaRPr lang="de-DE" dirty="0">
+              <a:solidFill>
+                <a:schemeClr val="tx1"/>
+              </a:solidFill>
+            </a:endParaRPr>
+          </a:p>
+        </p:txBody>
+      </p:sp>
+      <p:sp>
+        <p:nvSpPr>
+          <p:cNvPr id="5" name="Foliennummernplatzhalter 4"/>
+          <p:cNvSpPr>
+            <a:spLocks noGrp="1"/>
+          </p:cNvSpPr>
+          <p:nvPr>
+            <p:ph type="sldNum" sz="quarter" idx="12"/>
+          </p:nvPr>
+        </p:nvSpPr>
+        <p:spPr/>
+        <p:txBody>
+          <a:bodyPr/>
+          <a:lstStyle/>
+          <a:p>
+            <a:r>
+              <a:rPr lang="de-DE" dirty="0"/>
+              <a:t>8</a:t>
             </a:r>
             <a:endParaRPr lang="de-DE" dirty="0" smtClean="0"/>
-          </a:p>
-        </p:txBody>
-      </p:sp>
-      <p:sp>
-        <p:nvSpPr>
-          <p:cNvPr id="5" name="Foliennummernplatzhalter 4"/>
-          <p:cNvSpPr>
-            <a:spLocks noGrp="1"/>
-          </p:cNvSpPr>
-          <p:nvPr>
-            <p:ph type="sldNum" sz="quarter" idx="12"/>
-          </p:nvPr>
-        </p:nvSpPr>
-        <p:spPr/>
-        <p:txBody>
-          <a:bodyPr/>
-          <a:lstStyle/>
-          <a:p>
-            <a:r>
-              <a:rPr lang="de-DE" dirty="0" smtClean="0"/>
-              <a:t>8</a:t>
-            </a:r>
-          </a:p>
-          <a:p>
-            <a:endParaRPr lang="de-DE" dirty="0"/>
           </a:p>
         </p:txBody>
       </p:sp>
@@ -6955,6 +9582,13 @@
   <p:clrMapOvr>
     <a:masterClrMapping/>
   </p:clrMapOvr>
+  <p:timing>
+    <p:tnLst>
+      <p:par>
+        <p:cTn id="1" dur="indefinite" restart="never" nodeType="tmRoot"/>
+      </p:par>
+    </p:tnLst>
+  </p:timing>
 </p:sld>
 </file>
 

</xml_diff>

<commit_message>
[IMS-?] Stylen der Dokumentation und der Präsentation
</commit_message>
<xml_diff>
--- a/Doku/Präsentation.pptx
+++ b/Doku/Präsentation.pptx
@@ -208,7 +208,7 @@
           <a:p>
             <a:fld id="{8B15DE1F-419D-4D02-82BC-F91BB41CE353}" type="datetimeFigureOut">
               <a:rPr lang="de-DE" smtClean="0"/>
-              <a:t>06.05.2016</a:t>
+              <a:t>10.05.2016</a:t>
             </a:fld>
             <a:endParaRPr lang="de-DE"/>
           </a:p>
@@ -559,6 +559,414 @@
 </p:notes>
 </file>
 
+<file path=ppt/notesSlides/notesSlide10.xml><?xml version="1.0" encoding="utf-8"?>
+<p:notes xmlns:a="http://schemas.openxmlformats.org/drawingml/2006/main" xmlns:r="http://schemas.openxmlformats.org/officeDocument/2006/relationships" xmlns:p="http://schemas.openxmlformats.org/presentationml/2006/main">
+  <p:cSld>
+    <p:spTree>
+      <p:nvGrpSpPr>
+        <p:cNvPr id="1" name=""/>
+        <p:cNvGrpSpPr/>
+        <p:nvPr/>
+      </p:nvGrpSpPr>
+      <p:grpSpPr>
+        <a:xfrm>
+          <a:off x="0" y="0"/>
+          <a:ext cx="0" cy="0"/>
+          <a:chOff x="0" y="0"/>
+          <a:chExt cx="0" cy="0"/>
+        </a:xfrm>
+      </p:grpSpPr>
+      <p:sp>
+        <p:nvSpPr>
+          <p:cNvPr id="2" name="Folienbildplatzhalter 1"/>
+          <p:cNvSpPr>
+            <a:spLocks noGrp="1" noRot="1" noChangeAspect="1"/>
+          </p:cNvSpPr>
+          <p:nvPr>
+            <p:ph type="sldImg"/>
+          </p:nvPr>
+        </p:nvSpPr>
+        <p:spPr/>
+      </p:sp>
+      <p:sp>
+        <p:nvSpPr>
+          <p:cNvPr id="3" name="Notizenplatzhalter 2"/>
+          <p:cNvSpPr>
+            <a:spLocks noGrp="1"/>
+          </p:cNvSpPr>
+          <p:nvPr>
+            <p:ph type="body" idx="1"/>
+          </p:nvPr>
+        </p:nvSpPr>
+        <p:spPr/>
+        <p:txBody>
+          <a:bodyPr>
+            <a:normAutofit/>
+          </a:bodyPr>
+          <a:lstStyle/>
+          <a:p>
+            <a:r>
+              <a:rPr lang="de-DE" dirty="0" smtClean="0"/>
+              <a:t>Schichtenmodell</a:t>
+            </a:r>
+          </a:p>
+          <a:p>
+            <a:r>
+              <a:rPr lang="de-DE" dirty="0" smtClean="0"/>
+              <a:t>Ermöglicht</a:t>
+            </a:r>
+            <a:r>
+              <a:rPr lang="de-DE" baseline="0" dirty="0" smtClean="0"/>
+              <a:t> eine saubere, modulare Entwicklung</a:t>
+            </a:r>
+          </a:p>
+          <a:p>
+            <a:r>
+              <a:rPr lang="de-DE" baseline="0" dirty="0" smtClean="0"/>
+              <a:t>Datenbank ist austauschbar und kann auf einem zentralen System liegen</a:t>
+            </a:r>
+            <a:endParaRPr lang="de-DE" dirty="0"/>
+          </a:p>
+        </p:txBody>
+      </p:sp>
+      <p:sp>
+        <p:nvSpPr>
+          <p:cNvPr id="4" name="Foliennummernplatzhalter 3"/>
+          <p:cNvSpPr>
+            <a:spLocks noGrp="1"/>
+          </p:cNvSpPr>
+          <p:nvPr>
+            <p:ph type="sldNum" sz="quarter" idx="10"/>
+          </p:nvPr>
+        </p:nvSpPr>
+        <p:spPr/>
+        <p:txBody>
+          <a:bodyPr/>
+          <a:lstStyle/>
+          <a:p>
+            <a:fld id="{5F898C9E-79AA-49F5-983B-85D49666B96C}" type="slidenum">
+              <a:rPr lang="de-DE" smtClean="0"/>
+              <a:t>11</a:t>
+            </a:fld>
+            <a:endParaRPr lang="de-DE"/>
+          </a:p>
+        </p:txBody>
+      </p:sp>
+    </p:spTree>
+  </p:cSld>
+  <p:clrMapOvr>
+    <a:masterClrMapping/>
+  </p:clrMapOvr>
+</p:notes>
+</file>
+
+<file path=ppt/notesSlides/notesSlide11.xml><?xml version="1.0" encoding="utf-8"?>
+<p:notes xmlns:a="http://schemas.openxmlformats.org/drawingml/2006/main" xmlns:r="http://schemas.openxmlformats.org/officeDocument/2006/relationships" xmlns:p="http://schemas.openxmlformats.org/presentationml/2006/main">
+  <p:cSld>
+    <p:spTree>
+      <p:nvGrpSpPr>
+        <p:cNvPr id="1" name=""/>
+        <p:cNvGrpSpPr/>
+        <p:nvPr/>
+      </p:nvGrpSpPr>
+      <p:grpSpPr>
+        <a:xfrm>
+          <a:off x="0" y="0"/>
+          <a:ext cx="0" cy="0"/>
+          <a:chOff x="0" y="0"/>
+          <a:chExt cx="0" cy="0"/>
+        </a:xfrm>
+      </p:grpSpPr>
+      <p:sp>
+        <p:nvSpPr>
+          <p:cNvPr id="2" name="Folienbildplatzhalter 1"/>
+          <p:cNvSpPr>
+            <a:spLocks noGrp="1" noRot="1" noChangeAspect="1"/>
+          </p:cNvSpPr>
+          <p:nvPr>
+            <p:ph type="sldImg"/>
+          </p:nvPr>
+        </p:nvSpPr>
+        <p:spPr/>
+      </p:sp>
+      <p:sp>
+        <p:nvSpPr>
+          <p:cNvPr id="3" name="Notizenplatzhalter 2"/>
+          <p:cNvSpPr>
+            <a:spLocks noGrp="1"/>
+          </p:cNvSpPr>
+          <p:nvPr>
+            <p:ph type="body" idx="1"/>
+          </p:nvPr>
+        </p:nvSpPr>
+        <p:spPr/>
+        <p:txBody>
+          <a:bodyPr>
+            <a:normAutofit/>
+          </a:bodyPr>
+          <a:lstStyle/>
+          <a:p>
+            <a:r>
+              <a:rPr lang="de-DE" dirty="0" smtClean="0"/>
+              <a:t>Link zum </a:t>
+            </a:r>
+            <a:r>
+              <a:rPr lang="de-DE" dirty="0" smtClean="0"/>
+              <a:t>Bild!</a:t>
+            </a:r>
+          </a:p>
+          <a:p>
+            <a:r>
+              <a:rPr lang="de-DE" dirty="0" smtClean="0"/>
+              <a:t>Umfasst:</a:t>
+            </a:r>
+            <a:r>
+              <a:rPr lang="de-DE" baseline="0" dirty="0" smtClean="0"/>
+              <a:t> Entitäten, Attribute und Beziehungen samt </a:t>
+            </a:r>
+            <a:r>
+              <a:rPr lang="de-DE" baseline="0" dirty="0" err="1" smtClean="0"/>
+              <a:t>Kardinalitäten</a:t>
+            </a:r>
+            <a:endParaRPr lang="de-DE" baseline="0" dirty="0" smtClean="0"/>
+          </a:p>
+          <a:p>
+            <a:r>
+              <a:rPr lang="de-DE" baseline="0" dirty="0" smtClean="0"/>
+              <a:t>Erstellung von Datenbank-Regeln für die Konsistenz der Daten</a:t>
+            </a:r>
+          </a:p>
+        </p:txBody>
+      </p:sp>
+      <p:sp>
+        <p:nvSpPr>
+          <p:cNvPr id="4" name="Foliennummernplatzhalter 3"/>
+          <p:cNvSpPr>
+            <a:spLocks noGrp="1"/>
+          </p:cNvSpPr>
+          <p:nvPr>
+            <p:ph type="sldNum" sz="quarter" idx="10"/>
+          </p:nvPr>
+        </p:nvSpPr>
+        <p:spPr/>
+        <p:txBody>
+          <a:bodyPr/>
+          <a:lstStyle/>
+          <a:p>
+            <a:fld id="{5F898C9E-79AA-49F5-983B-85D49666B96C}" type="slidenum">
+              <a:rPr lang="de-DE" smtClean="0"/>
+              <a:t>12</a:t>
+            </a:fld>
+            <a:endParaRPr lang="de-DE"/>
+          </a:p>
+        </p:txBody>
+      </p:sp>
+    </p:spTree>
+  </p:cSld>
+  <p:clrMapOvr>
+    <a:masterClrMapping/>
+  </p:clrMapOvr>
+</p:notes>
+</file>
+
+<file path=ppt/notesSlides/notesSlide12.xml><?xml version="1.0" encoding="utf-8"?>
+<p:notes xmlns:a="http://schemas.openxmlformats.org/drawingml/2006/main" xmlns:r="http://schemas.openxmlformats.org/officeDocument/2006/relationships" xmlns:p="http://schemas.openxmlformats.org/presentationml/2006/main">
+  <p:cSld>
+    <p:spTree>
+      <p:nvGrpSpPr>
+        <p:cNvPr id="1" name=""/>
+        <p:cNvGrpSpPr/>
+        <p:nvPr/>
+      </p:nvGrpSpPr>
+      <p:grpSpPr>
+        <a:xfrm>
+          <a:off x="0" y="0"/>
+          <a:ext cx="0" cy="0"/>
+          <a:chOff x="0" y="0"/>
+          <a:chExt cx="0" cy="0"/>
+        </a:xfrm>
+      </p:grpSpPr>
+      <p:sp>
+        <p:nvSpPr>
+          <p:cNvPr id="2" name="Folienbildplatzhalter 1"/>
+          <p:cNvSpPr>
+            <a:spLocks noGrp="1" noRot="1" noChangeAspect="1"/>
+          </p:cNvSpPr>
+          <p:nvPr>
+            <p:ph type="sldImg"/>
+          </p:nvPr>
+        </p:nvSpPr>
+        <p:spPr/>
+      </p:sp>
+      <p:sp>
+        <p:nvSpPr>
+          <p:cNvPr id="3" name="Notizenplatzhalter 2"/>
+          <p:cNvSpPr>
+            <a:spLocks noGrp="1"/>
+          </p:cNvSpPr>
+          <p:nvPr>
+            <p:ph type="body" idx="1"/>
+          </p:nvPr>
+        </p:nvSpPr>
+        <p:spPr/>
+        <p:txBody>
+          <a:bodyPr/>
+          <a:lstStyle/>
+          <a:p>
+            <a:r>
+              <a:rPr lang="de-DE" dirty="0" smtClean="0"/>
+              <a:t>Neue</a:t>
+            </a:r>
+            <a:r>
+              <a:rPr lang="de-DE" baseline="0" dirty="0" smtClean="0"/>
+              <a:t> Kenntnisse: Erstellen von Datenbanken unter </a:t>
+            </a:r>
+            <a:r>
+              <a:rPr lang="de-DE" baseline="0" dirty="0" err="1" smtClean="0"/>
+              <a:t>MariaDB</a:t>
+            </a:r>
+            <a:r>
+              <a:rPr lang="de-DE" baseline="0" dirty="0" smtClean="0"/>
+              <a:t>, Erstellen und Realisieren von </a:t>
+            </a:r>
+            <a:r>
+              <a:rPr lang="de-DE" baseline="0" dirty="0" err="1" smtClean="0"/>
+              <a:t>Mockups</a:t>
+            </a:r>
+            <a:r>
+              <a:rPr lang="de-DE" baseline="0" dirty="0" smtClean="0"/>
+              <a:t>, Koordinieren und Planen in einem Team (Erstellen eines Zeitplans, etc.)</a:t>
+            </a:r>
+          </a:p>
+          <a:p>
+            <a:r>
+              <a:rPr lang="de-DE" baseline="0" dirty="0" smtClean="0"/>
+              <a:t>Ausblick: Hinzufügen von neuen Bauteilen, Verbesserungen am Design, Benutzerverwaltung, Teamarbeit war erfolgreich und weitere Projekte in diesem Team sind denkbar</a:t>
+            </a:r>
+          </a:p>
+        </p:txBody>
+      </p:sp>
+      <p:sp>
+        <p:nvSpPr>
+          <p:cNvPr id="4" name="Foliennummernplatzhalter 3"/>
+          <p:cNvSpPr>
+            <a:spLocks noGrp="1"/>
+          </p:cNvSpPr>
+          <p:nvPr>
+            <p:ph type="sldNum" sz="quarter" idx="10"/>
+          </p:nvPr>
+        </p:nvSpPr>
+        <p:spPr/>
+        <p:txBody>
+          <a:bodyPr/>
+          <a:lstStyle/>
+          <a:p>
+            <a:fld id="{5F898C9E-79AA-49F5-983B-85D49666B96C}" type="slidenum">
+              <a:rPr lang="de-DE" smtClean="0"/>
+              <a:t>15</a:t>
+            </a:fld>
+            <a:endParaRPr lang="de-DE"/>
+          </a:p>
+        </p:txBody>
+      </p:sp>
+    </p:spTree>
+    <p:extLst>
+      <p:ext uri="{BB962C8B-B14F-4D97-AF65-F5344CB8AC3E}">
+        <p14:creationId xmlns:p14="http://schemas.microsoft.com/office/powerpoint/2010/main" val="3147031468"/>
+      </p:ext>
+    </p:extLst>
+  </p:cSld>
+  <p:clrMapOvr>
+    <a:masterClrMapping/>
+  </p:clrMapOvr>
+</p:notes>
+</file>
+
+<file path=ppt/notesSlides/notesSlide13.xml><?xml version="1.0" encoding="utf-8"?>
+<p:notes xmlns:a="http://schemas.openxmlformats.org/drawingml/2006/main" xmlns:r="http://schemas.openxmlformats.org/officeDocument/2006/relationships" xmlns:p="http://schemas.openxmlformats.org/presentationml/2006/main">
+  <p:cSld>
+    <p:spTree>
+      <p:nvGrpSpPr>
+        <p:cNvPr id="1" name=""/>
+        <p:cNvGrpSpPr/>
+        <p:nvPr/>
+      </p:nvGrpSpPr>
+      <p:grpSpPr>
+        <a:xfrm>
+          <a:off x="0" y="0"/>
+          <a:ext cx="0" cy="0"/>
+          <a:chOff x="0" y="0"/>
+          <a:chExt cx="0" cy="0"/>
+        </a:xfrm>
+      </p:grpSpPr>
+      <p:sp>
+        <p:nvSpPr>
+          <p:cNvPr id="2" name="Folienbildplatzhalter 1"/>
+          <p:cNvSpPr>
+            <a:spLocks noGrp="1" noRot="1" noChangeAspect="1"/>
+          </p:cNvSpPr>
+          <p:nvPr>
+            <p:ph type="sldImg"/>
+          </p:nvPr>
+        </p:nvSpPr>
+        <p:spPr/>
+      </p:sp>
+      <p:sp>
+        <p:nvSpPr>
+          <p:cNvPr id="3" name="Notizenplatzhalter 2"/>
+          <p:cNvSpPr>
+            <a:spLocks noGrp="1"/>
+          </p:cNvSpPr>
+          <p:nvPr>
+            <p:ph type="body" idx="1"/>
+          </p:nvPr>
+        </p:nvSpPr>
+        <p:spPr/>
+        <p:txBody>
+          <a:bodyPr>
+            <a:normAutofit/>
+          </a:bodyPr>
+          <a:lstStyle/>
+          <a:p>
+            <a:r>
+              <a:rPr lang="de-DE" dirty="0" smtClean="0"/>
+              <a:t>Bild</a:t>
+            </a:r>
+            <a:endParaRPr lang="de-DE" dirty="0"/>
+          </a:p>
+        </p:txBody>
+      </p:sp>
+      <p:sp>
+        <p:nvSpPr>
+          <p:cNvPr id="4" name="Foliennummernplatzhalter 3"/>
+          <p:cNvSpPr>
+            <a:spLocks noGrp="1"/>
+          </p:cNvSpPr>
+          <p:nvPr>
+            <p:ph type="sldNum" sz="quarter" idx="10"/>
+          </p:nvPr>
+        </p:nvSpPr>
+        <p:spPr/>
+        <p:txBody>
+          <a:bodyPr/>
+          <a:lstStyle/>
+          <a:p>
+            <a:fld id="{5F898C9E-79AA-49F5-983B-85D49666B96C}" type="slidenum">
+              <a:rPr lang="de-DE" smtClean="0"/>
+              <a:t>16</a:t>
+            </a:fld>
+            <a:endParaRPr lang="de-DE"/>
+          </a:p>
+        </p:txBody>
+      </p:sp>
+    </p:spTree>
+  </p:cSld>
+  <p:clrMapOvr>
+    <a:masterClrMapping/>
+  </p:clrMapOvr>
+</p:notes>
+</file>
+
 <file path=ppt/notesSlides/notesSlide2.xml><?xml version="1.0" encoding="utf-8"?>
 <p:notes xmlns:a="http://schemas.openxmlformats.org/drawingml/2006/main" xmlns:r="http://schemas.openxmlformats.org/officeDocument/2006/relationships" xmlns:p="http://schemas.openxmlformats.org/presentationml/2006/main">
   <p:cSld>
@@ -605,11 +1013,21 @@
           <a:p>
             <a:r>
               <a:rPr lang="de-DE" dirty="0" smtClean="0"/>
-              <a:t>Kann </a:t>
+              <a:t>Implementierungsphase</a:t>
             </a:r>
             <a:r>
               <a:rPr lang="de-DE" baseline="0" dirty="0" smtClean="0"/>
-              <a:t>von Lagerpersonal &amp; Vertrieb genutzt werden</a:t>
+              <a:t> weg gelassen</a:t>
+            </a:r>
+          </a:p>
+          <a:p>
+            <a:r>
+              <a:rPr lang="de-DE" baseline="0" dirty="0" smtClean="0"/>
+              <a:t>Implementierung wird während der Abhandlung der </a:t>
+            </a:r>
+            <a:r>
+              <a:rPr lang="de-DE" baseline="0" smtClean="0"/>
+              <a:t>Entwurfsphase erläutert</a:t>
             </a:r>
             <a:endParaRPr lang="de-DE" dirty="0"/>
           </a:p>
@@ -632,7 +1050,7 @@
           <a:p>
             <a:fld id="{5F898C9E-79AA-49F5-983B-85D49666B96C}" type="slidenum">
               <a:rPr lang="de-DE" smtClean="0"/>
-              <a:t>4</a:t>
+              <a:t>2</a:t>
             </a:fld>
             <a:endParaRPr lang="de-DE"/>
           </a:p>
@@ -641,7 +1059,7 @@
     </p:spTree>
     <p:extLst>
       <p:ext uri="{BB962C8B-B14F-4D97-AF65-F5344CB8AC3E}">
-        <p14:creationId xmlns:p14="http://schemas.microsoft.com/office/powerpoint/2010/main" val="2490451349"/>
+        <p14:creationId xmlns:p14="http://schemas.microsoft.com/office/powerpoint/2010/main" val="564717387"/>
       </p:ext>
     </p:extLst>
   </p:cSld>
@@ -697,26 +1115,12 @@
           <a:p>
             <a:r>
               <a:rPr lang="de-DE" dirty="0" smtClean="0"/>
-              <a:t>Eingreifen</a:t>
+              <a:t>Kann </a:t>
             </a:r>
             <a:r>
               <a:rPr lang="de-DE" baseline="0" dirty="0" smtClean="0"/>
-              <a:t> bei jedem Zyklus und somit dynamischer als Wasserfallmodell</a:t>
-            </a:r>
-          </a:p>
-          <a:p>
-            <a:r>
-              <a:rPr lang="de-DE" baseline="0" dirty="0" smtClean="0"/>
-              <a:t>Zyklus: Festlegen der Ziele, Lösungen planen/Risikoanalyse, Entwicklung/Test, Planen des nächsten Zyklus </a:t>
-            </a:r>
-          </a:p>
-          <a:p>
-            <a:r>
-              <a:rPr lang="de-DE" baseline="0" dirty="0" smtClean="0"/>
-              <a:t>Am Ende steht immer ein Prototyp, welcher einen Zwischenstand zum fertigen Produkt darstellt</a:t>
-            </a:r>
-          </a:p>
-          <a:p>
+              <a:t>von Lagerpersonal &amp; Vertrieb genutzt werden</a:t>
+            </a:r>
             <a:endParaRPr lang="de-DE" dirty="0"/>
           </a:p>
         </p:txBody>
@@ -738,7 +1142,7 @@
           <a:p>
             <a:fld id="{5F898C9E-79AA-49F5-983B-85D49666B96C}" type="slidenum">
               <a:rPr lang="de-DE" smtClean="0"/>
-              <a:t>8</a:t>
+              <a:t>4</a:t>
             </a:fld>
             <a:endParaRPr lang="de-DE"/>
           </a:p>
@@ -747,7 +1151,7 @@
     </p:spTree>
     <p:extLst>
       <p:ext uri="{BB962C8B-B14F-4D97-AF65-F5344CB8AC3E}">
-        <p14:creationId xmlns:p14="http://schemas.microsoft.com/office/powerpoint/2010/main" val="4031942451"/>
+        <p14:creationId xmlns:p14="http://schemas.microsoft.com/office/powerpoint/2010/main" val="2490451349"/>
       </p:ext>
     </p:extLst>
   </p:cSld>
@@ -798,14 +1202,16 @@
         </p:nvSpPr>
         <p:spPr/>
         <p:txBody>
-          <a:bodyPr>
-            <a:normAutofit/>
-          </a:bodyPr>
+          <a:bodyPr/>
           <a:lstStyle/>
           <a:p>
             <a:r>
               <a:rPr lang="de-DE" dirty="0" smtClean="0"/>
-              <a:t>Warum?</a:t>
+              <a:t>Anforderungen wurden</a:t>
+            </a:r>
+            <a:r>
+              <a:rPr lang="de-DE" baseline="0" dirty="0" smtClean="0"/>
+              <a:t> in schriftlicher Form im Lastenheft festgehalten</a:t>
             </a:r>
             <a:endParaRPr lang="de-DE" dirty="0"/>
           </a:p>
@@ -828,13 +1234,18 @@
           <a:p>
             <a:fld id="{5F898C9E-79AA-49F5-983B-85D49666B96C}" type="slidenum">
               <a:rPr lang="de-DE" smtClean="0"/>
-              <a:t>11</a:t>
+              <a:t>5</a:t>
             </a:fld>
             <a:endParaRPr lang="de-DE"/>
           </a:p>
         </p:txBody>
       </p:sp>
     </p:spTree>
+    <p:extLst>
+      <p:ext uri="{BB962C8B-B14F-4D97-AF65-F5344CB8AC3E}">
+        <p14:creationId xmlns:p14="http://schemas.microsoft.com/office/powerpoint/2010/main" val="2882050055"/>
+      </p:ext>
+    </p:extLst>
   </p:cSld>
   <p:clrMapOvr>
     <a:masterClrMapping/>
@@ -883,15 +1294,9 @@
         </p:nvSpPr>
         <p:spPr/>
         <p:txBody>
-          <a:bodyPr>
-            <a:normAutofit/>
-          </a:bodyPr>
-          <a:lstStyle/>
-          <a:p>
-            <a:r>
-              <a:rPr lang="de-DE" dirty="0" smtClean="0"/>
-              <a:t>Link zum Bild</a:t>
-            </a:r>
+          <a:bodyPr/>
+          <a:lstStyle/>
+          <a:p>
             <a:endParaRPr lang="de-DE" dirty="0"/>
           </a:p>
         </p:txBody>
@@ -913,13 +1318,18 @@
           <a:p>
             <a:fld id="{5F898C9E-79AA-49F5-983B-85D49666B96C}" type="slidenum">
               <a:rPr lang="de-DE" smtClean="0"/>
-              <a:t>12</a:t>
+              <a:t>6</a:t>
             </a:fld>
             <a:endParaRPr lang="de-DE"/>
           </a:p>
         </p:txBody>
       </p:sp>
     </p:spTree>
+    <p:extLst>
+      <p:ext uri="{BB962C8B-B14F-4D97-AF65-F5344CB8AC3E}">
+        <p14:creationId xmlns:p14="http://schemas.microsoft.com/office/powerpoint/2010/main" val="701333180"/>
+      </p:ext>
+    </p:extLst>
   </p:cSld>
   <p:clrMapOvr>
     <a:masterClrMapping/>
@@ -968,14 +1378,22 @@
         </p:nvSpPr>
         <p:spPr/>
         <p:txBody>
-          <a:bodyPr>
-            <a:normAutofit/>
-          </a:bodyPr>
+          <a:bodyPr/>
           <a:lstStyle/>
           <a:p>
             <a:r>
               <a:rPr lang="de-DE" dirty="0" smtClean="0"/>
-              <a:t>Bild</a:t>
+              <a:t>Zeitplanung wurde am Anfang der Planungsphase erstellt</a:t>
+            </a:r>
+          </a:p>
+          <a:p>
+            <a:r>
+              <a:rPr lang="de-DE" dirty="0" smtClean="0"/>
+              <a:t>Vorgabe:</a:t>
+            </a:r>
+            <a:r>
+              <a:rPr lang="de-DE" baseline="0" dirty="0" smtClean="0"/>
+              <a:t> 24 Stunden</a:t>
             </a:r>
             <a:endParaRPr lang="de-DE" dirty="0"/>
           </a:p>
@@ -998,13 +1416,344 @@
           <a:p>
             <a:fld id="{5F898C9E-79AA-49F5-983B-85D49666B96C}" type="slidenum">
               <a:rPr lang="de-DE" smtClean="0"/>
-              <a:t>16</a:t>
+              <a:t>7</a:t>
             </a:fld>
             <a:endParaRPr lang="de-DE"/>
           </a:p>
         </p:txBody>
       </p:sp>
     </p:spTree>
+    <p:extLst>
+      <p:ext uri="{BB962C8B-B14F-4D97-AF65-F5344CB8AC3E}">
+        <p14:creationId xmlns:p14="http://schemas.microsoft.com/office/powerpoint/2010/main" val="2579384574"/>
+      </p:ext>
+    </p:extLst>
+  </p:cSld>
+  <p:clrMapOvr>
+    <a:masterClrMapping/>
+  </p:clrMapOvr>
+</p:notes>
+</file>
+
+<file path=ppt/notesSlides/notesSlide7.xml><?xml version="1.0" encoding="utf-8"?>
+<p:notes xmlns:a="http://schemas.openxmlformats.org/drawingml/2006/main" xmlns:r="http://schemas.openxmlformats.org/officeDocument/2006/relationships" xmlns:p="http://schemas.openxmlformats.org/presentationml/2006/main">
+  <p:cSld>
+    <p:spTree>
+      <p:nvGrpSpPr>
+        <p:cNvPr id="1" name=""/>
+        <p:cNvGrpSpPr/>
+        <p:nvPr/>
+      </p:nvGrpSpPr>
+      <p:grpSpPr>
+        <a:xfrm>
+          <a:off x="0" y="0"/>
+          <a:ext cx="0" cy="0"/>
+          <a:chOff x="0" y="0"/>
+          <a:chExt cx="0" cy="0"/>
+        </a:xfrm>
+      </p:grpSpPr>
+      <p:sp>
+        <p:nvSpPr>
+          <p:cNvPr id="2" name="Folienbildplatzhalter 1"/>
+          <p:cNvSpPr>
+            <a:spLocks noGrp="1" noRot="1" noChangeAspect="1"/>
+          </p:cNvSpPr>
+          <p:nvPr>
+            <p:ph type="sldImg"/>
+          </p:nvPr>
+        </p:nvSpPr>
+        <p:spPr/>
+      </p:sp>
+      <p:sp>
+        <p:nvSpPr>
+          <p:cNvPr id="3" name="Notizenplatzhalter 2"/>
+          <p:cNvSpPr>
+            <a:spLocks noGrp="1"/>
+          </p:cNvSpPr>
+          <p:nvPr>
+            <p:ph type="body" idx="1"/>
+          </p:nvPr>
+        </p:nvSpPr>
+        <p:spPr/>
+        <p:txBody>
+          <a:bodyPr/>
+          <a:lstStyle/>
+          <a:p>
+            <a:r>
+              <a:rPr lang="de-DE" dirty="0" smtClean="0"/>
+              <a:t>Eingreifen</a:t>
+            </a:r>
+            <a:r>
+              <a:rPr lang="de-DE" baseline="0" dirty="0" smtClean="0"/>
+              <a:t> bei jedem Zyklus und somit dynamischer als Wasserfallmodell</a:t>
+            </a:r>
+          </a:p>
+          <a:p>
+            <a:r>
+              <a:rPr lang="de-DE" baseline="0" dirty="0" smtClean="0"/>
+              <a:t>Zyklus: Festlegen der Ziele, Lösungen planen/Risikoanalyse, Entwicklung/Test, Planen des nächsten Zyklus </a:t>
+            </a:r>
+          </a:p>
+          <a:p>
+            <a:r>
+              <a:rPr lang="de-DE" baseline="0" dirty="0" smtClean="0"/>
+              <a:t>Am Ende steht immer ein Prototyp, welcher einen Zwischenstand zum fertigen Produkt </a:t>
+            </a:r>
+            <a:r>
+              <a:rPr lang="de-DE" baseline="0" dirty="0" smtClean="0"/>
+              <a:t>darstellt</a:t>
+            </a:r>
+          </a:p>
+          <a:p>
+            <a:r>
+              <a:rPr lang="de-DE" baseline="0" dirty="0" smtClean="0"/>
+              <a:t>Vorteile für das Projekt: Zyklische Planung (schnellere Reaktion), Risikobetrachtung beugt Fehlern vor, Fortschritt durch Prototypen gut einschätzbar</a:t>
+            </a:r>
+            <a:endParaRPr lang="de-DE" baseline="0" dirty="0" smtClean="0"/>
+          </a:p>
+          <a:p>
+            <a:endParaRPr lang="de-DE" dirty="0"/>
+          </a:p>
+        </p:txBody>
+      </p:sp>
+      <p:sp>
+        <p:nvSpPr>
+          <p:cNvPr id="4" name="Foliennummernplatzhalter 3"/>
+          <p:cNvSpPr>
+            <a:spLocks noGrp="1"/>
+          </p:cNvSpPr>
+          <p:nvPr>
+            <p:ph type="sldNum" sz="quarter" idx="10"/>
+          </p:nvPr>
+        </p:nvSpPr>
+        <p:spPr/>
+        <p:txBody>
+          <a:bodyPr/>
+          <a:lstStyle/>
+          <a:p>
+            <a:fld id="{5F898C9E-79AA-49F5-983B-85D49666B96C}" type="slidenum">
+              <a:rPr lang="de-DE" smtClean="0"/>
+              <a:t>8</a:t>
+            </a:fld>
+            <a:endParaRPr lang="de-DE"/>
+          </a:p>
+        </p:txBody>
+      </p:sp>
+    </p:spTree>
+    <p:extLst>
+      <p:ext uri="{BB962C8B-B14F-4D97-AF65-F5344CB8AC3E}">
+        <p14:creationId xmlns:p14="http://schemas.microsoft.com/office/powerpoint/2010/main" val="4031942451"/>
+      </p:ext>
+    </p:extLst>
+  </p:cSld>
+  <p:clrMapOvr>
+    <a:masterClrMapping/>
+  </p:clrMapOvr>
+</p:notes>
+</file>
+
+<file path=ppt/notesSlides/notesSlide8.xml><?xml version="1.0" encoding="utf-8"?>
+<p:notes xmlns:a="http://schemas.openxmlformats.org/drawingml/2006/main" xmlns:r="http://schemas.openxmlformats.org/officeDocument/2006/relationships" xmlns:p="http://schemas.openxmlformats.org/presentationml/2006/main">
+  <p:cSld>
+    <p:spTree>
+      <p:nvGrpSpPr>
+        <p:cNvPr id="1" name=""/>
+        <p:cNvGrpSpPr/>
+        <p:nvPr/>
+      </p:nvGrpSpPr>
+      <p:grpSpPr>
+        <a:xfrm>
+          <a:off x="0" y="0"/>
+          <a:ext cx="0" cy="0"/>
+          <a:chOff x="0" y="0"/>
+          <a:chExt cx="0" cy="0"/>
+        </a:xfrm>
+      </p:grpSpPr>
+      <p:sp>
+        <p:nvSpPr>
+          <p:cNvPr id="2" name="Folienbildplatzhalter 1"/>
+          <p:cNvSpPr>
+            <a:spLocks noGrp="1" noRot="1" noChangeAspect="1"/>
+          </p:cNvSpPr>
+          <p:nvPr>
+            <p:ph type="sldImg"/>
+          </p:nvPr>
+        </p:nvSpPr>
+        <p:spPr/>
+      </p:sp>
+      <p:sp>
+        <p:nvSpPr>
+          <p:cNvPr id="3" name="Notizenplatzhalter 2"/>
+          <p:cNvSpPr>
+            <a:spLocks noGrp="1"/>
+          </p:cNvSpPr>
+          <p:nvPr>
+            <p:ph type="body" idx="1"/>
+          </p:nvPr>
+        </p:nvSpPr>
+        <p:spPr/>
+        <p:txBody>
+          <a:bodyPr/>
+          <a:lstStyle/>
+          <a:p>
+            <a:r>
+              <a:rPr lang="de-DE" dirty="0" smtClean="0"/>
+              <a:t>Unit</a:t>
+            </a:r>
+            <a:r>
+              <a:rPr lang="de-DE" baseline="0" dirty="0" smtClean="0"/>
+              <a:t>-Tests werden erstellt und schlagen fehl (Rot)</a:t>
+            </a:r>
+          </a:p>
+          <a:p>
+            <a:r>
+              <a:rPr lang="de-DE" baseline="0" dirty="0" smtClean="0"/>
+              <a:t>Code wird implementiert, bis Tests nicht mehr fehlschlagen (Green)</a:t>
+            </a:r>
+          </a:p>
+          <a:p>
+            <a:r>
+              <a:rPr lang="de-DE" baseline="0" dirty="0" smtClean="0"/>
+              <a:t>Code wird aufgeräumt und überflüssige Zeilen werden entfernt (</a:t>
+            </a:r>
+            <a:r>
+              <a:rPr lang="de-DE" baseline="0" dirty="0" err="1" smtClean="0"/>
+              <a:t>Refactoring</a:t>
+            </a:r>
+            <a:r>
+              <a:rPr lang="de-DE" baseline="0" dirty="0" smtClean="0"/>
+              <a:t>)</a:t>
+            </a:r>
+          </a:p>
+          <a:p>
+            <a:endParaRPr lang="de-DE" baseline="0" dirty="0" smtClean="0"/>
+          </a:p>
+          <a:p>
+            <a:r>
+              <a:rPr lang="de-DE" baseline="0" dirty="0" smtClean="0"/>
+              <a:t>Testabdeckung mit Fokus auf die Datenbankverbindung und der </a:t>
+            </a:r>
+            <a:r>
+              <a:rPr lang="de-DE" baseline="0" dirty="0" err="1" smtClean="0"/>
+              <a:t>Datenkonsistens</a:t>
+            </a:r>
+            <a:endParaRPr lang="de-DE" dirty="0"/>
+          </a:p>
+        </p:txBody>
+      </p:sp>
+      <p:sp>
+        <p:nvSpPr>
+          <p:cNvPr id="4" name="Foliennummernplatzhalter 3"/>
+          <p:cNvSpPr>
+            <a:spLocks noGrp="1"/>
+          </p:cNvSpPr>
+          <p:nvPr>
+            <p:ph type="sldNum" sz="quarter" idx="10"/>
+          </p:nvPr>
+        </p:nvSpPr>
+        <p:spPr/>
+        <p:txBody>
+          <a:bodyPr/>
+          <a:lstStyle/>
+          <a:p>
+            <a:fld id="{5F898C9E-79AA-49F5-983B-85D49666B96C}" type="slidenum">
+              <a:rPr lang="de-DE" smtClean="0"/>
+              <a:t>9</a:t>
+            </a:fld>
+            <a:endParaRPr lang="de-DE"/>
+          </a:p>
+        </p:txBody>
+      </p:sp>
+    </p:spTree>
+    <p:extLst>
+      <p:ext uri="{BB962C8B-B14F-4D97-AF65-F5344CB8AC3E}">
+        <p14:creationId xmlns:p14="http://schemas.microsoft.com/office/powerpoint/2010/main" val="3142981069"/>
+      </p:ext>
+    </p:extLst>
+  </p:cSld>
+  <p:clrMapOvr>
+    <a:masterClrMapping/>
+  </p:clrMapOvr>
+</p:notes>
+</file>
+
+<file path=ppt/notesSlides/notesSlide9.xml><?xml version="1.0" encoding="utf-8"?>
+<p:notes xmlns:a="http://schemas.openxmlformats.org/drawingml/2006/main" xmlns:r="http://schemas.openxmlformats.org/officeDocument/2006/relationships" xmlns:p="http://schemas.openxmlformats.org/presentationml/2006/main">
+  <p:cSld>
+    <p:spTree>
+      <p:nvGrpSpPr>
+        <p:cNvPr id="1" name=""/>
+        <p:cNvGrpSpPr/>
+        <p:nvPr/>
+      </p:nvGrpSpPr>
+      <p:grpSpPr>
+        <a:xfrm>
+          <a:off x="0" y="0"/>
+          <a:ext cx="0" cy="0"/>
+          <a:chOff x="0" y="0"/>
+          <a:chExt cx="0" cy="0"/>
+        </a:xfrm>
+      </p:grpSpPr>
+      <p:sp>
+        <p:nvSpPr>
+          <p:cNvPr id="2" name="Folienbildplatzhalter 1"/>
+          <p:cNvSpPr>
+            <a:spLocks noGrp="1" noRot="1" noChangeAspect="1"/>
+          </p:cNvSpPr>
+          <p:nvPr>
+            <p:ph type="sldImg"/>
+          </p:nvPr>
+        </p:nvSpPr>
+        <p:spPr/>
+      </p:sp>
+      <p:sp>
+        <p:nvSpPr>
+          <p:cNvPr id="3" name="Notizenplatzhalter 2"/>
+          <p:cNvSpPr>
+            <a:spLocks noGrp="1"/>
+          </p:cNvSpPr>
+          <p:nvPr>
+            <p:ph type="body" idx="1"/>
+          </p:nvPr>
+        </p:nvSpPr>
+        <p:spPr/>
+        <p:txBody>
+          <a:bodyPr/>
+          <a:lstStyle/>
+          <a:p>
+            <a:endParaRPr lang="de-DE" dirty="0"/>
+          </a:p>
+        </p:txBody>
+      </p:sp>
+      <p:sp>
+        <p:nvSpPr>
+          <p:cNvPr id="4" name="Foliennummernplatzhalter 3"/>
+          <p:cNvSpPr>
+            <a:spLocks noGrp="1"/>
+          </p:cNvSpPr>
+          <p:nvPr>
+            <p:ph type="sldNum" sz="quarter" idx="10"/>
+          </p:nvPr>
+        </p:nvSpPr>
+        <p:spPr/>
+        <p:txBody>
+          <a:bodyPr/>
+          <a:lstStyle/>
+          <a:p>
+            <a:fld id="{5F898C9E-79AA-49F5-983B-85D49666B96C}" type="slidenum">
+              <a:rPr lang="de-DE" smtClean="0"/>
+              <a:t>10</a:t>
+            </a:fld>
+            <a:endParaRPr lang="de-DE"/>
+          </a:p>
+        </p:txBody>
+      </p:sp>
+    </p:spTree>
+    <p:extLst>
+      <p:ext uri="{BB962C8B-B14F-4D97-AF65-F5344CB8AC3E}">
+        <p14:creationId xmlns:p14="http://schemas.microsoft.com/office/powerpoint/2010/main" val="259962860"/>
+      </p:ext>
+    </p:extLst>
   </p:cSld>
   <p:clrMapOvr>
     <a:masterClrMapping/>
@@ -1155,7 +1904,7 @@
           <a:p>
             <a:fld id="{589E9101-0A57-40FF-95DB-3AEFC76CAD8A}" type="datetime1">
               <a:rPr lang="de-DE" smtClean="0"/>
-              <a:t>06.05.2016</a:t>
+              <a:t>10.05.2016</a:t>
             </a:fld>
             <a:endParaRPr lang="de-DE"/>
           </a:p>
@@ -1518,7 +2267,7 @@
           <a:p>
             <a:fld id="{B6B05801-08C6-4164-B203-94DCDA8BAE53}" type="datetime1">
               <a:rPr lang="de-DE" smtClean="0"/>
-              <a:t>06.05.2016</a:t>
+              <a:t>10.05.2016</a:t>
             </a:fld>
             <a:endParaRPr lang="de-DE"/>
           </a:p>
@@ -1697,7 +2446,7 @@
           <a:p>
             <a:fld id="{B7BE1875-3FCB-45CB-AE2F-8CA91420BD64}" type="datetime1">
               <a:rPr lang="de-DE" smtClean="0"/>
-              <a:t>06.05.2016</a:t>
+              <a:t>10.05.2016</a:t>
             </a:fld>
             <a:endParaRPr lang="de-DE"/>
           </a:p>
@@ -1936,7 +2685,7 @@
           <a:p>
             <a:fld id="{3EAC9F25-C81C-4864-8663-E08EC7D03295}" type="datetime1">
               <a:rPr lang="de-DE" smtClean="0"/>
-              <a:t>06.05.2016</a:t>
+              <a:t>10.05.2016</a:t>
             </a:fld>
             <a:endParaRPr lang="de-DE"/>
           </a:p>
@@ -2209,7 +2958,7 @@
           <a:p>
             <a:fld id="{C6A5A5AE-9BFF-4276-9AB1-92A8B3D07B38}" type="datetime1">
               <a:rPr lang="de-DE" smtClean="0"/>
-              <a:t>06.05.2016</a:t>
+              <a:t>10.05.2016</a:t>
             </a:fld>
             <a:endParaRPr lang="de-DE"/>
           </a:p>
@@ -2433,7 +3182,7 @@
           <a:p>
             <a:fld id="{B1376325-24E8-4B47-9141-C80390B74AF3}" type="datetime1">
               <a:rPr lang="de-DE" smtClean="0"/>
-              <a:t>06.05.2016</a:t>
+              <a:t>10.05.2016</a:t>
             </a:fld>
             <a:endParaRPr lang="de-DE"/>
           </a:p>
@@ -2789,7 +3538,7 @@
           <a:p>
             <a:fld id="{8550A3E2-E3EE-4DF2-838A-5C507645BA25}" type="datetime1">
               <a:rPr lang="de-DE" smtClean="0"/>
-              <a:t>06.05.2016</a:t>
+              <a:t>10.05.2016</a:t>
             </a:fld>
             <a:endParaRPr lang="de-DE"/>
           </a:p>
@@ -3025,7 +3774,7 @@
           <a:p>
             <a:fld id="{F3B357C8-9EA6-49F6-903E-07E3FA028202}" type="datetime1">
               <a:rPr lang="de-DE" smtClean="0"/>
-              <a:t>06.05.2016</a:t>
+              <a:t>10.05.2016</a:t>
             </a:fld>
             <a:endParaRPr lang="de-DE"/>
           </a:p>
@@ -3169,7 +3918,7 @@
           <a:p>
             <a:fld id="{446D090E-AC8B-49C9-AD71-C42508C98946}" type="datetime1">
               <a:rPr lang="de-DE" smtClean="0"/>
-              <a:t>06.05.2016</a:t>
+              <a:t>10.05.2016</a:t>
             </a:fld>
             <a:endParaRPr lang="de-DE"/>
           </a:p>
@@ -3450,7 +4199,7 @@
           <a:p>
             <a:fld id="{5B6D69C0-18ED-40E5-958F-868639F01E05}" type="datetime1">
               <a:rPr lang="de-DE" smtClean="0"/>
-              <a:t>06.05.2016</a:t>
+              <a:t>10.05.2016</a:t>
             </a:fld>
             <a:endParaRPr lang="de-DE"/>
           </a:p>
@@ -3861,7 +4610,7 @@
           <a:p>
             <a:fld id="{34E89A8D-E0A7-41AC-8DB4-1A068E8ADE23}" type="datetime1">
               <a:rPr lang="de-DE" smtClean="0"/>
-              <a:t>06.05.2016</a:t>
+              <a:t>10.05.2016</a:t>
             </a:fld>
             <a:endParaRPr lang="de-DE"/>
           </a:p>
@@ -4203,7 +4952,7 @@
           <a:p>
             <a:fld id="{82C11CE6-0549-40F5-B4A2-44089F8500DE}" type="datetime1">
               <a:rPr lang="de-DE" smtClean="0"/>
-              <a:t>06.05.2016</a:t>
+              <a:t>10.05.2016</a:t>
             </a:fld>
             <a:endParaRPr lang="de-DE"/>
           </a:p>
@@ -6457,15 +7206,24 @@
         </p:nvSpPr>
         <p:spPr>
           <a:xfrm>
-            <a:off x="4726360" y="1556792"/>
+            <a:off x="4726360" y="1988840"/>
             <a:ext cx="3816424" cy="3168352"/>
           </a:xfrm>
           <a:prstGeom prst="rect">
             <a:avLst/>
           </a:prstGeom>
-          <a:solidFill>
-            <a:srgbClr val="C6E5B5"/>
-          </a:solidFill>
+          <a:gradFill flip="none" rotWithShape="1">
+            <a:gsLst>
+              <a:gs pos="0">
+                <a:srgbClr val="C6E5B5"/>
+              </a:gs>
+              <a:gs pos="100000">
+                <a:srgbClr val="DCEFD1"/>
+              </a:gs>
+            </a:gsLst>
+            <a:lin ang="16200000" scaled="1"/>
+            <a:tileRect/>
+          </a:gradFill>
         </p:spPr>
         <p:style>
           <a:lnRef idx="2">
@@ -6500,15 +7258,24 @@
         </p:nvSpPr>
         <p:spPr>
           <a:xfrm>
-            <a:off x="549896" y="1556792"/>
+            <a:off x="549896" y="1988840"/>
             <a:ext cx="3816424" cy="3168352"/>
           </a:xfrm>
           <a:prstGeom prst="rect">
             <a:avLst/>
           </a:prstGeom>
-          <a:solidFill>
-            <a:srgbClr val="C6E5B5"/>
-          </a:solidFill>
+          <a:gradFill flip="none" rotWithShape="1">
+            <a:gsLst>
+              <a:gs pos="0">
+                <a:srgbClr val="C6E5B5"/>
+              </a:gs>
+              <a:gs pos="100000">
+                <a:srgbClr val="DCEFD1"/>
+              </a:gs>
+            </a:gsLst>
+            <a:lin ang="16200000" scaled="1"/>
+            <a:tileRect/>
+          </a:gradFill>
         </p:spPr>
         <p:style>
           <a:lnRef idx="2">
@@ -6570,14 +7337,15 @@
         </p:nvSpPr>
         <p:spPr>
           <a:xfrm>
-            <a:off x="539552" y="1285875"/>
-            <a:ext cx="4040188" cy="685800"/>
+            <a:off x="539552" y="1988839"/>
+            <a:ext cx="3826768" cy="414883"/>
           </a:xfrm>
         </p:spPr>
         <p:txBody>
           <a:bodyPr/>
           <a:lstStyle/>
           <a:p>
+            <a:pPr algn="ctr"/>
             <a:r>
               <a:rPr lang="de-DE" dirty="0" smtClean="0">
                 <a:solidFill>
@@ -6606,14 +7374,17 @@
         </p:nvSpPr>
         <p:spPr>
           <a:xfrm>
-            <a:off x="4730552" y="1295400"/>
-            <a:ext cx="4041775" cy="685800"/>
+            <a:off x="4730553" y="1988840"/>
+            <a:ext cx="3812232" cy="424408"/>
           </a:xfrm>
         </p:spPr>
         <p:txBody>
-          <a:bodyPr/>
-          <a:lstStyle/>
-          <a:p>
+          <a:bodyPr>
+            <a:normAutofit lnSpcReduction="10000"/>
+          </a:bodyPr>
+          <a:lstStyle/>
+          <a:p>
+            <a:pPr algn="ctr"/>
             <a:r>
               <a:rPr lang="de-DE" dirty="0" smtClean="0">
                 <a:solidFill>
@@ -6642,13 +7413,13 @@
         </p:nvSpPr>
         <p:spPr>
           <a:xfrm>
-            <a:off x="539552" y="2174875"/>
+            <a:off x="539552" y="2606923"/>
             <a:ext cx="3466728" cy="2190229"/>
           </a:xfrm>
         </p:spPr>
         <p:txBody>
           <a:bodyPr>
-            <a:normAutofit fontScale="85000" lnSpcReduction="10000"/>
+            <a:normAutofit fontScale="92500"/>
           </a:bodyPr>
           <a:lstStyle/>
           <a:p>
@@ -6702,7 +7473,7 @@
         </p:nvSpPr>
         <p:spPr>
           <a:xfrm>
-            <a:off x="4716016" y="2133600"/>
+            <a:off x="4716016" y="2565648"/>
             <a:ext cx="3452192" cy="2375520"/>
           </a:xfrm>
         </p:spPr>
@@ -6715,8 +7486,9 @@
             </a:pPr>
             <a:r>
               <a:rPr lang="de-DE" dirty="0" smtClean="0"/>
-              <a:t>Erweiterbarkeit</a:t>
-            </a:r>
+              <a:t>Erweiterungen</a:t>
+            </a:r>
+            <a:endParaRPr lang="de-DE" dirty="0" smtClean="0"/>
           </a:p>
           <a:p>
             <a:pPr lvl="1">
@@ -6802,7 +7574,7 @@
         </p:nvCxnSpPr>
         <p:spPr>
           <a:xfrm>
-            <a:off x="549896" y="1988840"/>
+            <a:off x="549896" y="2420888"/>
             <a:ext cx="3816424" cy="0"/>
           </a:xfrm>
           <a:prstGeom prst="line">
@@ -6837,7 +7609,7 @@
         </p:nvCxnSpPr>
         <p:spPr>
           <a:xfrm>
-            <a:off x="4726360" y="1985086"/>
+            <a:off x="4726360" y="2417134"/>
             <a:ext cx="3816424" cy="0"/>
           </a:xfrm>
           <a:prstGeom prst="line">
@@ -7067,11 +7839,7 @@
             </a:r>
             <a:r>
               <a:rPr lang="de-DE" dirty="0" smtClean="0"/>
-              <a:t> (Abgerufen: 06.05.2016 17:00</a:t>
-            </a:r>
-            <a:r>
-              <a:rPr lang="de-DE" dirty="0" smtClean="0"/>
-              <a:t>)</a:t>
+              <a:t> (Abgerufen: 06.05.2016 17:00)</a:t>
             </a:r>
           </a:p>
           <a:p>
@@ -7109,9 +7877,24 @@
               <a:rPr lang="de-DE" dirty="0" smtClean="0"/>
               <a:t> (Abgerufen: 06.05.2016 17:15)</a:t>
             </a:r>
-            <a:endParaRPr lang="de-DE" dirty="0" smtClean="0"/>
-          </a:p>
-          <a:p>
+          </a:p>
+          <a:p>
+            <a:r>
+              <a:rPr lang="de-DE" dirty="0">
+                <a:hlinkClick r:id="rId6"/>
+              </a:rPr>
+              <a:t>http://</a:t>
+            </a:r>
+            <a:r>
+              <a:rPr lang="de-DE" dirty="0" smtClean="0">
+                <a:hlinkClick r:id="rId6"/>
+              </a:rPr>
+              <a:t>ardalis.com/wp-content/uploads/2015/03/red-green-refactor-commit.png</a:t>
+            </a:r>
+            <a:r>
+              <a:rPr lang="de-DE" dirty="0" smtClean="0"/>
+              <a:t> (Abgerufen: 10.05.2016 18:00)</a:t>
+            </a:r>
             <a:endParaRPr lang="de-DE" dirty="0"/>
           </a:p>
         </p:txBody>
@@ -9218,60 +10001,58 @@
           </a:p>
         </p:txBody>
       </p:sp>
+      <p:sp>
+        <p:nvSpPr>
+          <p:cNvPr id="8" name="Foliennummernplatzhalter 7"/>
+          <p:cNvSpPr>
+            <a:spLocks noGrp="1"/>
+          </p:cNvSpPr>
+          <p:nvPr>
+            <p:ph type="sldNum" sz="quarter" idx="12"/>
+          </p:nvPr>
+        </p:nvSpPr>
+        <p:spPr/>
+        <p:txBody>
+          <a:bodyPr/>
+          <a:lstStyle/>
+          <a:p>
+            <a:r>
+              <a:rPr lang="de-DE" dirty="0" smtClean="0"/>
+              <a:t>6</a:t>
+            </a:r>
+          </a:p>
+        </p:txBody>
+      </p:sp>
       <p:pic>
         <p:nvPicPr>
-          <p:cNvPr id="1027" name="Picture 3"/>
+          <p:cNvPr id="3" name="Grafik 2"/>
           <p:cNvPicPr>
-            <a:picLocks noChangeAspect="1" noChangeArrowheads="1"/>
+            <a:picLocks noChangeAspect="1"/>
           </p:cNvPicPr>
           <p:nvPr/>
         </p:nvPicPr>
         <p:blipFill>
-          <a:blip r:embed="rId2" cstate="print"/>
-          <a:srcRect/>
+          <a:blip r:embed="rId3">
+            <a:extLst>
+              <a:ext uri="{28A0092B-C50C-407E-A947-70E740481C1C}">
+                <a14:useLocalDpi xmlns:a14="http://schemas.microsoft.com/office/drawing/2010/main" val="0"/>
+              </a:ext>
+            </a:extLst>
+          </a:blip>
           <a:stretch>
             <a:fillRect/>
           </a:stretch>
         </p:blipFill>
-        <p:spPr bwMode="auto">
+        <p:spPr>
           <a:xfrm>
-            <a:off x="1187624" y="1196752"/>
-            <a:ext cx="6768752" cy="5074115"/>
+            <a:off x="1227284" y="1268760"/>
+            <a:ext cx="6657084" cy="4968552"/>
           </a:xfrm>
           <a:prstGeom prst="rect">
             <a:avLst/>
           </a:prstGeom>
-          <a:noFill/>
-          <a:ln w="9525">
-            <a:noFill/>
-            <a:miter lim="800000"/>
-            <a:headEnd/>
-            <a:tailEnd/>
-          </a:ln>
         </p:spPr>
       </p:pic>
-      <p:sp>
-        <p:nvSpPr>
-          <p:cNvPr id="8" name="Foliennummernplatzhalter 7"/>
-          <p:cNvSpPr>
-            <a:spLocks noGrp="1"/>
-          </p:cNvSpPr>
-          <p:nvPr>
-            <p:ph type="sldNum" sz="quarter" idx="12"/>
-          </p:nvPr>
-        </p:nvSpPr>
-        <p:spPr/>
-        <p:txBody>
-          <a:bodyPr/>
-          <a:lstStyle/>
-          <a:p>
-            <a:r>
-              <a:rPr lang="de-DE" dirty="0" smtClean="0"/>
-              <a:t>6</a:t>
-            </a:r>
-          </a:p>
-        </p:txBody>
-      </p:sp>
     </p:spTree>
   </p:cSld>
   <p:clrMapOvr>
@@ -9501,7 +10282,7 @@
             </a:r>
             <a:r>
               <a:rPr lang="de-DE" dirty="0" err="1" smtClean="0"/>
-              <a:t>Refactor</a:t>
+              <a:t>Refactoring</a:t>
             </a:r>
             <a:endParaRPr lang="de-DE" dirty="0" smtClean="0"/>
           </a:p>
@@ -9577,6 +10358,36 @@
           </a:p>
         </p:txBody>
       </p:sp>
+      <p:pic>
+        <p:nvPicPr>
+          <p:cNvPr id="4" name="Grafik 3"/>
+          <p:cNvPicPr>
+            <a:picLocks noChangeAspect="1"/>
+          </p:cNvPicPr>
+          <p:nvPr/>
+        </p:nvPicPr>
+        <p:blipFill>
+          <a:blip r:embed="rId3">
+            <a:extLst>
+              <a:ext uri="{28A0092B-C50C-407E-A947-70E740481C1C}">
+                <a14:useLocalDpi xmlns:a14="http://schemas.microsoft.com/office/drawing/2010/main" val="0"/>
+              </a:ext>
+            </a:extLst>
+          </a:blip>
+          <a:stretch>
+            <a:fillRect/>
+          </a:stretch>
+        </p:blipFill>
+        <p:spPr>
+          <a:xfrm>
+            <a:off x="4976313" y="1916832"/>
+            <a:ext cx="3573016" cy="3573016"/>
+          </a:xfrm>
+          <a:prstGeom prst="rect">
+            <a:avLst/>
+          </a:prstGeom>
+        </p:spPr>
+      </p:pic>
     </p:spTree>
   </p:cSld>
   <p:clrMapOvr>

</xml_diff>

<commit_message>
[IMS-?] Dokumentation und Präsentation erweitert
</commit_message>
<xml_diff>
--- a/Doku/Präsentation.pptx
+++ b/Doku/Präsentation.pptx
@@ -5,7 +5,7 @@
     <p:sldMasterId id="2147483732" r:id="rId1"/>
   </p:sldMasterIdLst>
   <p:notesMasterIdLst>
-    <p:notesMasterId r:id="rId19"/>
+    <p:notesMasterId r:id="rId21"/>
   </p:notesMasterIdLst>
   <p:sldIdLst>
     <p:sldId id="256" r:id="rId2"/>
@@ -20,11 +20,13 @@
     <p:sldId id="276" r:id="rId11"/>
     <p:sldId id="267" r:id="rId12"/>
     <p:sldId id="268" r:id="rId13"/>
-    <p:sldId id="269" r:id="rId14"/>
-    <p:sldId id="277" r:id="rId15"/>
-    <p:sldId id="271" r:id="rId16"/>
-    <p:sldId id="273" r:id="rId17"/>
-    <p:sldId id="272" r:id="rId18"/>
+    <p:sldId id="278" r:id="rId14"/>
+    <p:sldId id="269" r:id="rId15"/>
+    <p:sldId id="277" r:id="rId16"/>
+    <p:sldId id="271" r:id="rId17"/>
+    <p:sldId id="273" r:id="rId18"/>
+    <p:sldId id="272" r:id="rId19"/>
+    <p:sldId id="279" r:id="rId20"/>
   </p:sldIdLst>
   <p:sldSz cx="9144000" cy="6858000" type="screen4x3"/>
   <p:notesSz cx="6858000" cy="9144000"/>
@@ -209,7 +211,7 @@
             <a:fld id="{8B15DE1F-419D-4D02-82BC-F91BB41CE353}" type="datetimeFigureOut">
               <a:rPr lang="de-DE" smtClean="0"/>
               <a:pPr/>
-              <a:t>11.05.2016</a:t>
+              <a:t>16.05.2016</a:t>
             </a:fld>
             <a:endParaRPr lang="de-DE"/>
           </a:p>
@@ -380,7 +382,7 @@
     </p:spTree>
     <p:extLst>
       <p:ext uri="{BB962C8B-B14F-4D97-AF65-F5344CB8AC3E}">
-        <p14:creationId xmlns:p14="http://schemas.microsoft.com/office/powerpoint/2010/main" xmlns="" val="1217405143"/>
+        <p14:creationId xmlns:p14="http://schemas.microsoft.com/office/powerpoint/2010/main" val="1217405143"/>
       </p:ext>
     </p:extLst>
   </p:cSld>
@@ -865,7 +867,7 @@
             <a:fld id="{5F898C9E-79AA-49F5-983B-85D49666B96C}" type="slidenum">
               <a:rPr lang="de-DE" smtClean="0"/>
               <a:pPr/>
-              <a:t>15</a:t>
+              <a:t>16</a:t>
             </a:fld>
             <a:endParaRPr lang="de-DE"/>
           </a:p>
@@ -874,7 +876,7 @@
     </p:spTree>
     <p:extLst>
       <p:ext uri="{BB962C8B-B14F-4D97-AF65-F5344CB8AC3E}">
-        <p14:creationId xmlns:p14="http://schemas.microsoft.com/office/powerpoint/2010/main" xmlns="" val="3147031468"/>
+        <p14:creationId xmlns:p14="http://schemas.microsoft.com/office/powerpoint/2010/main" val="3147031468"/>
       </p:ext>
     </p:extLst>
   </p:cSld>
@@ -956,7 +958,7 @@
             <a:fld id="{5F898C9E-79AA-49F5-983B-85D49666B96C}" type="slidenum">
               <a:rPr lang="de-DE" smtClean="0"/>
               <a:pPr/>
-              <a:t>16</a:t>
+              <a:t>17</a:t>
             </a:fld>
             <a:endParaRPr lang="de-DE"/>
           </a:p>
@@ -1063,7 +1065,7 @@
     </p:spTree>
     <p:extLst>
       <p:ext uri="{BB962C8B-B14F-4D97-AF65-F5344CB8AC3E}">
-        <p14:creationId xmlns:p14="http://schemas.microsoft.com/office/powerpoint/2010/main" xmlns="" val="564717387"/>
+        <p14:creationId xmlns:p14="http://schemas.microsoft.com/office/powerpoint/2010/main" val="564717387"/>
       </p:ext>
     </p:extLst>
   </p:cSld>
@@ -1156,7 +1158,7 @@
     </p:spTree>
     <p:extLst>
       <p:ext uri="{BB962C8B-B14F-4D97-AF65-F5344CB8AC3E}">
-        <p14:creationId xmlns:p14="http://schemas.microsoft.com/office/powerpoint/2010/main" xmlns="" val="2490451349"/>
+        <p14:creationId xmlns:p14="http://schemas.microsoft.com/office/powerpoint/2010/main" val="2490451349"/>
       </p:ext>
     </p:extLst>
   </p:cSld>
@@ -1218,6 +1220,12 @@
               <a:rPr lang="de-DE" baseline="0" dirty="0" smtClean="0"/>
               <a:t> in schriftlicher Form im Lastenheft festgehalten</a:t>
             </a:r>
+          </a:p>
+          <a:p>
+            <a:r>
+              <a:rPr lang="de-DE" baseline="0" smtClean="0"/>
+              <a:t>Verteiltes Verwalten der Daten</a:t>
+            </a:r>
             <a:endParaRPr lang="de-DE" dirty="0"/>
           </a:p>
         </p:txBody>
@@ -1249,7 +1257,7 @@
     </p:spTree>
     <p:extLst>
       <p:ext uri="{BB962C8B-B14F-4D97-AF65-F5344CB8AC3E}">
-        <p14:creationId xmlns:p14="http://schemas.microsoft.com/office/powerpoint/2010/main" xmlns="" val="2882050055"/>
+        <p14:creationId xmlns:p14="http://schemas.microsoft.com/office/powerpoint/2010/main" val="2882050055"/>
       </p:ext>
     </p:extLst>
   </p:cSld>
@@ -1334,7 +1342,7 @@
     </p:spTree>
     <p:extLst>
       <p:ext uri="{BB962C8B-B14F-4D97-AF65-F5344CB8AC3E}">
-        <p14:creationId xmlns:p14="http://schemas.microsoft.com/office/powerpoint/2010/main" xmlns="" val="701333180"/>
+        <p14:creationId xmlns:p14="http://schemas.microsoft.com/office/powerpoint/2010/main" val="701333180"/>
       </p:ext>
     </p:extLst>
   </p:cSld>
@@ -1433,7 +1441,7 @@
     </p:spTree>
     <p:extLst>
       <p:ext uri="{BB962C8B-B14F-4D97-AF65-F5344CB8AC3E}">
-        <p14:creationId xmlns:p14="http://schemas.microsoft.com/office/powerpoint/2010/main" xmlns="" val="2579384574"/>
+        <p14:creationId xmlns:p14="http://schemas.microsoft.com/office/powerpoint/2010/main" val="2579384574"/>
       </p:ext>
     </p:extLst>
   </p:cSld>
@@ -1546,7 +1554,7 @@
     </p:spTree>
     <p:extLst>
       <p:ext uri="{BB962C8B-B14F-4D97-AF65-F5344CB8AC3E}">
-        <p14:creationId xmlns:p14="http://schemas.microsoft.com/office/powerpoint/2010/main" xmlns="" val="4031942451"/>
+        <p14:creationId xmlns:p14="http://schemas.microsoft.com/office/powerpoint/2010/main" val="4031942451"/>
       </p:ext>
     </p:extLst>
   </p:cSld>
@@ -1672,7 +1680,7 @@
     </p:spTree>
     <p:extLst>
       <p:ext uri="{BB962C8B-B14F-4D97-AF65-F5344CB8AC3E}">
-        <p14:creationId xmlns:p14="http://schemas.microsoft.com/office/powerpoint/2010/main" xmlns="" val="3142981069"/>
+        <p14:creationId xmlns:p14="http://schemas.microsoft.com/office/powerpoint/2010/main" val="3142981069"/>
       </p:ext>
     </p:extLst>
   </p:cSld>
@@ -1757,7 +1765,7 @@
     </p:spTree>
     <p:extLst>
       <p:ext uri="{BB962C8B-B14F-4D97-AF65-F5344CB8AC3E}">
-        <p14:creationId xmlns:p14="http://schemas.microsoft.com/office/powerpoint/2010/main" xmlns="" val="259962860"/>
+        <p14:creationId xmlns:p14="http://schemas.microsoft.com/office/powerpoint/2010/main" val="259962860"/>
       </p:ext>
     </p:extLst>
   </p:cSld>
@@ -1911,7 +1919,7 @@
             <a:fld id="{589E9101-0A57-40FF-95DB-3AEFC76CAD8A}" type="datetime1">
               <a:rPr lang="de-DE" smtClean="0"/>
               <a:pPr/>
-              <a:t>11.05.2016</a:t>
+              <a:t>16.05.2016</a:t>
             </a:fld>
             <a:endParaRPr lang="de-DE"/>
           </a:p>
@@ -2276,7 +2284,7 @@
             <a:fld id="{B6B05801-08C6-4164-B203-94DCDA8BAE53}" type="datetime1">
               <a:rPr lang="de-DE" smtClean="0"/>
               <a:pPr/>
-              <a:t>11.05.2016</a:t>
+              <a:t>16.05.2016</a:t>
             </a:fld>
             <a:endParaRPr lang="de-DE"/>
           </a:p>
@@ -2457,7 +2465,7 @@
             <a:fld id="{B7BE1875-3FCB-45CB-AE2F-8CA91420BD64}" type="datetime1">
               <a:rPr lang="de-DE" smtClean="0"/>
               <a:pPr/>
-              <a:t>11.05.2016</a:t>
+              <a:t>16.05.2016</a:t>
             </a:fld>
             <a:endParaRPr lang="de-DE"/>
           </a:p>
@@ -2698,7 +2706,7 @@
             <a:fld id="{3EAC9F25-C81C-4864-8663-E08EC7D03295}" type="datetime1">
               <a:rPr lang="de-DE" smtClean="0"/>
               <a:pPr/>
-              <a:t>11.05.2016</a:t>
+              <a:t>16.05.2016</a:t>
             </a:fld>
             <a:endParaRPr lang="de-DE"/>
           </a:p>
@@ -2973,7 +2981,7 @@
             <a:fld id="{C6A5A5AE-9BFF-4276-9AB1-92A8B3D07B38}" type="datetime1">
               <a:rPr lang="de-DE" smtClean="0"/>
               <a:pPr/>
-              <a:t>11.05.2016</a:t>
+              <a:t>16.05.2016</a:t>
             </a:fld>
             <a:endParaRPr lang="de-DE"/>
           </a:p>
@@ -3199,7 +3207,7 @@
             <a:fld id="{B1376325-24E8-4B47-9141-C80390B74AF3}" type="datetime1">
               <a:rPr lang="de-DE" smtClean="0"/>
               <a:pPr/>
-              <a:t>11.05.2016</a:t>
+              <a:t>16.05.2016</a:t>
             </a:fld>
             <a:endParaRPr lang="de-DE"/>
           </a:p>
@@ -3557,7 +3565,7 @@
             <a:fld id="{8550A3E2-E3EE-4DF2-838A-5C507645BA25}" type="datetime1">
               <a:rPr lang="de-DE" smtClean="0"/>
               <a:pPr/>
-              <a:t>11.05.2016</a:t>
+              <a:t>16.05.2016</a:t>
             </a:fld>
             <a:endParaRPr lang="de-DE"/>
           </a:p>
@@ -3795,7 +3803,7 @@
             <a:fld id="{F3B357C8-9EA6-49F6-903E-07E3FA028202}" type="datetime1">
               <a:rPr lang="de-DE" smtClean="0"/>
               <a:pPr/>
-              <a:t>11.05.2016</a:t>
+              <a:t>16.05.2016</a:t>
             </a:fld>
             <a:endParaRPr lang="de-DE"/>
           </a:p>
@@ -3941,7 +3949,7 @@
             <a:fld id="{446D090E-AC8B-49C9-AD71-C42508C98946}" type="datetime1">
               <a:rPr lang="de-DE" smtClean="0"/>
               <a:pPr/>
-              <a:t>11.05.2016</a:t>
+              <a:t>16.05.2016</a:t>
             </a:fld>
             <a:endParaRPr lang="de-DE"/>
           </a:p>
@@ -4224,7 +4232,7 @@
             <a:fld id="{5B6D69C0-18ED-40E5-958F-868639F01E05}" type="datetime1">
               <a:rPr lang="de-DE" smtClean="0"/>
               <a:pPr/>
-              <a:t>11.05.2016</a:t>
+              <a:t>16.05.2016</a:t>
             </a:fld>
             <a:endParaRPr lang="de-DE"/>
           </a:p>
@@ -4637,7 +4645,7 @@
             <a:fld id="{34E89A8D-E0A7-41AC-8DB4-1A068E8ADE23}" type="datetime1">
               <a:rPr lang="de-DE" smtClean="0"/>
               <a:pPr/>
-              <a:t>11.05.2016</a:t>
+              <a:t>16.05.2016</a:t>
             </a:fld>
             <a:endParaRPr lang="de-DE"/>
           </a:p>
@@ -4981,7 +4989,7 @@
             <a:fld id="{82C11CE6-0549-40F5-B4A2-44089F8500DE}" type="datetime1">
               <a:rPr lang="de-DE" smtClean="0"/>
               <a:pPr/>
-              <a:t>11.05.2016</a:t>
+              <a:t>16.05.2016</a:t>
             </a:fld>
             <a:endParaRPr lang="de-DE"/>
           </a:p>
@@ -5611,7 +5619,7 @@
         <p:spPr>
           <a:xfrm>
             <a:off x="621904" y="1246312"/>
-            <a:ext cx="4536504" cy="4896544"/>
+            <a:ext cx="4536504" cy="4991000"/>
           </a:xfrm>
           <a:prstGeom prst="rect">
             <a:avLst/>
@@ -5837,7 +5845,7 @@
         </p:nvSpPr>
         <p:spPr>
           <a:xfrm>
-            <a:off x="621904" y="4990728"/>
+            <a:off x="621904" y="5301208"/>
             <a:ext cx="4536504" cy="360040"/>
           </a:xfrm>
           <a:prstGeom prst="rect">
@@ -5890,7 +5898,7 @@
         <p:spPr>
           <a:xfrm>
             <a:off x="623700" y="4089510"/>
-            <a:ext cx="4536504" cy="901218"/>
+            <a:ext cx="4536504" cy="1211698"/>
           </a:xfrm>
           <a:prstGeom prst="rect">
             <a:avLst/>
@@ -5937,7 +5945,7 @@
         <p:spPr>
           <a:xfrm>
             <a:off x="611560" y="1268760"/>
-            <a:ext cx="4402832" cy="4937760"/>
+            <a:ext cx="4402832" cy="5256584"/>
           </a:xfrm>
         </p:spPr>
         <p:txBody>
@@ -6059,6 +6067,22 @@
                   <a:schemeClr val="tx1"/>
                 </a:solidFill>
               </a:rPr>
+              <a:t>Oberflächenentwurf</a:t>
+            </a:r>
+            <a:endParaRPr lang="de-DE" dirty="0" smtClean="0">
+              <a:solidFill>
+                <a:schemeClr val="tx1"/>
+              </a:solidFill>
+            </a:endParaRPr>
+          </a:p>
+          <a:p>
+            <a:pPr lvl="1"/>
+            <a:r>
+              <a:rPr lang="de-DE" dirty="0" smtClean="0">
+                <a:solidFill>
+                  <a:schemeClr val="tx1"/>
+                </a:solidFill>
+              </a:rPr>
               <a:t>Pflichtenheft</a:t>
             </a:r>
           </a:p>
@@ -6117,7 +6141,7 @@
     </p:spTree>
     <p:extLst>
       <p:ext uri="{BB962C8B-B14F-4D97-AF65-F5344CB8AC3E}">
-        <p14:creationId xmlns:p14="http://schemas.microsoft.com/office/powerpoint/2010/main" xmlns="" val="1905236472"/>
+        <p14:creationId xmlns:p14="http://schemas.microsoft.com/office/powerpoint/2010/main" val="1905236472"/>
       </p:ext>
     </p:extLst>
   </p:cSld>
@@ -6266,7 +6290,7 @@
           <a:blip r:embed="rId3" cstate="print">
             <a:extLst>
               <a:ext uri="{28A0092B-C50C-407E-A947-70E740481C1C}">
-                <a14:useLocalDpi xmlns:a14="http://schemas.microsoft.com/office/drawing/2010/main" xmlns="" val="0"/>
+                <a14:useLocalDpi xmlns:a14="http://schemas.microsoft.com/office/drawing/2010/main" val="0"/>
               </a:ext>
             </a:extLst>
           </a:blip>
@@ -6355,7 +6379,7 @@
           <a:p>
             <a:r>
               <a:rPr lang="de-DE" dirty="0" smtClean="0"/>
-              <a:t>Datenbank Entwurf</a:t>
+              <a:t>Datenbankentwurf</a:t>
             </a:r>
             <a:endParaRPr lang="de-DE" dirty="0"/>
           </a:p>
@@ -6375,7 +6399,7 @@
           <a:blip r:embed="rId3" cstate="print">
             <a:extLst>
               <a:ext uri="{28A0092B-C50C-407E-A947-70E740481C1C}">
-                <a14:useLocalDpi xmlns:a14="http://schemas.microsoft.com/office/drawing/2010/main" xmlns="" val="0"/>
+                <a14:useLocalDpi xmlns:a14="http://schemas.microsoft.com/office/drawing/2010/main" val="0"/>
               </a:ext>
             </a:extLst>
           </a:blip>
@@ -6463,8 +6487,8 @@
           <a:lstStyle/>
           <a:p>
             <a:r>
-              <a:rPr lang="de-DE" dirty="0" err="1" smtClean="0"/>
-              <a:t>Plichtenheft</a:t>
+              <a:rPr lang="de-DE" dirty="0" smtClean="0"/>
+              <a:t>Oberflächenentwurf</a:t>
             </a:r>
             <a:endParaRPr lang="de-DE" dirty="0"/>
           </a:p>
@@ -6472,78 +6496,7 @@
       </p:sp>
       <p:sp>
         <p:nvSpPr>
-          <p:cNvPr id="3" name="Inhaltsplatzhalter 2"/>
-          <p:cNvSpPr>
-            <a:spLocks noGrp="1"/>
-          </p:cNvSpPr>
-          <p:nvPr>
-            <p:ph sz="quarter" idx="1"/>
-          </p:nvPr>
-        </p:nvSpPr>
-        <p:spPr/>
-        <p:txBody>
-          <a:bodyPr/>
-          <a:lstStyle/>
-          <a:p>
-            <a:r>
-              <a:rPr lang="de-DE" dirty="0" smtClean="0"/>
-              <a:t>C#</a:t>
-            </a:r>
-          </a:p>
-          <a:p>
-            <a:r>
-              <a:rPr lang="de-DE" dirty="0" err="1" smtClean="0"/>
-              <a:t>MariaDB</a:t>
-            </a:r>
-            <a:endParaRPr lang="de-DE" dirty="0" smtClean="0"/>
-          </a:p>
-          <a:p>
-            <a:r>
-              <a:rPr lang="de-DE" dirty="0" err="1" smtClean="0"/>
-              <a:t>Mockups</a:t>
-            </a:r>
-            <a:endParaRPr lang="de-DE" dirty="0" smtClean="0"/>
-          </a:p>
-          <a:p>
-            <a:r>
-              <a:rPr lang="de-DE" dirty="0" err="1" smtClean="0"/>
-              <a:t>Validatoren</a:t>
-            </a:r>
-            <a:endParaRPr lang="de-DE" dirty="0" smtClean="0"/>
-          </a:p>
-          <a:p>
-            <a:r>
-              <a:rPr lang="de-DE" dirty="0" smtClean="0"/>
-              <a:t>Windows </a:t>
-            </a:r>
-            <a:r>
-              <a:rPr lang="de-DE" dirty="0" err="1" smtClean="0"/>
-              <a:t>Presentation</a:t>
-            </a:r>
-            <a:r>
-              <a:rPr lang="de-DE" dirty="0" smtClean="0"/>
-              <a:t> </a:t>
-            </a:r>
-            <a:r>
-              <a:rPr lang="de-DE" dirty="0" err="1" smtClean="0"/>
-              <a:t>Foundation</a:t>
-            </a:r>
-            <a:r>
-              <a:rPr lang="de-DE" dirty="0" smtClean="0"/>
-              <a:t> (WPF)</a:t>
-            </a:r>
-          </a:p>
-          <a:p>
-            <a:endParaRPr lang="de-DE" dirty="0" smtClean="0"/>
-          </a:p>
-          <a:p>
-            <a:endParaRPr lang="de-DE" dirty="0"/>
-          </a:p>
-        </p:txBody>
-      </p:sp>
-      <p:sp>
-        <p:nvSpPr>
-          <p:cNvPr id="5" name="Foliennummernplatzhalter 4"/>
+          <p:cNvPr id="3" name="Foliennummernplatzhalter 2"/>
           <p:cNvSpPr>
             <a:spLocks noGrp="1"/>
           </p:cNvSpPr>
@@ -6564,7 +6517,113 @@
           </a:p>
         </p:txBody>
       </p:sp>
+      <p:sp>
+        <p:nvSpPr>
+          <p:cNvPr id="4" name="Inhaltsplatzhalter 3"/>
+          <p:cNvSpPr>
+            <a:spLocks noGrp="1"/>
+          </p:cNvSpPr>
+          <p:nvPr>
+            <p:ph sz="quarter" idx="1"/>
+          </p:nvPr>
+        </p:nvSpPr>
+        <p:spPr>
+          <a:xfrm>
+            <a:off x="457200" y="1219200"/>
+            <a:ext cx="8229600" cy="481608"/>
+          </a:xfrm>
+        </p:spPr>
+        <p:txBody>
+          <a:bodyPr>
+            <a:normAutofit lnSpcReduction="10000"/>
+          </a:bodyPr>
+          <a:lstStyle/>
+          <a:p>
+            <a:r>
+              <a:rPr lang="de-DE" dirty="0" smtClean="0"/>
+              <a:t>Gestalten einer ergonomischen Oberfläche</a:t>
+            </a:r>
+            <a:endParaRPr lang="de-DE" dirty="0"/>
+          </a:p>
+        </p:txBody>
+      </p:sp>
+      <p:pic>
+        <p:nvPicPr>
+          <p:cNvPr id="6" name="Grafik 5"/>
+          <p:cNvPicPr>
+            <a:picLocks noChangeAspect="1"/>
+          </p:cNvPicPr>
+          <p:nvPr/>
+        </p:nvPicPr>
+        <p:blipFill>
+          <a:blip r:embed="rId2">
+            <a:extLst>
+              <a:ext uri="{28A0092B-C50C-407E-A947-70E740481C1C}">
+                <a14:useLocalDpi xmlns:a14="http://schemas.microsoft.com/office/drawing/2010/main" val="0"/>
+              </a:ext>
+            </a:extLst>
+          </a:blip>
+          <a:stretch>
+            <a:fillRect/>
+          </a:stretch>
+        </p:blipFill>
+        <p:spPr>
+          <a:xfrm>
+            <a:off x="1027358" y="1772816"/>
+            <a:ext cx="7145042" cy="4464496"/>
+          </a:xfrm>
+          <a:prstGeom prst="rect">
+            <a:avLst/>
+          </a:prstGeom>
+        </p:spPr>
+      </p:pic>
+      <p:pic>
+        <p:nvPicPr>
+          <p:cNvPr id="1026" name="Picture 2" descr="D:\Schule\LF6 (ml) - Programmieren\2. Lehrjahr\Projekt\Doku\Mockups\mockup_interfaces.png"/>
+          <p:cNvPicPr>
+            <a:picLocks noChangeAspect="1" noChangeArrowheads="1"/>
+          </p:cNvPicPr>
+          <p:nvPr/>
+        </p:nvPicPr>
+        <p:blipFill>
+          <a:blip r:embed="rId3">
+            <a:extLst>
+              <a:ext uri="{28A0092B-C50C-407E-A947-70E740481C1C}">
+                <a14:useLocalDpi xmlns:a14="http://schemas.microsoft.com/office/drawing/2010/main" val="0"/>
+              </a:ext>
+            </a:extLst>
+          </a:blip>
+          <a:srcRect/>
+          <a:stretch>
+            <a:fillRect/>
+          </a:stretch>
+        </p:blipFill>
+        <p:spPr bwMode="auto">
+          <a:xfrm>
+            <a:off x="1775716" y="1704776"/>
+            <a:ext cx="5648325" cy="4600575"/>
+          </a:xfrm>
+          <a:prstGeom prst="rect">
+            <a:avLst/>
+          </a:prstGeom>
+          <a:noFill/>
+          <a:extLst>
+            <a:ext uri="{909E8E84-426E-40DD-AFC4-6F175D3DCCD1}">
+              <a14:hiddenFill xmlns:a14="http://schemas.microsoft.com/office/drawing/2010/main">
+                <a:solidFill>
+                  <a:srgbClr val="FFFFFF"/>
+                </a:solidFill>
+              </a14:hiddenFill>
+            </a:ext>
+          </a:extLst>
+        </p:spPr>
+      </p:pic>
     </p:spTree>
+    <p:extLst>
+      <p:ext uri="{BB962C8B-B14F-4D97-AF65-F5344CB8AC3E}">
+        <p14:creationId xmlns:p14="http://schemas.microsoft.com/office/powerpoint/2010/main" val="1612294899"/>
+      </p:ext>
+    </p:extLst>
   </p:cSld>
   <p:clrMapOvr>
     <a:masterClrMapping/>
@@ -6572,7 +6631,118 @@
   <p:timing>
     <p:tnLst>
       <p:par>
-        <p:cTn id="1" dur="indefinite" restart="never" nodeType="tmRoot"/>
+        <p:cTn id="1" dur="indefinite" restart="never" nodeType="tmRoot">
+          <p:childTnLst>
+            <p:seq concurrent="1" nextAc="seek">
+              <p:cTn id="2" dur="indefinite" nodeType="mainSeq">
+                <p:childTnLst>
+                  <p:par>
+                    <p:cTn id="3" fill="hold">
+                      <p:stCondLst>
+                        <p:cond delay="indefinite"/>
+                      </p:stCondLst>
+                      <p:childTnLst>
+                        <p:par>
+                          <p:cTn id="4" fill="hold">
+                            <p:stCondLst>
+                              <p:cond delay="0"/>
+                            </p:stCondLst>
+                            <p:childTnLst>
+                              <p:par>
+                                <p:cTn id="5" presetID="10" presetClass="exit" presetSubtype="0" fill="hold" nodeType="clickEffect">
+                                  <p:stCondLst>
+                                    <p:cond delay="0"/>
+                                  </p:stCondLst>
+                                  <p:childTnLst>
+                                    <p:animEffect transition="out" filter="fade">
+                                      <p:cBhvr>
+                                        <p:cTn id="6" dur="500"/>
+                                        <p:tgtEl>
+                                          <p:spTgt spid="6"/>
+                                        </p:tgtEl>
+                                      </p:cBhvr>
+                                    </p:animEffect>
+                                    <p:set>
+                                      <p:cBhvr>
+                                        <p:cTn id="7" dur="1" fill="hold">
+                                          <p:stCondLst>
+                                            <p:cond delay="499"/>
+                                          </p:stCondLst>
+                                        </p:cTn>
+                                        <p:tgtEl>
+                                          <p:spTgt spid="6"/>
+                                        </p:tgtEl>
+                                        <p:attrNameLst>
+                                          <p:attrName>style.visibility</p:attrName>
+                                        </p:attrNameLst>
+                                      </p:cBhvr>
+                                      <p:to>
+                                        <p:strVal val="hidden"/>
+                                      </p:to>
+                                    </p:set>
+                                  </p:childTnLst>
+                                </p:cTn>
+                              </p:par>
+                              <p:par>
+                                <p:cTn id="8" presetID="10" presetClass="entr" presetSubtype="0" fill="hold" nodeType="withEffect">
+                                  <p:stCondLst>
+                                    <p:cond delay="0"/>
+                                  </p:stCondLst>
+                                  <p:childTnLst>
+                                    <p:set>
+                                      <p:cBhvr>
+                                        <p:cTn id="9" dur="1" fill="hold">
+                                          <p:stCondLst>
+                                            <p:cond delay="0"/>
+                                          </p:stCondLst>
+                                        </p:cTn>
+                                        <p:tgtEl>
+                                          <p:spTgt spid="1026"/>
+                                        </p:tgtEl>
+                                        <p:attrNameLst>
+                                          <p:attrName>style.visibility</p:attrName>
+                                        </p:attrNameLst>
+                                      </p:cBhvr>
+                                      <p:to>
+                                        <p:strVal val="visible"/>
+                                      </p:to>
+                                    </p:set>
+                                    <p:animEffect transition="in" filter="fade">
+                                      <p:cBhvr>
+                                        <p:cTn id="10" dur="500"/>
+                                        <p:tgtEl>
+                                          <p:spTgt spid="1026"/>
+                                        </p:tgtEl>
+                                      </p:cBhvr>
+                                    </p:animEffect>
+                                  </p:childTnLst>
+                                </p:cTn>
+                              </p:par>
+                            </p:childTnLst>
+                          </p:cTn>
+                        </p:par>
+                      </p:childTnLst>
+                    </p:cTn>
+                  </p:par>
+                </p:childTnLst>
+              </p:cTn>
+              <p:prevCondLst>
+                <p:cond evt="onPrev" delay="0">
+                  <p:tgtEl>
+                    <p:sldTgt/>
+                  </p:tgtEl>
+                </p:cond>
+              </p:prevCondLst>
+              <p:nextCondLst>
+                <p:cond evt="onNext" delay="0">
+                  <p:tgtEl>
+                    <p:sldTgt/>
+                  </p:tgtEl>
+                </p:cond>
+              </p:nextCondLst>
+            </p:seq>
+          </p:childTnLst>
+        </p:cTn>
       </p:par>
     </p:tnLst>
   </p:timing>
@@ -6598,6 +6768,155 @@
       </p:grpSpPr>
       <p:sp>
         <p:nvSpPr>
+          <p:cNvPr id="2" name="Titel 1"/>
+          <p:cNvSpPr>
+            <a:spLocks noGrp="1"/>
+          </p:cNvSpPr>
+          <p:nvPr>
+            <p:ph type="title"/>
+          </p:nvPr>
+        </p:nvSpPr>
+        <p:spPr/>
+        <p:txBody>
+          <a:bodyPr/>
+          <a:lstStyle/>
+          <a:p>
+            <a:r>
+              <a:rPr lang="de-DE" dirty="0" err="1" smtClean="0"/>
+              <a:t>Plichtenheft</a:t>
+            </a:r>
+            <a:endParaRPr lang="de-DE" dirty="0"/>
+          </a:p>
+        </p:txBody>
+      </p:sp>
+      <p:sp>
+        <p:nvSpPr>
+          <p:cNvPr id="3" name="Inhaltsplatzhalter 2"/>
+          <p:cNvSpPr>
+            <a:spLocks noGrp="1"/>
+          </p:cNvSpPr>
+          <p:nvPr>
+            <p:ph sz="quarter" idx="1"/>
+          </p:nvPr>
+        </p:nvSpPr>
+        <p:spPr/>
+        <p:txBody>
+          <a:bodyPr/>
+          <a:lstStyle/>
+          <a:p>
+            <a:r>
+              <a:rPr lang="de-DE" dirty="0" smtClean="0"/>
+              <a:t>C#</a:t>
+            </a:r>
+          </a:p>
+          <a:p>
+            <a:r>
+              <a:rPr lang="de-DE" dirty="0" err="1" smtClean="0"/>
+              <a:t>MariaDB</a:t>
+            </a:r>
+            <a:endParaRPr lang="de-DE" dirty="0" smtClean="0"/>
+          </a:p>
+          <a:p>
+            <a:r>
+              <a:rPr lang="de-DE" dirty="0" err="1" smtClean="0"/>
+              <a:t>Mockups</a:t>
+            </a:r>
+            <a:endParaRPr lang="de-DE" dirty="0" smtClean="0"/>
+          </a:p>
+          <a:p>
+            <a:r>
+              <a:rPr lang="de-DE" dirty="0" err="1" smtClean="0"/>
+              <a:t>Validatoren</a:t>
+            </a:r>
+            <a:endParaRPr lang="de-DE" dirty="0" smtClean="0"/>
+          </a:p>
+          <a:p>
+            <a:r>
+              <a:rPr lang="de-DE" dirty="0" smtClean="0"/>
+              <a:t>Windows </a:t>
+            </a:r>
+            <a:r>
+              <a:rPr lang="de-DE" dirty="0" err="1" smtClean="0"/>
+              <a:t>Presentation</a:t>
+            </a:r>
+            <a:r>
+              <a:rPr lang="de-DE" dirty="0" smtClean="0"/>
+              <a:t> </a:t>
+            </a:r>
+            <a:r>
+              <a:rPr lang="de-DE" dirty="0" err="1" smtClean="0"/>
+              <a:t>Foundation</a:t>
+            </a:r>
+            <a:r>
+              <a:rPr lang="de-DE" dirty="0" smtClean="0"/>
+              <a:t> (WPF)</a:t>
+            </a:r>
+          </a:p>
+          <a:p>
+            <a:endParaRPr lang="de-DE" dirty="0" smtClean="0"/>
+          </a:p>
+          <a:p>
+            <a:endParaRPr lang="de-DE" dirty="0"/>
+          </a:p>
+        </p:txBody>
+      </p:sp>
+      <p:sp>
+        <p:nvSpPr>
+          <p:cNvPr id="5" name="Foliennummernplatzhalter 4"/>
+          <p:cNvSpPr>
+            <a:spLocks noGrp="1"/>
+          </p:cNvSpPr>
+          <p:nvPr>
+            <p:ph type="sldNum" sz="quarter" idx="12"/>
+          </p:nvPr>
+        </p:nvSpPr>
+        <p:spPr/>
+        <p:txBody>
+          <a:bodyPr/>
+          <a:lstStyle/>
+          <a:p>
+            <a:r>
+              <a:rPr lang="de-DE" dirty="0" smtClean="0"/>
+              <a:t>13</a:t>
+            </a:r>
+            <a:endParaRPr lang="de-DE" dirty="0"/>
+          </a:p>
+        </p:txBody>
+      </p:sp>
+    </p:spTree>
+  </p:cSld>
+  <p:clrMapOvr>
+    <a:masterClrMapping/>
+  </p:clrMapOvr>
+  <p:timing>
+    <p:tnLst>
+      <p:par>
+        <p:cTn id="1" dur="indefinite" restart="never" nodeType="tmRoot"/>
+      </p:par>
+    </p:tnLst>
+  </p:timing>
+</p:sld>
+</file>
+
+<file path=ppt/slides/slide15.xml><?xml version="1.0" encoding="utf-8"?>
+<p:sld xmlns:a="http://schemas.openxmlformats.org/drawingml/2006/main" xmlns:r="http://schemas.openxmlformats.org/officeDocument/2006/relationships" xmlns:p="http://schemas.openxmlformats.org/presentationml/2006/main">
+  <p:cSld>
+    <p:spTree>
+      <p:nvGrpSpPr>
+        <p:cNvPr id="1" name=""/>
+        <p:cNvGrpSpPr/>
+        <p:nvPr/>
+      </p:nvGrpSpPr>
+      <p:grpSpPr>
+        <a:xfrm>
+          <a:off x="0" y="0"/>
+          <a:ext cx="0" cy="0"/>
+          <a:chOff x="0" y="0"/>
+          <a:chExt cx="0" cy="0"/>
+        </a:xfrm>
+      </p:grpSpPr>
+      <p:sp>
+        <p:nvSpPr>
           <p:cNvPr id="7" name="Rechteck 6"/>
           <p:cNvSpPr/>
           <p:nvPr/>
@@ -6605,7 +6924,7 @@
         <p:spPr>
           <a:xfrm>
             <a:off x="693912" y="1246312"/>
-            <a:ext cx="4536504" cy="4896544"/>
+            <a:ext cx="4536504" cy="4991000"/>
           </a:xfrm>
           <a:prstGeom prst="rect">
             <a:avLst/>
@@ -6831,7 +7150,7 @@
         </p:nvSpPr>
         <p:spPr>
           <a:xfrm>
-            <a:off x="693912" y="4990728"/>
+            <a:off x="693912" y="5301208"/>
             <a:ext cx="4536504" cy="360040"/>
           </a:xfrm>
           <a:prstGeom prst="rect">
@@ -6883,8 +7202,8 @@
         </p:nvSpPr>
         <p:spPr>
           <a:xfrm>
-            <a:off x="695708" y="5350768"/>
-            <a:ext cx="4536504" cy="792088"/>
+            <a:off x="695708" y="5661248"/>
+            <a:ext cx="4536504" cy="576064"/>
           </a:xfrm>
           <a:prstGeom prst="rect">
             <a:avLst/>
@@ -6931,7 +7250,7 @@
         <p:spPr>
           <a:xfrm>
             <a:off x="683568" y="1268760"/>
-            <a:ext cx="4402832" cy="4937760"/>
+            <a:ext cx="4402832" cy="5184576"/>
           </a:xfrm>
         </p:spPr>
         <p:txBody>
@@ -7053,6 +7372,22 @@
                   <a:schemeClr val="tx1"/>
                 </a:solidFill>
               </a:rPr>
+              <a:t>Oberflächenentwurf</a:t>
+            </a:r>
+            <a:endParaRPr lang="de-DE" dirty="0" smtClean="0">
+              <a:solidFill>
+                <a:schemeClr val="tx1"/>
+              </a:solidFill>
+            </a:endParaRPr>
+          </a:p>
+          <a:p>
+            <a:pPr lvl="1"/>
+            <a:r>
+              <a:rPr lang="de-DE" dirty="0" smtClean="0">
+                <a:solidFill>
+                  <a:schemeClr val="tx1"/>
+                </a:solidFill>
+              </a:rPr>
               <a:t>Pflichtenheft</a:t>
             </a:r>
           </a:p>
@@ -7103,7 +7438,7 @@
           <a:p>
             <a:r>
               <a:rPr lang="de-DE" dirty="0" smtClean="0"/>
-              <a:t>13</a:t>
+              <a:t>14</a:t>
             </a:r>
             <a:endParaRPr lang="de-DE" dirty="0"/>
           </a:p>
@@ -7112,7 +7447,7 @@
     </p:spTree>
     <p:extLst>
       <p:ext uri="{BB962C8B-B14F-4D97-AF65-F5344CB8AC3E}">
-        <p14:creationId xmlns:p14="http://schemas.microsoft.com/office/powerpoint/2010/main" xmlns="" val="2435492652"/>
+        <p14:creationId xmlns:p14="http://schemas.microsoft.com/office/powerpoint/2010/main" val="2435492652"/>
       </p:ext>
     </p:extLst>
   </p:cSld>
@@ -7211,7 +7546,7 @@
 </p:sld>
 </file>
 
-<file path=ppt/slides/slide15.xml><?xml version="1.0" encoding="utf-8"?>
+<file path=ppt/slides/slide16.xml><?xml version="1.0" encoding="utf-8"?>
 <p:sld xmlns:a="http://schemas.openxmlformats.org/drawingml/2006/main" xmlns:r="http://schemas.openxmlformats.org/officeDocument/2006/relationships" xmlns:p="http://schemas.openxmlformats.org/presentationml/2006/main">
   <p:cSld>
     <p:spTree>
@@ -7589,7 +7924,7 @@
           <a:p>
             <a:r>
               <a:rPr lang="de-DE" dirty="0" smtClean="0"/>
-              <a:t>14</a:t>
+              <a:t>15</a:t>
             </a:r>
             <a:endParaRPr lang="de-DE" dirty="0"/>
           </a:p>
@@ -7680,7 +8015,7 @@
 </p:sld>
 </file>
 
-<file path=ppt/slides/slide16.xml><?xml version="1.0" encoding="utf-8"?>
+<file path=ppt/slides/slide17.xml><?xml version="1.0" encoding="utf-8"?>
 <p:sld xmlns:a="http://schemas.openxmlformats.org/drawingml/2006/main" xmlns:r="http://schemas.openxmlformats.org/officeDocument/2006/relationships" xmlns:p="http://schemas.openxmlformats.org/presentationml/2006/main">
   <p:cSld>
     <p:spTree>
@@ -7739,6 +8074,7 @@
               <a:rPr lang="de-DE" dirty="0" smtClean="0"/>
               <a:t>16</a:t>
             </a:r>
+            <a:endParaRPr lang="de-DE" dirty="0" smtClean="0"/>
           </a:p>
         </p:txBody>
       </p:sp>
@@ -7754,7 +8090,7 @@
           <a:blip r:embed="rId3" cstate="print">
             <a:extLst>
               <a:ext uri="{28A0092B-C50C-407E-A947-70E740481C1C}">
-                <a14:useLocalDpi xmlns:a14="http://schemas.microsoft.com/office/drawing/2010/main" xmlns="" val="0"/>
+                <a14:useLocalDpi xmlns:a14="http://schemas.microsoft.com/office/drawing/2010/main" val="0"/>
               </a:ext>
             </a:extLst>
           </a:blip>
@@ -7787,7 +8123,7 @@
 </p:sld>
 </file>
 
-<file path=ppt/slides/slide17.xml><?xml version="1.0" encoding="utf-8"?>
+<file path=ppt/slides/slide18.xml><?xml version="1.0" encoding="utf-8"?>
 <p:sld xmlns:a="http://schemas.openxmlformats.org/drawingml/2006/main" xmlns:r="http://schemas.openxmlformats.org/officeDocument/2006/relationships" xmlns:p="http://schemas.openxmlformats.org/presentationml/2006/main">
   <p:cSld>
     <p:spTree>
@@ -7945,12 +8281,78 @@
           <a:p>
             <a:r>
               <a:rPr lang="de-DE" dirty="0" smtClean="0"/>
-              <a:t>15</a:t>
-            </a:r>
+              <a:t>17</a:t>
+            </a:r>
+            <a:endParaRPr lang="de-DE" dirty="0" smtClean="0"/>
           </a:p>
         </p:txBody>
       </p:sp>
     </p:spTree>
+  </p:cSld>
+  <p:clrMapOvr>
+    <a:masterClrMapping/>
+  </p:clrMapOvr>
+  <p:timing>
+    <p:tnLst>
+      <p:par>
+        <p:cTn id="1" dur="indefinite" restart="never" nodeType="tmRoot"/>
+      </p:par>
+    </p:tnLst>
+  </p:timing>
+</p:sld>
+</file>
+
+<file path=ppt/slides/slide19.xml><?xml version="1.0" encoding="utf-8"?>
+<p:sld xmlns:a="http://schemas.openxmlformats.org/drawingml/2006/main" xmlns:r="http://schemas.openxmlformats.org/officeDocument/2006/relationships" xmlns:p="http://schemas.openxmlformats.org/presentationml/2006/main">
+  <p:cSld>
+    <p:spTree>
+      <p:nvGrpSpPr>
+        <p:cNvPr id="1" name=""/>
+        <p:cNvGrpSpPr/>
+        <p:nvPr/>
+      </p:nvGrpSpPr>
+      <p:grpSpPr>
+        <a:xfrm>
+          <a:off x="0" y="0"/>
+          <a:ext cx="0" cy="0"/>
+          <a:chOff x="0" y="0"/>
+          <a:chExt cx="0" cy="0"/>
+        </a:xfrm>
+      </p:grpSpPr>
+      <p:sp>
+        <p:nvSpPr>
+          <p:cNvPr id="2" name="Titel 1"/>
+          <p:cNvSpPr>
+            <a:spLocks noGrp="1"/>
+          </p:cNvSpPr>
+          <p:nvPr>
+            <p:ph type="title"/>
+          </p:nvPr>
+        </p:nvSpPr>
+        <p:spPr>
+          <a:xfrm>
+            <a:off x="3779912" y="3140968"/>
+            <a:ext cx="1450504" cy="594320"/>
+          </a:xfrm>
+        </p:spPr>
+        <p:txBody>
+          <a:bodyPr/>
+          <a:lstStyle/>
+          <a:p>
+            <a:r>
+              <a:rPr lang="de-DE" dirty="0" smtClean="0"/>
+              <a:t>ENDE</a:t>
+            </a:r>
+            <a:endParaRPr lang="de-DE" dirty="0"/>
+          </a:p>
+        </p:txBody>
+      </p:sp>
+    </p:spTree>
+    <p:extLst>
+      <p:ext uri="{BB962C8B-B14F-4D97-AF65-F5344CB8AC3E}">
+        <p14:creationId xmlns:p14="http://schemas.microsoft.com/office/powerpoint/2010/main" val="616213110"/>
+      </p:ext>
+    </p:extLst>
   </p:cSld>
   <p:clrMapOvr>
     <a:masterClrMapping/>
@@ -7990,8 +8392,8 @@
         </p:nvSpPr>
         <p:spPr>
           <a:xfrm>
-            <a:off x="621904" y="1246312"/>
-            <a:ext cx="4536504" cy="4896544"/>
+            <a:off x="621904" y="1268760"/>
+            <a:ext cx="4536504" cy="4991000"/>
           </a:xfrm>
           <a:prstGeom prst="rect">
             <a:avLst/>
@@ -8217,7 +8619,7 @@
         </p:nvSpPr>
         <p:spPr>
           <a:xfrm>
-            <a:off x="621904" y="4990728"/>
+            <a:off x="621904" y="5301208"/>
             <a:ext cx="4536504" cy="360040"/>
           </a:xfrm>
           <a:prstGeom prst="rect">
@@ -8274,7 +8676,7 @@
         <p:spPr>
           <a:xfrm>
             <a:off x="611560" y="1268760"/>
-            <a:ext cx="4402832" cy="4937760"/>
+            <a:ext cx="4402832" cy="5328592"/>
           </a:xfrm>
         </p:spPr>
         <p:txBody>
@@ -8396,6 +8798,22 @@
                   <a:schemeClr val="tx1"/>
                 </a:solidFill>
               </a:rPr>
+              <a:t>Oberflächenentwurf</a:t>
+            </a:r>
+            <a:endParaRPr lang="de-DE" dirty="0" smtClean="0">
+              <a:solidFill>
+                <a:schemeClr val="tx1"/>
+              </a:solidFill>
+            </a:endParaRPr>
+          </a:p>
+          <a:p>
+            <a:pPr lvl="1"/>
+            <a:r>
+              <a:rPr lang="de-DE" dirty="0" smtClean="0">
+                <a:solidFill>
+                  <a:schemeClr val="tx1"/>
+                </a:solidFill>
+              </a:rPr>
               <a:t>Pflichtenheft</a:t>
             </a:r>
           </a:p>
@@ -8457,6 +8875,9 @@
   <p:clrMapOvr>
     <a:masterClrMapping/>
   </p:clrMapOvr>
+  <p:transition spd="slow">
+    <p:push dir="u"/>
+  </p:transition>
   <p:timing>
     <p:tnLst>
       <p:par>
@@ -8492,8 +8913,8 @@
         </p:nvSpPr>
         <p:spPr>
           <a:xfrm>
-            <a:off x="621904" y="1246312"/>
-            <a:ext cx="4536504" cy="4896544"/>
+            <a:off x="621904" y="1268760"/>
+            <a:ext cx="4536504" cy="4991000"/>
           </a:xfrm>
           <a:prstGeom prst="rect">
             <a:avLst/>
@@ -8719,7 +9140,7 @@
         </p:nvSpPr>
         <p:spPr>
           <a:xfrm>
-            <a:off x="621904" y="4990728"/>
+            <a:off x="621904" y="5301208"/>
             <a:ext cx="4536504" cy="360040"/>
           </a:xfrm>
           <a:prstGeom prst="rect">
@@ -8819,7 +9240,7 @@
         <p:spPr>
           <a:xfrm>
             <a:off x="611560" y="1268760"/>
-            <a:ext cx="4402832" cy="4937760"/>
+            <a:ext cx="4402832" cy="5184576"/>
           </a:xfrm>
         </p:spPr>
         <p:txBody>
@@ -8941,6 +9362,22 @@
                   <a:schemeClr val="tx1"/>
                 </a:solidFill>
               </a:rPr>
+              <a:t>Oberflächenentwurf</a:t>
+            </a:r>
+            <a:endParaRPr lang="de-DE" dirty="0" smtClean="0">
+              <a:solidFill>
+                <a:schemeClr val="tx1"/>
+              </a:solidFill>
+            </a:endParaRPr>
+          </a:p>
+          <a:p>
+            <a:pPr lvl="1"/>
+            <a:r>
+              <a:rPr lang="de-DE" dirty="0" smtClean="0">
+                <a:solidFill>
+                  <a:schemeClr val="tx1"/>
+                </a:solidFill>
+              </a:rPr>
               <a:t>Pflichtenheft</a:t>
             </a:r>
           </a:p>
@@ -8999,7 +9436,7 @@
     </p:spTree>
     <p:extLst>
       <p:ext uri="{BB962C8B-B14F-4D97-AF65-F5344CB8AC3E}">
-        <p14:creationId xmlns:p14="http://schemas.microsoft.com/office/powerpoint/2010/main" xmlns="" val="3122826872"/>
+        <p14:creationId xmlns:p14="http://schemas.microsoft.com/office/powerpoint/2010/main" val="3122826872"/>
       </p:ext>
     </p:extLst>
   </p:cSld>
@@ -9384,7 +9821,7 @@
         <p:spPr>
           <a:xfrm>
             <a:off x="621904" y="1246312"/>
-            <a:ext cx="4536504" cy="4896544"/>
+            <a:ext cx="4536504" cy="4991000"/>
           </a:xfrm>
           <a:prstGeom prst="rect">
             <a:avLst/>
@@ -9610,7 +10047,7 @@
         </p:nvSpPr>
         <p:spPr>
           <a:xfrm>
-            <a:off x="621904" y="4990728"/>
+            <a:off x="621904" y="5301208"/>
             <a:ext cx="4536504" cy="360040"/>
           </a:xfrm>
           <a:prstGeom prst="rect">
@@ -9710,7 +10147,7 @@
         <p:spPr>
           <a:xfrm>
             <a:off x="611560" y="1268760"/>
-            <a:ext cx="4402832" cy="4937760"/>
+            <a:ext cx="4402832" cy="5184576"/>
           </a:xfrm>
         </p:spPr>
         <p:txBody>
@@ -9832,6 +10269,22 @@
                   <a:schemeClr val="tx1"/>
                 </a:solidFill>
               </a:rPr>
+              <a:t>Oberflächenentwurf</a:t>
+            </a:r>
+            <a:endParaRPr lang="de-DE" dirty="0" smtClean="0">
+              <a:solidFill>
+                <a:schemeClr val="tx1"/>
+              </a:solidFill>
+            </a:endParaRPr>
+          </a:p>
+          <a:p>
+            <a:pPr lvl="1"/>
+            <a:r>
+              <a:rPr lang="de-DE" dirty="0" smtClean="0">
+                <a:solidFill>
+                  <a:schemeClr val="tx1"/>
+                </a:solidFill>
+              </a:rPr>
               <a:t>Pflichtenheft</a:t>
             </a:r>
           </a:p>
@@ -9891,7 +10344,7 @@
     </p:spTree>
     <p:extLst>
       <p:ext uri="{BB962C8B-B14F-4D97-AF65-F5344CB8AC3E}">
-        <p14:creationId xmlns:p14="http://schemas.microsoft.com/office/powerpoint/2010/main" xmlns="" val="615220078"/>
+        <p14:creationId xmlns:p14="http://schemas.microsoft.com/office/powerpoint/2010/main" val="615220078"/>
       </p:ext>
     </p:extLst>
   </p:cSld>
@@ -10064,7 +10517,7 @@
           <a:blip r:embed="rId3" cstate="print">
             <a:extLst>
               <a:ext uri="{28A0092B-C50C-407E-A947-70E740481C1C}">
-                <a14:useLocalDpi xmlns:a14="http://schemas.microsoft.com/office/drawing/2010/main" xmlns="" val="0"/>
+                <a14:useLocalDpi xmlns:a14="http://schemas.microsoft.com/office/drawing/2010/main" val="0"/>
               </a:ext>
             </a:extLst>
           </a:blip>
@@ -10205,7 +10658,7 @@
           <a:blip r:embed="rId3" cstate="print">
             <a:extLst>
               <a:ext uri="{28A0092B-C50C-407E-A947-70E740481C1C}">
-                <a14:useLocalDpi xmlns:a14="http://schemas.microsoft.com/office/drawing/2010/main" xmlns="" val="0"/>
+                <a14:useLocalDpi xmlns:a14="http://schemas.microsoft.com/office/drawing/2010/main" val="0"/>
               </a:ext>
             </a:extLst>
           </a:blip>
@@ -10399,7 +10852,7 @@
           <a:blip r:embed="rId3" cstate="print">
             <a:extLst>
               <a:ext uri="{28A0092B-C50C-407E-A947-70E740481C1C}">
-                <a14:useLocalDpi xmlns:a14="http://schemas.microsoft.com/office/drawing/2010/main" xmlns="" val="0"/>
+                <a14:useLocalDpi xmlns:a14="http://schemas.microsoft.com/office/drawing/2010/main" val="0"/>
               </a:ext>
             </a:extLst>
           </a:blip>

</xml_diff>

<commit_message>
[IMS-?] Präsentation angepasst, Zeitplan korrigiert
</commit_message>
<xml_diff>
--- a/Doku/Präsentation.pptx
+++ b/Doku/Präsentation.pptx
@@ -211,7 +211,7 @@
             <a:fld id="{8B15DE1F-419D-4D02-82BC-F91BB41CE353}" type="datetimeFigureOut">
               <a:rPr lang="de-DE" smtClean="0"/>
               <a:pPr/>
-              <a:t>16.05.2016</a:t>
+              <a:t>17.05.2016</a:t>
             </a:fld>
             <a:endParaRPr lang="de-DE"/>
           </a:p>
@@ -818,34 +818,19 @@
           <a:p>
             <a:r>
               <a:rPr lang="de-DE" dirty="0" smtClean="0"/>
-              <a:t>Neue</a:t>
+              <a:t>Schnellere Erstellung</a:t>
             </a:r>
             <a:r>
               <a:rPr lang="de-DE" baseline="0" dirty="0" smtClean="0"/>
-              <a:t> Kenntnisse: Erstellen von Datenbanken unter </a:t>
-            </a:r>
-            <a:r>
-              <a:rPr lang="de-DE" baseline="0" dirty="0" err="1" smtClean="0"/>
-              <a:t>MariaDB</a:t>
-            </a:r>
+              <a:t> der Benutzeroberfläche</a:t>
+            </a:r>
+          </a:p>
+          <a:p>
             <a:r>
               <a:rPr lang="de-DE" baseline="0" dirty="0" smtClean="0"/>
-              <a:t>, Erstellen und Realisieren von </a:t>
-            </a:r>
-            <a:r>
-              <a:rPr lang="de-DE" baseline="0" dirty="0" err="1" smtClean="0"/>
-              <a:t>Mockups</a:t>
-            </a:r>
-            <a:r>
-              <a:rPr lang="de-DE" baseline="0" dirty="0" smtClean="0"/>
-              <a:t>, Koordinieren und Planen in einem Team (Erstellen eines Zeitplans, etc.)</a:t>
-            </a:r>
-          </a:p>
-          <a:p>
-            <a:r>
-              <a:rPr lang="de-DE" baseline="0" dirty="0" smtClean="0"/>
-              <a:t>Ausblick: Hinzufügen von neuen Bauteilen, Verbesserungen am Design, Benutzerverwaltung, Teamarbeit war erfolgreich und weitere Projekte in diesem Team sind denkbar</a:t>
-            </a:r>
+              <a:t>Strukturierte Darstellung aller GUI-Elemente</a:t>
+            </a:r>
+            <a:endParaRPr lang="de-DE" dirty="0"/>
           </a:p>
         </p:txBody>
       </p:sp>
@@ -867,7 +852,7 @@
             <a:fld id="{5F898C9E-79AA-49F5-983B-85D49666B96C}" type="slidenum">
               <a:rPr lang="de-DE" smtClean="0"/>
               <a:pPr/>
-              <a:t>16</a:t>
+              <a:t>13</a:t>
             </a:fld>
             <a:endParaRPr lang="de-DE"/>
           </a:p>
@@ -876,7 +861,7 @@
     </p:spTree>
     <p:extLst>
       <p:ext uri="{BB962C8B-B14F-4D97-AF65-F5344CB8AC3E}">
-        <p14:creationId xmlns:p14="http://schemas.microsoft.com/office/powerpoint/2010/main" val="3147031468"/>
+        <p14:creationId xmlns:p14="http://schemas.microsoft.com/office/powerpoint/2010/main" val="322624913"/>
       </p:ext>
     </p:extLst>
   </p:cSld>
@@ -927,6 +912,223 @@
         </p:nvSpPr>
         <p:spPr/>
         <p:txBody>
+          <a:bodyPr/>
+          <a:lstStyle/>
+          <a:p>
+            <a:r>
+              <a:rPr lang="de-DE" dirty="0" smtClean="0"/>
+              <a:t>Programmiersprache</a:t>
+            </a:r>
+            <a:r>
+              <a:rPr lang="de-DE" baseline="0" dirty="0" smtClean="0"/>
+              <a:t> auf Grund von Zielsystem (Windows) und Kenntnisstand gewählt</a:t>
+            </a:r>
+          </a:p>
+          <a:p>
+            <a:r>
+              <a:rPr lang="de-DE" baseline="0" dirty="0" smtClean="0"/>
+              <a:t>MariaDB: Erfahrung im Team, Kostenlos (Speichern, Bearbeiten, Löschen)</a:t>
+            </a:r>
+          </a:p>
+          <a:p>
+            <a:r>
+              <a:rPr lang="de-DE" baseline="0" dirty="0" smtClean="0"/>
+              <a:t>Validatoren (Datenkonsistenz)</a:t>
+            </a:r>
+          </a:p>
+          <a:p>
+            <a:r>
+              <a:rPr lang="de-DE" baseline="0" dirty="0" smtClean="0"/>
+              <a:t>Mockups (Ergonomische Oberfläche)</a:t>
+            </a:r>
+          </a:p>
+          <a:p>
+            <a:r>
+              <a:rPr lang="de-DE" baseline="0" dirty="0" smtClean="0"/>
+              <a:t>WPF (Anzeigen, Sortierung, Datenbankkonfiguration)</a:t>
+            </a:r>
+          </a:p>
+          <a:p>
+            <a:endParaRPr lang="de-DE" dirty="0"/>
+          </a:p>
+        </p:txBody>
+      </p:sp>
+      <p:sp>
+        <p:nvSpPr>
+          <p:cNvPr id="4" name="Foliennummernplatzhalter 3"/>
+          <p:cNvSpPr>
+            <a:spLocks noGrp="1"/>
+          </p:cNvSpPr>
+          <p:nvPr>
+            <p:ph type="sldNum" sz="quarter" idx="10"/>
+          </p:nvPr>
+        </p:nvSpPr>
+        <p:spPr/>
+        <p:txBody>
+          <a:bodyPr/>
+          <a:lstStyle/>
+          <a:p>
+            <a:fld id="{5F898C9E-79AA-49F5-983B-85D49666B96C}" type="slidenum">
+              <a:rPr lang="de-DE" smtClean="0"/>
+              <a:pPr/>
+              <a:t>14</a:t>
+            </a:fld>
+            <a:endParaRPr lang="de-DE"/>
+          </a:p>
+        </p:txBody>
+      </p:sp>
+    </p:spTree>
+    <p:extLst>
+      <p:ext uri="{BB962C8B-B14F-4D97-AF65-F5344CB8AC3E}">
+        <p14:creationId xmlns:p14="http://schemas.microsoft.com/office/powerpoint/2010/main" val="4142577746"/>
+      </p:ext>
+    </p:extLst>
+  </p:cSld>
+  <p:clrMapOvr>
+    <a:masterClrMapping/>
+  </p:clrMapOvr>
+</p:notes>
+</file>
+
+<file path=ppt/notesSlides/notesSlide14.xml><?xml version="1.0" encoding="utf-8"?>
+<p:notes xmlns:a="http://schemas.openxmlformats.org/drawingml/2006/main" xmlns:r="http://schemas.openxmlformats.org/officeDocument/2006/relationships" xmlns:p="http://schemas.openxmlformats.org/presentationml/2006/main">
+  <p:cSld>
+    <p:spTree>
+      <p:nvGrpSpPr>
+        <p:cNvPr id="1" name=""/>
+        <p:cNvGrpSpPr/>
+        <p:nvPr/>
+      </p:nvGrpSpPr>
+      <p:grpSpPr>
+        <a:xfrm>
+          <a:off x="0" y="0"/>
+          <a:ext cx="0" cy="0"/>
+          <a:chOff x="0" y="0"/>
+          <a:chExt cx="0" cy="0"/>
+        </a:xfrm>
+      </p:grpSpPr>
+      <p:sp>
+        <p:nvSpPr>
+          <p:cNvPr id="2" name="Folienbildplatzhalter 1"/>
+          <p:cNvSpPr>
+            <a:spLocks noGrp="1" noRot="1" noChangeAspect="1"/>
+          </p:cNvSpPr>
+          <p:nvPr>
+            <p:ph type="sldImg"/>
+          </p:nvPr>
+        </p:nvSpPr>
+        <p:spPr/>
+      </p:sp>
+      <p:sp>
+        <p:nvSpPr>
+          <p:cNvPr id="3" name="Notizenplatzhalter 2"/>
+          <p:cNvSpPr>
+            <a:spLocks noGrp="1"/>
+          </p:cNvSpPr>
+          <p:nvPr>
+            <p:ph type="body" idx="1"/>
+          </p:nvPr>
+        </p:nvSpPr>
+        <p:spPr/>
+        <p:txBody>
+          <a:bodyPr/>
+          <a:lstStyle/>
+          <a:p>
+            <a:r>
+              <a:rPr lang="de-DE" dirty="0" smtClean="0"/>
+              <a:t>Neue</a:t>
+            </a:r>
+            <a:r>
+              <a:rPr lang="de-DE" baseline="0" dirty="0" smtClean="0"/>
+              <a:t> Kenntnisse: Erstellen von Datenbanken unter MariaDB, Erstellen und Realisieren von Mockups, Koordinieren und Planen in einem Team (Erstellen eines Zeitplans, etc.)</a:t>
+            </a:r>
+          </a:p>
+          <a:p>
+            <a:r>
+              <a:rPr lang="de-DE" baseline="0" dirty="0" smtClean="0"/>
+              <a:t>Ausblick: Hinzufügen von neuen Bauteilen, Verbesserungen am Design, Benutzerverwaltung, Teamarbeit war erfolgreich und weitere Projekte in diesem Team sind denkbar</a:t>
+            </a:r>
+          </a:p>
+        </p:txBody>
+      </p:sp>
+      <p:sp>
+        <p:nvSpPr>
+          <p:cNvPr id="4" name="Foliennummernplatzhalter 3"/>
+          <p:cNvSpPr>
+            <a:spLocks noGrp="1"/>
+          </p:cNvSpPr>
+          <p:nvPr>
+            <p:ph type="sldNum" sz="quarter" idx="10"/>
+          </p:nvPr>
+        </p:nvSpPr>
+        <p:spPr/>
+        <p:txBody>
+          <a:bodyPr/>
+          <a:lstStyle/>
+          <a:p>
+            <a:fld id="{5F898C9E-79AA-49F5-983B-85D49666B96C}" type="slidenum">
+              <a:rPr lang="de-DE" smtClean="0"/>
+              <a:pPr/>
+              <a:t>16</a:t>
+            </a:fld>
+            <a:endParaRPr lang="de-DE"/>
+          </a:p>
+        </p:txBody>
+      </p:sp>
+    </p:spTree>
+    <p:extLst>
+      <p:ext uri="{BB962C8B-B14F-4D97-AF65-F5344CB8AC3E}">
+        <p14:creationId xmlns:p14="http://schemas.microsoft.com/office/powerpoint/2010/main" val="3147031468"/>
+      </p:ext>
+    </p:extLst>
+  </p:cSld>
+  <p:clrMapOvr>
+    <a:masterClrMapping/>
+  </p:clrMapOvr>
+</p:notes>
+</file>
+
+<file path=ppt/notesSlides/notesSlide15.xml><?xml version="1.0" encoding="utf-8"?>
+<p:notes xmlns:a="http://schemas.openxmlformats.org/drawingml/2006/main" xmlns:r="http://schemas.openxmlformats.org/officeDocument/2006/relationships" xmlns:p="http://schemas.openxmlformats.org/presentationml/2006/main">
+  <p:cSld>
+    <p:spTree>
+      <p:nvGrpSpPr>
+        <p:cNvPr id="1" name=""/>
+        <p:cNvGrpSpPr/>
+        <p:nvPr/>
+      </p:nvGrpSpPr>
+      <p:grpSpPr>
+        <a:xfrm>
+          <a:off x="0" y="0"/>
+          <a:ext cx="0" cy="0"/>
+          <a:chOff x="0" y="0"/>
+          <a:chExt cx="0" cy="0"/>
+        </a:xfrm>
+      </p:grpSpPr>
+      <p:sp>
+        <p:nvSpPr>
+          <p:cNvPr id="2" name="Folienbildplatzhalter 1"/>
+          <p:cNvSpPr>
+            <a:spLocks noGrp="1" noRot="1" noChangeAspect="1"/>
+          </p:cNvSpPr>
+          <p:nvPr>
+            <p:ph type="sldImg"/>
+          </p:nvPr>
+        </p:nvSpPr>
+        <p:spPr/>
+      </p:sp>
+      <p:sp>
+        <p:nvSpPr>
+          <p:cNvPr id="3" name="Notizenplatzhalter 2"/>
+          <p:cNvSpPr>
+            <a:spLocks noGrp="1"/>
+          </p:cNvSpPr>
+          <p:nvPr>
+            <p:ph type="body" idx="1"/>
+          </p:nvPr>
+        </p:nvSpPr>
+        <p:spPr/>
+        <p:txBody>
           <a:bodyPr>
             <a:normAutofit/>
           </a:bodyPr>
@@ -1028,11 +1230,7 @@
           <a:p>
             <a:r>
               <a:rPr lang="de-DE" baseline="0" dirty="0" smtClean="0"/>
-              <a:t>Implementierung wird während der Abhandlung der </a:t>
-            </a:r>
-            <a:r>
-              <a:rPr lang="de-DE" baseline="0" smtClean="0"/>
-              <a:t>Entwurfsphase erläutert</a:t>
+              <a:t>Implementierung wird während der Abhandlung der Entwurfsphase erläutert</a:t>
             </a:r>
             <a:endParaRPr lang="de-DE" dirty="0"/>
           </a:p>
@@ -1125,7 +1323,23 @@
             </a:r>
             <a:r>
               <a:rPr lang="de-DE" baseline="0" dirty="0" smtClean="0"/>
-              <a:t>von Lagerpersonal &amp; Vertrieb genutzt werden</a:t>
+              <a:t>von Lagerpersonal &amp; Vertrieb genutzt </a:t>
+            </a:r>
+            <a:r>
+              <a:rPr lang="de-DE" baseline="0" dirty="0" smtClean="0"/>
+              <a:t>werden</a:t>
+            </a:r>
+          </a:p>
+          <a:p>
+            <a:r>
+              <a:rPr lang="de-DE" baseline="0" dirty="0" smtClean="0"/>
+              <a:t>Projektteam ist von einem Einsatz in einem standartmäßigen Lagerbetrieb ausgegangen</a:t>
+            </a:r>
+          </a:p>
+          <a:p>
+            <a:r>
+              <a:rPr lang="de-DE" baseline="0" dirty="0" smtClean="0"/>
+              <a:t>Verzögerungen auch durch Fehler beim Führen von Listen</a:t>
             </a:r>
             <a:endParaRPr lang="de-DE" dirty="0"/>
           </a:p>
@@ -1223,10 +1437,26 @@
           </a:p>
           <a:p>
             <a:r>
-              <a:rPr lang="de-DE" baseline="0" smtClean="0"/>
-              <a:t>Verteiltes Verwalten der Daten</a:t>
-            </a:r>
-            <a:endParaRPr lang="de-DE" dirty="0"/>
+              <a:rPr lang="de-DE" baseline="0" dirty="0" smtClean="0"/>
+              <a:t>Verteiltes Verwalten der </a:t>
+            </a:r>
+            <a:r>
+              <a:rPr lang="de-DE" baseline="0" dirty="0" smtClean="0"/>
+              <a:t>Daten</a:t>
+            </a:r>
+            <a:endParaRPr lang="de-DE" baseline="0" dirty="0"/>
+          </a:p>
+          <a:p>
+            <a:r>
+              <a:rPr lang="de-DE" baseline="0" dirty="0" smtClean="0"/>
+              <a:t>Anforderungen wurden in Muss-,Soll- und Kann-Kriterien gestaffelt</a:t>
+            </a:r>
+          </a:p>
+          <a:p>
+            <a:r>
+              <a:rPr lang="de-DE" baseline="0" dirty="0" smtClean="0"/>
+              <a:t>Dies ist eine Liste der realisierten Anforderungen</a:t>
+            </a:r>
           </a:p>
         </p:txBody>
       </p:sp>
@@ -1919,7 +2149,7 @@
             <a:fld id="{589E9101-0A57-40FF-95DB-3AEFC76CAD8A}" type="datetime1">
               <a:rPr lang="de-DE" smtClean="0"/>
               <a:pPr/>
-              <a:t>16.05.2016</a:t>
+              <a:t>17.05.2016</a:t>
             </a:fld>
             <a:endParaRPr lang="de-DE"/>
           </a:p>
@@ -2284,7 +2514,7 @@
             <a:fld id="{B6B05801-08C6-4164-B203-94DCDA8BAE53}" type="datetime1">
               <a:rPr lang="de-DE" smtClean="0"/>
               <a:pPr/>
-              <a:t>16.05.2016</a:t>
+              <a:t>17.05.2016</a:t>
             </a:fld>
             <a:endParaRPr lang="de-DE"/>
           </a:p>
@@ -2465,7 +2695,7 @@
             <a:fld id="{B7BE1875-3FCB-45CB-AE2F-8CA91420BD64}" type="datetime1">
               <a:rPr lang="de-DE" smtClean="0"/>
               <a:pPr/>
-              <a:t>16.05.2016</a:t>
+              <a:t>17.05.2016</a:t>
             </a:fld>
             <a:endParaRPr lang="de-DE"/>
           </a:p>
@@ -2706,7 +2936,7 @@
             <a:fld id="{3EAC9F25-C81C-4864-8663-E08EC7D03295}" type="datetime1">
               <a:rPr lang="de-DE" smtClean="0"/>
               <a:pPr/>
-              <a:t>16.05.2016</a:t>
+              <a:t>17.05.2016</a:t>
             </a:fld>
             <a:endParaRPr lang="de-DE"/>
           </a:p>
@@ -2981,7 +3211,7 @@
             <a:fld id="{C6A5A5AE-9BFF-4276-9AB1-92A8B3D07B38}" type="datetime1">
               <a:rPr lang="de-DE" smtClean="0"/>
               <a:pPr/>
-              <a:t>16.05.2016</a:t>
+              <a:t>17.05.2016</a:t>
             </a:fld>
             <a:endParaRPr lang="de-DE"/>
           </a:p>
@@ -3207,7 +3437,7 @@
             <a:fld id="{B1376325-24E8-4B47-9141-C80390B74AF3}" type="datetime1">
               <a:rPr lang="de-DE" smtClean="0"/>
               <a:pPr/>
-              <a:t>16.05.2016</a:t>
+              <a:t>17.05.2016</a:t>
             </a:fld>
             <a:endParaRPr lang="de-DE"/>
           </a:p>
@@ -3565,7 +3795,7 @@
             <a:fld id="{8550A3E2-E3EE-4DF2-838A-5C507645BA25}" type="datetime1">
               <a:rPr lang="de-DE" smtClean="0"/>
               <a:pPr/>
-              <a:t>16.05.2016</a:t>
+              <a:t>17.05.2016</a:t>
             </a:fld>
             <a:endParaRPr lang="de-DE"/>
           </a:p>
@@ -3803,7 +4033,7 @@
             <a:fld id="{F3B357C8-9EA6-49F6-903E-07E3FA028202}" type="datetime1">
               <a:rPr lang="de-DE" smtClean="0"/>
               <a:pPr/>
-              <a:t>16.05.2016</a:t>
+              <a:t>17.05.2016</a:t>
             </a:fld>
             <a:endParaRPr lang="de-DE"/>
           </a:p>
@@ -3949,7 +4179,7 @@
             <a:fld id="{446D090E-AC8B-49C9-AD71-C42508C98946}" type="datetime1">
               <a:rPr lang="de-DE" smtClean="0"/>
               <a:pPr/>
-              <a:t>16.05.2016</a:t>
+              <a:t>17.05.2016</a:t>
             </a:fld>
             <a:endParaRPr lang="de-DE"/>
           </a:p>
@@ -4232,7 +4462,7 @@
             <a:fld id="{5B6D69C0-18ED-40E5-958F-868639F01E05}" type="datetime1">
               <a:rPr lang="de-DE" smtClean="0"/>
               <a:pPr/>
-              <a:t>16.05.2016</a:t>
+              <a:t>17.05.2016</a:t>
             </a:fld>
             <a:endParaRPr lang="de-DE"/>
           </a:p>
@@ -4645,7 +4875,7 @@
             <a:fld id="{34E89A8D-E0A7-41AC-8DB4-1A068E8ADE23}" type="datetime1">
               <a:rPr lang="de-DE" smtClean="0"/>
               <a:pPr/>
-              <a:t>16.05.2016</a:t>
+              <a:t>17.05.2016</a:t>
             </a:fld>
             <a:endParaRPr lang="de-DE"/>
           </a:p>
@@ -4989,7 +5219,7 @@
             <a:fld id="{82C11CE6-0549-40F5-B4A2-44089F8500DE}" type="datetime1">
               <a:rPr lang="de-DE" smtClean="0"/>
               <a:pPr/>
-              <a:t>16.05.2016</a:t>
+              <a:t>17.05.2016</a:t>
             </a:fld>
             <a:endParaRPr lang="de-DE"/>
           </a:p>
@@ -6069,11 +6299,6 @@
               </a:rPr>
               <a:t>Oberflächenentwurf</a:t>
             </a:r>
-            <a:endParaRPr lang="de-DE" dirty="0" smtClean="0">
-              <a:solidFill>
-                <a:schemeClr val="tx1"/>
-              </a:solidFill>
-            </a:endParaRPr>
           </a:p>
           <a:p>
             <a:pPr lvl="1"/>
@@ -6556,7 +6781,7 @@
           <p:nvPr/>
         </p:nvPicPr>
         <p:blipFill>
-          <a:blip r:embed="rId2">
+          <a:blip r:embed="rId3">
             <a:extLst>
               <a:ext uri="{28A0092B-C50C-407E-A947-70E740481C1C}">
                 <a14:useLocalDpi xmlns:a14="http://schemas.microsoft.com/office/drawing/2010/main" val="0"/>
@@ -6586,7 +6811,7 @@
           <p:nvPr/>
         </p:nvPicPr>
         <p:blipFill>
-          <a:blip r:embed="rId3">
+          <a:blip r:embed="rId4">
             <a:extLst>
               <a:ext uri="{28A0092B-C50C-407E-A947-70E740481C1C}">
                 <a14:useLocalDpi xmlns:a14="http://schemas.microsoft.com/office/drawing/2010/main" val="0"/>
@@ -6806,50 +7031,46 @@
           <a:p>
             <a:r>
               <a:rPr lang="de-DE" dirty="0" smtClean="0"/>
-              <a:t>C#</a:t>
-            </a:r>
-          </a:p>
-          <a:p>
-            <a:r>
-              <a:rPr lang="de-DE" dirty="0" err="1" smtClean="0"/>
-              <a:t>MariaDB</a:t>
-            </a:r>
+              <a:t>Technische Umsetzung der Anforderungen:</a:t>
+            </a:r>
+          </a:p>
+          <a:p>
+            <a:pPr marL="0" indent="0">
+              <a:buNone/>
+            </a:pPr>
             <a:endParaRPr lang="de-DE" dirty="0" smtClean="0"/>
           </a:p>
           <a:p>
             <a:r>
-              <a:rPr lang="de-DE" dirty="0" err="1" smtClean="0"/>
+              <a:rPr lang="de-DE" dirty="0" smtClean="0"/>
+              <a:t>Programmierung in C#</a:t>
+            </a:r>
+            <a:endParaRPr lang="de-DE" dirty="0" smtClean="0"/>
+          </a:p>
+          <a:p>
+            <a:r>
+              <a:rPr lang="de-DE" dirty="0" smtClean="0"/>
+              <a:t>MariaDB als Datenbanksystem</a:t>
+            </a:r>
+            <a:endParaRPr lang="de-DE" dirty="0" smtClean="0"/>
+          </a:p>
+          <a:p>
+            <a:r>
+              <a:rPr lang="de-DE" dirty="0" smtClean="0"/>
+              <a:t>Validatoren</a:t>
+            </a:r>
+          </a:p>
+          <a:p>
+            <a:r>
+              <a:rPr lang="de-DE" dirty="0" smtClean="0"/>
               <a:t>Mockups</a:t>
             </a:r>
             <a:endParaRPr lang="de-DE" dirty="0" smtClean="0"/>
           </a:p>
           <a:p>
             <a:r>
-              <a:rPr lang="de-DE" dirty="0" err="1" smtClean="0"/>
-              <a:t>Validatoren</a:t>
-            </a:r>
-            <a:endParaRPr lang="de-DE" dirty="0" smtClean="0"/>
-          </a:p>
-          <a:p>
-            <a:r>
               <a:rPr lang="de-DE" dirty="0" smtClean="0"/>
-              <a:t>Windows </a:t>
-            </a:r>
-            <a:r>
-              <a:rPr lang="de-DE" dirty="0" err="1" smtClean="0"/>
-              <a:t>Presentation</a:t>
-            </a:r>
-            <a:r>
-              <a:rPr lang="de-DE" dirty="0" smtClean="0"/>
-              <a:t> </a:t>
-            </a:r>
-            <a:r>
-              <a:rPr lang="de-DE" dirty="0" err="1" smtClean="0"/>
-              <a:t>Foundation</a:t>
-            </a:r>
-            <a:r>
-              <a:rPr lang="de-DE" dirty="0" smtClean="0"/>
-              <a:t> (WPF)</a:t>
+              <a:t>Windows Presentation Foundation (WPF)</a:t>
             </a:r>
           </a:p>
           <a:p>
@@ -7374,11 +7595,6 @@
               </a:rPr>
               <a:t>Oberflächenentwurf</a:t>
             </a:r>
-            <a:endParaRPr lang="de-DE" dirty="0" smtClean="0">
-              <a:solidFill>
-                <a:schemeClr val="tx1"/>
-              </a:solidFill>
-            </a:endParaRPr>
           </a:p>
           <a:p>
             <a:pPr lvl="1"/>
@@ -7784,7 +8000,7 @@
         </p:spPr>
         <p:txBody>
           <a:bodyPr>
-            <a:normAutofit fontScale="85000" lnSpcReduction="10000"/>
+            <a:normAutofit fontScale="92500"/>
           </a:bodyPr>
           <a:lstStyle/>
           <a:p>
@@ -8074,7 +8290,6 @@
               <a:rPr lang="de-DE" dirty="0" smtClean="0"/>
               <a:t>16</a:t>
             </a:r>
-            <a:endParaRPr lang="de-DE" dirty="0" smtClean="0"/>
           </a:p>
         </p:txBody>
       </p:sp>
@@ -8283,7 +8498,6 @@
               <a:rPr lang="de-DE" dirty="0" smtClean="0"/>
               <a:t>17</a:t>
             </a:r>
-            <a:endParaRPr lang="de-DE" dirty="0" smtClean="0"/>
           </a:p>
         </p:txBody>
       </p:sp>
@@ -8800,11 +9014,6 @@
               </a:rPr>
               <a:t>Oberflächenentwurf</a:t>
             </a:r>
-            <a:endParaRPr lang="de-DE" dirty="0" smtClean="0">
-              <a:solidFill>
-                <a:schemeClr val="tx1"/>
-              </a:solidFill>
-            </a:endParaRPr>
           </a:p>
           <a:p>
             <a:pPr lvl="1"/>
@@ -9364,11 +9573,6 @@
               </a:rPr>
               <a:t>Oberflächenentwurf</a:t>
             </a:r>
-            <a:endParaRPr lang="de-DE" dirty="0" smtClean="0">
-              <a:solidFill>
-                <a:schemeClr val="tx1"/>
-              </a:solidFill>
-            </a:endParaRPr>
           </a:p>
           <a:p>
             <a:pPr lvl="1"/>
@@ -9616,8 +9820,21 @@
           <a:p>
             <a:r>
               <a:rPr lang="de-DE" dirty="0" smtClean="0"/>
-              <a:t>Verschiedene Anwendungen</a:t>
-            </a:r>
+              <a:t>Verschiedene </a:t>
+            </a:r>
+            <a:r>
+              <a:rPr lang="de-DE" dirty="0" smtClean="0"/>
+              <a:t>Anwendungen</a:t>
+            </a:r>
+          </a:p>
+          <a:p>
+            <a:endParaRPr lang="de-DE" dirty="0"/>
+          </a:p>
+          <a:p>
+            <a:pPr marL="0" indent="0">
+              <a:buNone/>
+            </a:pPr>
+            <a:endParaRPr lang="de-DE" dirty="0" smtClean="0"/>
           </a:p>
           <a:p>
             <a:endParaRPr lang="de-DE" dirty="0" smtClean="0"/>
@@ -9644,6 +9861,193 @@
               <a:t>3</a:t>
             </a:r>
             <a:endParaRPr lang="de-DE" dirty="0"/>
+          </a:p>
+        </p:txBody>
+      </p:sp>
+      <p:sp>
+        <p:nvSpPr>
+          <p:cNvPr id="4" name="Rechteck 3"/>
+          <p:cNvSpPr/>
+          <p:nvPr/>
+        </p:nvSpPr>
+        <p:spPr>
+          <a:xfrm>
+            <a:off x="1763688" y="3306259"/>
+            <a:ext cx="5688632" cy="2448272"/>
+          </a:xfrm>
+          <a:prstGeom prst="rect">
+            <a:avLst/>
+          </a:prstGeom>
+          <a:solidFill>
+            <a:schemeClr val="bg1"/>
+          </a:solidFill>
+        </p:spPr>
+        <p:style>
+          <a:lnRef idx="2">
+            <a:schemeClr val="accent1">
+              <a:shade val="50000"/>
+            </a:schemeClr>
+          </a:lnRef>
+          <a:fillRef idx="1">
+            <a:schemeClr val="accent1"/>
+          </a:fillRef>
+          <a:effectRef idx="0">
+            <a:schemeClr val="accent1"/>
+          </a:effectRef>
+          <a:fontRef idx="minor">
+            <a:schemeClr val="lt1"/>
+          </a:fontRef>
+        </p:style>
+        <p:txBody>
+          <a:bodyPr rtlCol="0" anchor="ctr"/>
+          <a:lstStyle/>
+          <a:p>
+            <a:pPr algn="ctr"/>
+            <a:endParaRPr lang="de-DE"/>
+          </a:p>
+        </p:txBody>
+      </p:sp>
+      <p:sp>
+        <p:nvSpPr>
+          <p:cNvPr id="6" name="Rechteck 5"/>
+          <p:cNvSpPr/>
+          <p:nvPr/>
+        </p:nvSpPr>
+        <p:spPr>
+          <a:xfrm>
+            <a:off x="1763688" y="3306259"/>
+            <a:ext cx="5688632" cy="504056"/>
+          </a:xfrm>
+          <a:prstGeom prst="rect">
+            <a:avLst/>
+          </a:prstGeom>
+          <a:gradFill>
+            <a:gsLst>
+              <a:gs pos="0">
+                <a:srgbClr val="97D077"/>
+              </a:gs>
+              <a:gs pos="100000">
+                <a:srgbClr val="C6E5B5"/>
+              </a:gs>
+            </a:gsLst>
+            <a:lin ang="16200000" scaled="1"/>
+          </a:gradFill>
+        </p:spPr>
+        <p:style>
+          <a:lnRef idx="2">
+            <a:schemeClr val="accent1">
+              <a:shade val="50000"/>
+            </a:schemeClr>
+          </a:lnRef>
+          <a:fillRef idx="1">
+            <a:schemeClr val="accent1"/>
+          </a:fillRef>
+          <a:effectRef idx="0">
+            <a:schemeClr val="accent1"/>
+          </a:effectRef>
+          <a:fontRef idx="minor">
+            <a:schemeClr val="lt1"/>
+          </a:fontRef>
+        </p:style>
+        <p:txBody>
+          <a:bodyPr rtlCol="0" anchor="ctr"/>
+          <a:lstStyle/>
+          <a:p>
+            <a:pPr algn="ctr"/>
+            <a:endParaRPr lang="de-DE"/>
+          </a:p>
+        </p:txBody>
+      </p:sp>
+      <p:sp>
+        <p:nvSpPr>
+          <p:cNvPr id="7" name="Textfeld 6"/>
+          <p:cNvSpPr txBox="1"/>
+          <p:nvPr/>
+        </p:nvSpPr>
+        <p:spPr>
+          <a:xfrm>
+            <a:off x="3707904" y="3378267"/>
+            <a:ext cx="1656184" cy="400110"/>
+          </a:xfrm>
+          <a:prstGeom prst="rect">
+            <a:avLst/>
+          </a:prstGeom>
+          <a:noFill/>
+        </p:spPr>
+        <p:txBody>
+          <a:bodyPr wrap="square" rtlCol="0">
+            <a:spAutoFit/>
+          </a:bodyPr>
+          <a:lstStyle/>
+          <a:p>
+            <a:r>
+              <a:rPr lang="de-DE" sz="2000" b="1" dirty="0" smtClean="0"/>
+              <a:t>Zielsetzung</a:t>
+            </a:r>
+            <a:endParaRPr lang="de-DE" sz="2000" b="1" dirty="0"/>
+          </a:p>
+        </p:txBody>
+      </p:sp>
+      <p:sp>
+        <p:nvSpPr>
+          <p:cNvPr id="8" name="Textfeld 7"/>
+          <p:cNvSpPr txBox="1"/>
+          <p:nvPr/>
+        </p:nvSpPr>
+        <p:spPr>
+          <a:xfrm>
+            <a:off x="1835696" y="3954331"/>
+            <a:ext cx="5544616" cy="1323439"/>
+          </a:xfrm>
+          <a:prstGeom prst="rect">
+            <a:avLst/>
+          </a:prstGeom>
+          <a:noFill/>
+        </p:spPr>
+        <p:txBody>
+          <a:bodyPr wrap="square" rtlCol="0">
+            <a:spAutoFit/>
+          </a:bodyPr>
+          <a:lstStyle/>
+          <a:p>
+            <a:pPr marL="285750" indent="-285750">
+              <a:buFont typeface="Arial" panose="020B0604020202020204" pitchFamily="34" charset="0"/>
+              <a:buChar char="•"/>
+            </a:pPr>
+            <a:r>
+              <a:rPr lang="de-DE" sz="2000" dirty="0" smtClean="0"/>
+              <a:t>Arbeit mit zentralem Datenbestand</a:t>
+            </a:r>
+          </a:p>
+          <a:p>
+            <a:pPr marL="285750" indent="-285750">
+              <a:buFont typeface="Arial" panose="020B0604020202020204" pitchFamily="34" charset="0"/>
+              <a:buChar char="•"/>
+            </a:pPr>
+            <a:r>
+              <a:rPr lang="de-DE" sz="2000" dirty="0" smtClean="0"/>
+              <a:t>Verhindern von Verzögerungen</a:t>
+            </a:r>
+          </a:p>
+          <a:p>
+            <a:pPr marL="285750" indent="-285750">
+              <a:buFont typeface="Arial" panose="020B0604020202020204" pitchFamily="34" charset="0"/>
+              <a:buChar char="•"/>
+            </a:pPr>
+            <a:r>
+              <a:rPr lang="de-DE" sz="2000" dirty="0" smtClean="0"/>
+              <a:t>Einfachere Absprache</a:t>
+            </a:r>
+          </a:p>
+          <a:p>
+            <a:pPr marL="285750" indent="-285750">
+              <a:buFont typeface="Arial" panose="020B0604020202020204" pitchFamily="34" charset="0"/>
+              <a:buChar char="•"/>
+            </a:pPr>
+            <a:r>
+              <a:rPr lang="de-DE" sz="2000" dirty="0" smtClean="0"/>
+              <a:t>Kostenersparnis</a:t>
+            </a:r>
           </a:p>
         </p:txBody>
       </p:sp>
@@ -9655,9 +10059,88 @@
   <p:timing>
     <p:tnLst>
       <p:par>
-        <p:cTn id="1" dur="indefinite" restart="never" nodeType="tmRoot"/>
+        <p:cTn id="1" dur="indefinite" restart="never" nodeType="tmRoot">
+          <p:childTnLst>
+            <p:seq concurrent="1" nextAc="seek">
+              <p:cTn id="2" dur="indefinite" nodeType="mainSeq">
+                <p:childTnLst>
+                  <p:par>
+                    <p:cTn id="3" fill="hold">
+                      <p:stCondLst>
+                        <p:cond delay="indefinite"/>
+                      </p:stCondLst>
+                      <p:childTnLst>
+                        <p:par>
+                          <p:cTn id="4" fill="hold">
+                            <p:stCondLst>
+                              <p:cond delay="0"/>
+                            </p:stCondLst>
+                            <p:childTnLst>
+                              <p:par>
+                                <p:cTn id="5" presetID="10" presetClass="entr" presetSubtype="0" fill="hold" grpId="0" nodeType="clickEffect">
+                                  <p:stCondLst>
+                                    <p:cond delay="0"/>
+                                  </p:stCondLst>
+                                  <p:childTnLst>
+                                    <p:set>
+                                      <p:cBhvr>
+                                        <p:cTn id="6" dur="1" fill="hold">
+                                          <p:stCondLst>
+                                            <p:cond delay="0"/>
+                                          </p:stCondLst>
+                                        </p:cTn>
+                                        <p:tgtEl>
+                                          <p:spTgt spid="8"/>
+                                        </p:tgtEl>
+                                        <p:attrNameLst>
+                                          <p:attrName>style.visibility</p:attrName>
+                                        </p:attrNameLst>
+                                      </p:cBhvr>
+                                      <p:to>
+                                        <p:strVal val="visible"/>
+                                      </p:to>
+                                    </p:set>
+                                    <p:animEffect transition="in" filter="fade">
+                                      <p:cBhvr>
+                                        <p:cTn id="7" dur="500"/>
+                                        <p:tgtEl>
+                                          <p:spTgt spid="8"/>
+                                        </p:tgtEl>
+                                      </p:cBhvr>
+                                    </p:animEffect>
+                                  </p:childTnLst>
+                                </p:cTn>
+                              </p:par>
+                            </p:childTnLst>
+                          </p:cTn>
+                        </p:par>
+                      </p:childTnLst>
+                    </p:cTn>
+                  </p:par>
+                </p:childTnLst>
+              </p:cTn>
+              <p:prevCondLst>
+                <p:cond evt="onPrev" delay="0">
+                  <p:tgtEl>
+                    <p:sldTgt/>
+                  </p:tgtEl>
+                </p:cond>
+              </p:prevCondLst>
+              <p:nextCondLst>
+                <p:cond evt="onNext" delay="0">
+                  <p:tgtEl>
+                    <p:sldTgt/>
+                  </p:tgtEl>
+                </p:cond>
+              </p:nextCondLst>
+            </p:seq>
+          </p:childTnLst>
+        </p:cTn>
       </p:par>
     </p:tnLst>
+    <p:bldLst>
+      <p:bldP spid="8" grpId="0"/>
+    </p:bldLst>
   </p:timing>
 </p:sld>
 </file>
@@ -9719,14 +10202,37 @@
           <a:p>
             <a:r>
               <a:rPr lang="de-DE" dirty="0" smtClean="0"/>
-              <a:t>Dauerhaftes Speichern, Bearbeiten und Löschen von Komponenten</a:t>
+              <a:t>Speichern von Komponenten</a:t>
             </a:r>
           </a:p>
           <a:p>
             <a:r>
               <a:rPr lang="de-DE" dirty="0" smtClean="0"/>
-              <a:t>Anzeigen von Komponenten</a:t>
-            </a:r>
+              <a:t>Bearbeiten von Komponenten </a:t>
+            </a:r>
+          </a:p>
+          <a:p>
+            <a:r>
+              <a:rPr lang="de-DE" dirty="0" smtClean="0"/>
+              <a:t>Löschen </a:t>
+            </a:r>
+            <a:r>
+              <a:rPr lang="de-DE" dirty="0" smtClean="0"/>
+              <a:t>von Komponenten</a:t>
+            </a:r>
+          </a:p>
+          <a:p>
+            <a:r>
+              <a:rPr lang="de-DE" dirty="0" smtClean="0"/>
+              <a:t>Anzeigen von gespeicherten Komponenten</a:t>
+            </a:r>
+          </a:p>
+          <a:p>
+            <a:r>
+              <a:rPr lang="de-DE" dirty="0" smtClean="0"/>
+              <a:t>Sortierung über die Oberfläche</a:t>
+            </a:r>
+            <a:endParaRPr lang="de-DE" dirty="0" smtClean="0"/>
           </a:p>
           <a:p>
             <a:r>
@@ -9743,8 +10249,13 @@
           <a:p>
             <a:r>
               <a:rPr lang="de-DE" dirty="0" smtClean="0"/>
-              <a:t>Konfiguration der Datenbankverbindung</a:t>
-            </a:r>
+              <a:t>Konfiguration der </a:t>
+            </a:r>
+            <a:r>
+              <a:rPr lang="de-DE" dirty="0" smtClean="0"/>
+              <a:t>Datenbankverbindung</a:t>
+            </a:r>
+            <a:endParaRPr lang="de-DE" dirty="0" smtClean="0"/>
           </a:p>
           <a:p>
             <a:endParaRPr lang="de-DE" dirty="0" smtClean="0"/>
@@ -10271,11 +10782,6 @@
               </a:rPr>
               <a:t>Oberflächenentwurf</a:t>
             </a:r>
-            <a:endParaRPr lang="de-DE" dirty="0" smtClean="0">
-              <a:solidFill>
-                <a:schemeClr val="tx1"/>
-              </a:solidFill>
-            </a:endParaRPr>
           </a:p>
           <a:p>
             <a:pPr lvl="1"/>
@@ -10507,14 +11013,14 @@
       </p:sp>
       <p:pic>
         <p:nvPicPr>
-          <p:cNvPr id="3" name="Grafik 2"/>
+          <p:cNvPr id="4" name="Grafik 3"/>
           <p:cNvPicPr>
             <a:picLocks noChangeAspect="1"/>
           </p:cNvPicPr>
           <p:nvPr/>
         </p:nvPicPr>
         <p:blipFill>
-          <a:blip r:embed="rId3" cstate="print">
+          <a:blip r:embed="rId3">
             <a:extLst>
               <a:ext uri="{28A0092B-C50C-407E-A947-70E740481C1C}">
                 <a14:useLocalDpi xmlns:a14="http://schemas.microsoft.com/office/drawing/2010/main" val="0"/>
@@ -10527,8 +11033,8 @@
         </p:blipFill>
         <p:spPr>
           <a:xfrm>
-            <a:off x="1227284" y="1268760"/>
-            <a:ext cx="6657084" cy="4968552"/>
+            <a:off x="1259632" y="1268760"/>
+            <a:ext cx="6642381" cy="4981785"/>
           </a:xfrm>
           <a:prstGeom prst="rect">
             <a:avLst/>

</xml_diff>

<commit_message>
[IMS-?] Kleinen Schönheitsmarkel beseitigt
</commit_message>
<xml_diff>
--- a/Doku/Präsentation.pptx
+++ b/Doku/Präsentation.pptx
@@ -1323,11 +1323,7 @@
             </a:r>
             <a:r>
               <a:rPr lang="de-DE" baseline="0" dirty="0" smtClean="0"/>
-              <a:t>von Lagerpersonal &amp; Vertrieb genutzt </a:t>
-            </a:r>
-            <a:r>
-              <a:rPr lang="de-DE" baseline="0" dirty="0" smtClean="0"/>
-              <a:t>werden</a:t>
+              <a:t>von Lagerpersonal &amp; Vertrieb genutzt werden</a:t>
             </a:r>
           </a:p>
           <a:p>
@@ -1438,11 +1434,7 @@
           <a:p>
             <a:r>
               <a:rPr lang="de-DE" baseline="0" dirty="0" smtClean="0"/>
-              <a:t>Verteiltes Verwalten der </a:t>
-            </a:r>
-            <a:r>
-              <a:rPr lang="de-DE" baseline="0" dirty="0" smtClean="0"/>
-              <a:t>Daten</a:t>
+              <a:t>Verteiltes Verwalten der Daten</a:t>
             </a:r>
             <a:endParaRPr lang="de-DE" baseline="0" dirty="0"/>
           </a:p>
@@ -7045,14 +7037,12 @@
               <a:rPr lang="de-DE" dirty="0" smtClean="0"/>
               <a:t>Programmierung in C#</a:t>
             </a:r>
-            <a:endParaRPr lang="de-DE" dirty="0" smtClean="0"/>
           </a:p>
           <a:p>
             <a:r>
               <a:rPr lang="de-DE" dirty="0" smtClean="0"/>
               <a:t>MariaDB als Datenbanksystem</a:t>
             </a:r>
-            <a:endParaRPr lang="de-DE" dirty="0" smtClean="0"/>
           </a:p>
           <a:p>
             <a:r>
@@ -7065,7 +7055,6 @@
               <a:rPr lang="de-DE" dirty="0" smtClean="0"/>
               <a:t>Mockups</a:t>
             </a:r>
-            <a:endParaRPr lang="de-DE" dirty="0" smtClean="0"/>
           </a:p>
           <a:p>
             <a:r>
@@ -7995,7 +7984,7 @@
         <p:spPr>
           <a:xfrm>
             <a:off x="539552" y="2606923"/>
-            <a:ext cx="3466728" cy="2190229"/>
+            <a:ext cx="3672408" cy="2190229"/>
           </a:xfrm>
         </p:spPr>
         <p:txBody>
@@ -8066,9 +8055,10 @@
               <a:buClrTx/>
             </a:pPr>
             <a:r>
-              <a:rPr lang="de-DE" dirty="0" smtClean="0"/>
+              <a:rPr lang="de-DE" sz="2400" dirty="0" smtClean="0"/>
               <a:t>Erweiterungen</a:t>
             </a:r>
+            <a:endParaRPr lang="de-DE" dirty="0" smtClean="0"/>
           </a:p>
           <a:p>
             <a:pPr lvl="1">
@@ -8114,9 +8104,10 @@
               <a:buClrTx/>
             </a:pPr>
             <a:r>
-              <a:rPr lang="de-DE" dirty="0" smtClean="0"/>
+              <a:rPr lang="de-DE" sz="2400" dirty="0" smtClean="0"/>
               <a:t>Teamarbeit</a:t>
             </a:r>
+            <a:endParaRPr lang="de-DE" dirty="0" smtClean="0"/>
           </a:p>
           <a:p>
             <a:endParaRPr lang="de-DE" dirty="0"/>
@@ -9820,11 +9811,7 @@
           <a:p>
             <a:r>
               <a:rPr lang="de-DE" dirty="0" smtClean="0"/>
-              <a:t>Verschiedene </a:t>
-            </a:r>
-            <a:r>
-              <a:rPr lang="de-DE" dirty="0" smtClean="0"/>
-              <a:t>Anwendungen</a:t>
+              <a:t>Verschiedene Anwendungen</a:t>
             </a:r>
           </a:p>
           <a:p>
@@ -10214,11 +10201,7 @@
           <a:p>
             <a:r>
               <a:rPr lang="de-DE" dirty="0" smtClean="0"/>
-              <a:t>Löschen </a:t>
-            </a:r>
-            <a:r>
-              <a:rPr lang="de-DE" dirty="0" smtClean="0"/>
-              <a:t>von Komponenten</a:t>
+              <a:t>Löschen von Komponenten</a:t>
             </a:r>
           </a:p>
           <a:p>
@@ -10232,7 +10215,6 @@
               <a:rPr lang="de-DE" dirty="0" smtClean="0"/>
               <a:t>Sortierung über die Oberfläche</a:t>
             </a:r>
-            <a:endParaRPr lang="de-DE" dirty="0" smtClean="0"/>
           </a:p>
           <a:p>
             <a:r>
@@ -10249,13 +10231,8 @@
           <a:p>
             <a:r>
               <a:rPr lang="de-DE" dirty="0" smtClean="0"/>
-              <a:t>Konfiguration der </a:t>
-            </a:r>
-            <a:r>
-              <a:rPr lang="de-DE" dirty="0" smtClean="0"/>
-              <a:t>Datenbankverbindung</a:t>
-            </a:r>
-            <a:endParaRPr lang="de-DE" dirty="0" smtClean="0"/>
+              <a:t>Konfiguration der Datenbankverbindung</a:t>
+            </a:r>
           </a:p>
           <a:p>
             <a:endParaRPr lang="de-DE" dirty="0" smtClean="0"/>

</xml_diff>